<commit_message>
Added excercises for Day_4_2 slides.
</commit_message>
<xml_diff>
--- a/Slides/Day_4_2.pptx
+++ b/Slides/Day_4_2.pptx
@@ -55,6 +55,18 @@
     <p:sldId id="316" r:id="rId49"/>
     <p:sldId id="317" r:id="rId50"/>
     <p:sldId id="318" r:id="rId51"/>
+    <p:sldId id="319" r:id="rId52"/>
+    <p:sldId id="320" r:id="rId53"/>
+    <p:sldId id="321" r:id="rId54"/>
+    <p:sldId id="322" r:id="rId55"/>
+    <p:sldId id="323" r:id="rId56"/>
+    <p:sldId id="324" r:id="rId57"/>
+    <p:sldId id="325" r:id="rId58"/>
+    <p:sldId id="326" r:id="rId59"/>
+    <p:sldId id="327" r:id="rId60"/>
+    <p:sldId id="328" r:id="rId61"/>
+    <p:sldId id="329" r:id="rId62"/>
+    <p:sldId id="330" r:id="rId63"/>
   </p:sldIdLst>
   <p:sldSz cx="12192000" cy="6858000"/>
   <p:notesSz cx="6858000" cy="9144000"/>
@@ -347,7 +359,7 @@
           <a:p>
             <a:fld id="{EDA8BDCB-78B0-4602-A2A4-46193FA57CAD}" type="datetimeFigureOut">
               <a:rPr lang="en-US" smtClean="0"/>
-              <a:t>7/29/2024</a:t>
+              <a:t>7/30/2024</a:t>
             </a:fld>
             <a:endParaRPr lang="en-US"/>
           </a:p>
@@ -621,7 +633,7 @@
           <a:p>
             <a:fld id="{EDA8BDCB-78B0-4602-A2A4-46193FA57CAD}" type="datetimeFigureOut">
               <a:rPr lang="en-US" smtClean="0"/>
-              <a:t>7/29/2024</a:t>
+              <a:t>7/30/2024</a:t>
             </a:fld>
             <a:endParaRPr lang="en-US"/>
           </a:p>
@@ -815,7 +827,7 @@
           <a:p>
             <a:fld id="{EDA8BDCB-78B0-4602-A2A4-46193FA57CAD}" type="datetimeFigureOut">
               <a:rPr lang="en-US" smtClean="0"/>
-              <a:t>7/29/2024</a:t>
+              <a:t>7/30/2024</a:t>
             </a:fld>
             <a:endParaRPr lang="en-US"/>
           </a:p>
@@ -1088,7 +1100,7 @@
           <a:p>
             <a:fld id="{EDA8BDCB-78B0-4602-A2A4-46193FA57CAD}" type="datetimeFigureOut">
               <a:rPr lang="en-US" smtClean="0"/>
-              <a:t>7/29/2024</a:t>
+              <a:t>7/30/2024</a:t>
             </a:fld>
             <a:endParaRPr lang="en-US"/>
           </a:p>
@@ -1429,7 +1441,7 @@
           <a:p>
             <a:fld id="{EDA8BDCB-78B0-4602-A2A4-46193FA57CAD}" type="datetimeFigureOut">
               <a:rPr lang="en-US" smtClean="0"/>
-              <a:t>7/29/2024</a:t>
+              <a:t>7/30/2024</a:t>
             </a:fld>
             <a:endParaRPr lang="en-US"/>
           </a:p>
@@ -2052,7 +2064,7 @@
           <a:p>
             <a:fld id="{EDA8BDCB-78B0-4602-A2A4-46193FA57CAD}" type="datetimeFigureOut">
               <a:rPr lang="en-US" smtClean="0"/>
-              <a:t>7/29/2024</a:t>
+              <a:t>7/30/2024</a:t>
             </a:fld>
             <a:endParaRPr lang="en-US"/>
           </a:p>
@@ -2909,7 +2921,7 @@
           <a:p>
             <a:fld id="{EDA8BDCB-78B0-4602-A2A4-46193FA57CAD}" type="datetimeFigureOut">
               <a:rPr lang="en-US" smtClean="0"/>
-              <a:t>7/29/2024</a:t>
+              <a:t>7/30/2024</a:t>
             </a:fld>
             <a:endParaRPr lang="en-US"/>
           </a:p>
@@ -3079,7 +3091,7 @@
           <a:p>
             <a:fld id="{EDA8BDCB-78B0-4602-A2A4-46193FA57CAD}" type="datetimeFigureOut">
               <a:rPr lang="en-US" smtClean="0"/>
-              <a:t>7/29/2024</a:t>
+              <a:t>7/30/2024</a:t>
             </a:fld>
             <a:endParaRPr lang="en-US"/>
           </a:p>
@@ -3259,7 +3271,7 @@
           <a:p>
             <a:fld id="{EDA8BDCB-78B0-4602-A2A4-46193FA57CAD}" type="datetimeFigureOut">
               <a:rPr lang="en-US" smtClean="0"/>
-              <a:t>7/29/2024</a:t>
+              <a:t>7/30/2024</a:t>
             </a:fld>
             <a:endParaRPr lang="en-US"/>
           </a:p>
@@ -3429,7 +3441,7 @@
           <a:p>
             <a:fld id="{EDA8BDCB-78B0-4602-A2A4-46193FA57CAD}" type="datetimeFigureOut">
               <a:rPr lang="en-US" smtClean="0"/>
-              <a:t>7/29/2024</a:t>
+              <a:t>7/30/2024</a:t>
             </a:fld>
             <a:endParaRPr lang="en-US"/>
           </a:p>
@@ -3676,7 +3688,7 @@
           <a:p>
             <a:fld id="{EDA8BDCB-78B0-4602-A2A4-46193FA57CAD}" type="datetimeFigureOut">
               <a:rPr lang="en-US" smtClean="0"/>
-              <a:t>7/29/2024</a:t>
+              <a:t>7/30/2024</a:t>
             </a:fld>
             <a:endParaRPr lang="en-US"/>
           </a:p>
@@ -3968,7 +3980,7 @@
           <a:p>
             <a:fld id="{EDA8BDCB-78B0-4602-A2A4-46193FA57CAD}" type="datetimeFigureOut">
               <a:rPr lang="en-US" smtClean="0"/>
-              <a:t>7/29/2024</a:t>
+              <a:t>7/30/2024</a:t>
             </a:fld>
             <a:endParaRPr lang="en-US"/>
           </a:p>
@@ -4412,7 +4424,7 @@
           <a:p>
             <a:fld id="{EDA8BDCB-78B0-4602-A2A4-46193FA57CAD}" type="datetimeFigureOut">
               <a:rPr lang="en-US" smtClean="0"/>
-              <a:t>7/29/2024</a:t>
+              <a:t>7/30/2024</a:t>
             </a:fld>
             <a:endParaRPr lang="en-US"/>
           </a:p>
@@ -4530,7 +4542,7 @@
           <a:p>
             <a:fld id="{EDA8BDCB-78B0-4602-A2A4-46193FA57CAD}" type="datetimeFigureOut">
               <a:rPr lang="en-US" smtClean="0"/>
-              <a:t>7/29/2024</a:t>
+              <a:t>7/30/2024</a:t>
             </a:fld>
             <a:endParaRPr lang="en-US"/>
           </a:p>
@@ -4625,7 +4637,7 @@
           <a:p>
             <a:fld id="{EDA8BDCB-78B0-4602-A2A4-46193FA57CAD}" type="datetimeFigureOut">
               <a:rPr lang="en-US" smtClean="0"/>
-              <a:t>7/29/2024</a:t>
+              <a:t>7/30/2024</a:t>
             </a:fld>
             <a:endParaRPr lang="en-US"/>
           </a:p>
@@ -4904,7 +4916,7 @@
           <a:p>
             <a:fld id="{EDA8BDCB-78B0-4602-A2A4-46193FA57CAD}" type="datetimeFigureOut">
               <a:rPr lang="en-US" smtClean="0"/>
-              <a:t>7/29/2024</a:t>
+              <a:t>7/30/2024</a:t>
             </a:fld>
             <a:endParaRPr lang="en-US"/>
           </a:p>
@@ -5178,7 +5190,7 @@
           <a:p>
             <a:fld id="{EDA8BDCB-78B0-4602-A2A4-46193FA57CAD}" type="datetimeFigureOut">
               <a:rPr lang="en-US" smtClean="0"/>
-              <a:t>7/29/2024</a:t>
+              <a:t>7/30/2024</a:t>
             </a:fld>
             <a:endParaRPr lang="en-US"/>
           </a:p>
@@ -5607,7 +5619,7 @@
           <a:p>
             <a:fld id="{EDA8BDCB-78B0-4602-A2A4-46193FA57CAD}" type="datetimeFigureOut">
               <a:rPr lang="en-US" smtClean="0"/>
-              <a:t>7/29/2024</a:t>
+              <a:t>7/30/2024</a:t>
             </a:fld>
             <a:endParaRPr lang="en-US"/>
           </a:p>
@@ -12179,6 +12191,1229 @@
 </p:sld>
 </file>
 
+<file path=ppt/slides/slide51.xml><?xml version="1.0" encoding="utf-8"?>
+<p:sld xmlns:a="http://schemas.openxmlformats.org/drawingml/2006/main" xmlns:r="http://schemas.openxmlformats.org/officeDocument/2006/relationships" xmlns:p="http://schemas.openxmlformats.org/presentationml/2006/main">
+  <p:cSld>
+    <p:spTree>
+      <p:nvGrpSpPr>
+        <p:cNvPr id="1" name=""/>
+        <p:cNvGrpSpPr/>
+        <p:nvPr/>
+      </p:nvGrpSpPr>
+      <p:grpSpPr>
+        <a:xfrm>
+          <a:off x="0" y="0"/>
+          <a:ext cx="0" cy="0"/>
+          <a:chOff x="0" y="0"/>
+          <a:chExt cx="0" cy="0"/>
+        </a:xfrm>
+      </p:grpSpPr>
+      <p:sp>
+        <p:nvSpPr>
+          <p:cNvPr id="2" name="Title 1">
+            <a:extLst>
+              <a:ext uri="{FF2B5EF4-FFF2-40B4-BE49-F238E27FC236}">
+                <a16:creationId xmlns:a16="http://schemas.microsoft.com/office/drawing/2014/main" id="{14D7F595-0D8F-4FE6-A3EC-4557A1A457EB}"/>
+              </a:ext>
+            </a:extLst>
+          </p:cNvPr>
+          <p:cNvSpPr>
+            <a:spLocks noGrp="1"/>
+          </p:cNvSpPr>
+          <p:nvPr>
+            <p:ph type="title"/>
+          </p:nvPr>
+        </p:nvSpPr>
+        <p:spPr/>
+        <p:txBody>
+          <a:bodyPr/>
+          <a:lstStyle/>
+          <a:p>
+            <a:r>
+              <a:rPr lang="en-US">
+                <a:latin typeface="Arial" panose="020B0604020202020204" pitchFamily="34" charset="0"/>
+                <a:cs typeface="Arial" panose="020B0604020202020204" pitchFamily="34" charset="0"/>
+              </a:rPr>
+              <a:t>Bài tập thực hành</a:t>
+            </a:r>
+          </a:p>
+        </p:txBody>
+      </p:sp>
+      <p:sp>
+        <p:nvSpPr>
+          <p:cNvPr id="3" name="Content Placeholder 2">
+            <a:extLst>
+              <a:ext uri="{FF2B5EF4-FFF2-40B4-BE49-F238E27FC236}">
+                <a16:creationId xmlns:a16="http://schemas.microsoft.com/office/drawing/2014/main" id="{6337998B-3737-4D43-973D-24B118D723A2}"/>
+              </a:ext>
+            </a:extLst>
+          </p:cNvPr>
+          <p:cNvSpPr>
+            <a:spLocks noGrp="1"/>
+          </p:cNvSpPr>
+          <p:nvPr>
+            <p:ph idx="1"/>
+          </p:nvPr>
+        </p:nvSpPr>
+        <p:spPr>
+          <a:xfrm>
+            <a:off x="1103312" y="2237173"/>
+            <a:ext cx="8946541" cy="4011227"/>
+          </a:xfrm>
+        </p:spPr>
+        <p:txBody>
+          <a:bodyPr/>
+          <a:lstStyle/>
+          <a:p>
+            <a:r>
+              <a:rPr lang="en-US">
+                <a:latin typeface="Arial" panose="020B0604020202020204" pitchFamily="34" charset="0"/>
+                <a:cs typeface="Arial" panose="020B0604020202020204" pitchFamily="34" charset="0"/>
+              </a:rPr>
+              <a:t>Bài 1: Viết chương trình:</a:t>
+            </a:r>
+          </a:p>
+          <a:p>
+            <a:pPr lvl="1"/>
+            <a:r>
+              <a:rPr lang="en-US">
+                <a:latin typeface="Arial" panose="020B0604020202020204" pitchFamily="34" charset="0"/>
+                <a:cs typeface="Arial" panose="020B0604020202020204" pitchFamily="34" charset="0"/>
+              </a:rPr>
+              <a:t>Yêu cầu người dùng nhập kích thước mảng.</a:t>
+            </a:r>
+          </a:p>
+          <a:p>
+            <a:pPr lvl="1"/>
+            <a:r>
+              <a:rPr lang="en-US">
+                <a:latin typeface="Arial" panose="020B0604020202020204" pitchFamily="34" charset="0"/>
+                <a:cs typeface="Arial" panose="020B0604020202020204" pitchFamily="34" charset="0"/>
+              </a:rPr>
+              <a:t>Yêu cầu người dùng nhập phần tử là số nguyên cho mảng dựa trên kích thước đã nhập.</a:t>
+            </a:r>
+          </a:p>
+          <a:p>
+            <a:pPr lvl="1"/>
+            <a:r>
+              <a:rPr lang="en-US">
+                <a:latin typeface="Arial" panose="020B0604020202020204" pitchFamily="34" charset="0"/>
+                <a:cs typeface="Arial" panose="020B0604020202020204" pitchFamily="34" charset="0"/>
+              </a:rPr>
+              <a:t>Sau khi ngườ dùng nhập đủ số lượng phần tử, tính trung bình cộng những số nguyên mà người dùng đã nhập.</a:t>
+            </a:r>
+          </a:p>
+          <a:p>
+            <a:pPr lvl="1"/>
+            <a:r>
+              <a:rPr lang="en-US">
+                <a:latin typeface="Arial" panose="020B0604020202020204" pitchFamily="34" charset="0"/>
+                <a:cs typeface="Arial" panose="020B0604020202020204" pitchFamily="34" charset="0"/>
+              </a:rPr>
+              <a:t>In kết quả tính toán ra màn hình.</a:t>
+            </a:r>
+          </a:p>
+        </p:txBody>
+      </p:sp>
+    </p:spTree>
+    <p:extLst>
+      <p:ext uri="{BB962C8B-B14F-4D97-AF65-F5344CB8AC3E}">
+        <p14:creationId xmlns:p14="http://schemas.microsoft.com/office/powerpoint/2010/main" val="2003179678"/>
+      </p:ext>
+    </p:extLst>
+  </p:cSld>
+  <p:clrMapOvr>
+    <a:masterClrMapping/>
+  </p:clrMapOvr>
+</p:sld>
+</file>
+
+<file path=ppt/slides/slide52.xml><?xml version="1.0" encoding="utf-8"?>
+<p:sld xmlns:a="http://schemas.openxmlformats.org/drawingml/2006/main" xmlns:r="http://schemas.openxmlformats.org/officeDocument/2006/relationships" xmlns:p="http://schemas.openxmlformats.org/presentationml/2006/main">
+  <p:cSld>
+    <p:spTree>
+      <p:nvGrpSpPr>
+        <p:cNvPr id="1" name=""/>
+        <p:cNvGrpSpPr/>
+        <p:nvPr/>
+      </p:nvGrpSpPr>
+      <p:grpSpPr>
+        <a:xfrm>
+          <a:off x="0" y="0"/>
+          <a:ext cx="0" cy="0"/>
+          <a:chOff x="0" y="0"/>
+          <a:chExt cx="0" cy="0"/>
+        </a:xfrm>
+      </p:grpSpPr>
+      <p:sp>
+        <p:nvSpPr>
+          <p:cNvPr id="2" name="Title 1">
+            <a:extLst>
+              <a:ext uri="{FF2B5EF4-FFF2-40B4-BE49-F238E27FC236}">
+                <a16:creationId xmlns:a16="http://schemas.microsoft.com/office/drawing/2014/main" id="{14D7F595-0D8F-4FE6-A3EC-4557A1A457EB}"/>
+              </a:ext>
+            </a:extLst>
+          </p:cNvPr>
+          <p:cNvSpPr>
+            <a:spLocks noGrp="1"/>
+          </p:cNvSpPr>
+          <p:nvPr>
+            <p:ph type="title"/>
+          </p:nvPr>
+        </p:nvSpPr>
+        <p:spPr/>
+        <p:txBody>
+          <a:bodyPr/>
+          <a:lstStyle/>
+          <a:p>
+            <a:r>
+              <a:rPr lang="en-US">
+                <a:latin typeface="Arial" panose="020B0604020202020204" pitchFamily="34" charset="0"/>
+                <a:cs typeface="Arial" panose="020B0604020202020204" pitchFamily="34" charset="0"/>
+              </a:rPr>
+              <a:t>Bài tập thực hành</a:t>
+            </a:r>
+          </a:p>
+        </p:txBody>
+      </p:sp>
+      <p:sp>
+        <p:nvSpPr>
+          <p:cNvPr id="3" name="Content Placeholder 2">
+            <a:extLst>
+              <a:ext uri="{FF2B5EF4-FFF2-40B4-BE49-F238E27FC236}">
+                <a16:creationId xmlns:a16="http://schemas.microsoft.com/office/drawing/2014/main" id="{6337998B-3737-4D43-973D-24B118D723A2}"/>
+              </a:ext>
+            </a:extLst>
+          </p:cNvPr>
+          <p:cNvSpPr>
+            <a:spLocks noGrp="1"/>
+          </p:cNvSpPr>
+          <p:nvPr>
+            <p:ph idx="1"/>
+          </p:nvPr>
+        </p:nvSpPr>
+        <p:spPr>
+          <a:xfrm>
+            <a:off x="1103312" y="2237173"/>
+            <a:ext cx="8946541" cy="4011227"/>
+          </a:xfrm>
+        </p:spPr>
+        <p:txBody>
+          <a:bodyPr/>
+          <a:lstStyle/>
+          <a:p>
+            <a:r>
+              <a:rPr lang="en-US">
+                <a:latin typeface="Arial" panose="020B0604020202020204" pitchFamily="34" charset="0"/>
+                <a:cs typeface="Arial" panose="020B0604020202020204" pitchFamily="34" charset="0"/>
+              </a:rPr>
+              <a:t>Bài 2: Viết chương trình:</a:t>
+            </a:r>
+          </a:p>
+          <a:p>
+            <a:pPr lvl="1"/>
+            <a:r>
+              <a:rPr lang="en-US">
+                <a:latin typeface="Arial" panose="020B0604020202020204" pitchFamily="34" charset="0"/>
+                <a:cs typeface="Arial" panose="020B0604020202020204" pitchFamily="34" charset="0"/>
+              </a:rPr>
+              <a:t>Yêu cầu người dùng nhập bao nhiêu số thực mà người dùng muốn. Kết thúc khi người dùng nhập gì đó không phải số nguyên.</a:t>
+            </a:r>
+          </a:p>
+          <a:p>
+            <a:pPr lvl="1"/>
+            <a:r>
+              <a:rPr lang="en-US">
+                <a:latin typeface="Arial" panose="020B0604020202020204" pitchFamily="34" charset="0"/>
+                <a:cs typeface="Arial" panose="020B0604020202020204" pitchFamily="34" charset="0"/>
+              </a:rPr>
+              <a:t>Sau khi người dùng kết thúc việc nhập số thực, hãy tính trung bình cộng trên những số thực mà người dùng đã nhập.</a:t>
+            </a:r>
+          </a:p>
+          <a:p>
+            <a:pPr lvl="1"/>
+            <a:r>
+              <a:rPr lang="en-US">
+                <a:latin typeface="Arial" panose="020B0604020202020204" pitchFamily="34" charset="0"/>
+                <a:cs typeface="Arial" panose="020B0604020202020204" pitchFamily="34" charset="0"/>
+              </a:rPr>
+              <a:t>In kết quả ra màn hình sau khi tính toán.</a:t>
+            </a:r>
+          </a:p>
+        </p:txBody>
+      </p:sp>
+    </p:spTree>
+    <p:extLst>
+      <p:ext uri="{BB962C8B-B14F-4D97-AF65-F5344CB8AC3E}">
+        <p14:creationId xmlns:p14="http://schemas.microsoft.com/office/powerpoint/2010/main" val="783567811"/>
+      </p:ext>
+    </p:extLst>
+  </p:cSld>
+  <p:clrMapOvr>
+    <a:masterClrMapping/>
+  </p:clrMapOvr>
+</p:sld>
+</file>
+
+<file path=ppt/slides/slide53.xml><?xml version="1.0" encoding="utf-8"?>
+<p:sld xmlns:a="http://schemas.openxmlformats.org/drawingml/2006/main" xmlns:r="http://schemas.openxmlformats.org/officeDocument/2006/relationships" xmlns:p="http://schemas.openxmlformats.org/presentationml/2006/main">
+  <p:cSld>
+    <p:spTree>
+      <p:nvGrpSpPr>
+        <p:cNvPr id="1" name=""/>
+        <p:cNvGrpSpPr/>
+        <p:nvPr/>
+      </p:nvGrpSpPr>
+      <p:grpSpPr>
+        <a:xfrm>
+          <a:off x="0" y="0"/>
+          <a:ext cx="0" cy="0"/>
+          <a:chOff x="0" y="0"/>
+          <a:chExt cx="0" cy="0"/>
+        </a:xfrm>
+      </p:grpSpPr>
+      <p:sp>
+        <p:nvSpPr>
+          <p:cNvPr id="2" name="Title 1">
+            <a:extLst>
+              <a:ext uri="{FF2B5EF4-FFF2-40B4-BE49-F238E27FC236}">
+                <a16:creationId xmlns:a16="http://schemas.microsoft.com/office/drawing/2014/main" id="{14D7F595-0D8F-4FE6-A3EC-4557A1A457EB}"/>
+              </a:ext>
+            </a:extLst>
+          </p:cNvPr>
+          <p:cNvSpPr>
+            <a:spLocks noGrp="1"/>
+          </p:cNvSpPr>
+          <p:nvPr>
+            <p:ph type="title"/>
+          </p:nvPr>
+        </p:nvSpPr>
+        <p:spPr/>
+        <p:txBody>
+          <a:bodyPr/>
+          <a:lstStyle/>
+          <a:p>
+            <a:r>
+              <a:rPr lang="en-US">
+                <a:latin typeface="Arial" panose="020B0604020202020204" pitchFamily="34" charset="0"/>
+                <a:cs typeface="Arial" panose="020B0604020202020204" pitchFamily="34" charset="0"/>
+              </a:rPr>
+              <a:t>Bài tập thực hành</a:t>
+            </a:r>
+          </a:p>
+        </p:txBody>
+      </p:sp>
+      <p:sp>
+        <p:nvSpPr>
+          <p:cNvPr id="3" name="Content Placeholder 2">
+            <a:extLst>
+              <a:ext uri="{FF2B5EF4-FFF2-40B4-BE49-F238E27FC236}">
+                <a16:creationId xmlns:a16="http://schemas.microsoft.com/office/drawing/2014/main" id="{6337998B-3737-4D43-973D-24B118D723A2}"/>
+              </a:ext>
+            </a:extLst>
+          </p:cNvPr>
+          <p:cNvSpPr>
+            <a:spLocks noGrp="1"/>
+          </p:cNvSpPr>
+          <p:nvPr>
+            <p:ph idx="1"/>
+          </p:nvPr>
+        </p:nvSpPr>
+        <p:spPr>
+          <a:xfrm>
+            <a:off x="1103312" y="2237173"/>
+            <a:ext cx="8946541" cy="4011227"/>
+          </a:xfrm>
+        </p:spPr>
+        <p:txBody>
+          <a:bodyPr/>
+          <a:lstStyle/>
+          <a:p>
+            <a:r>
+              <a:rPr lang="en-US">
+                <a:latin typeface="Arial" panose="020B0604020202020204" pitchFamily="34" charset="0"/>
+                <a:cs typeface="Arial" panose="020B0604020202020204" pitchFamily="34" charset="0"/>
+              </a:rPr>
+              <a:t>Bài 3: Viết chương trình:</a:t>
+            </a:r>
+          </a:p>
+          <a:p>
+            <a:pPr lvl="1"/>
+            <a:r>
+              <a:rPr lang="en-US">
+                <a:latin typeface="Arial" panose="020B0604020202020204" pitchFamily="34" charset="0"/>
+                <a:cs typeface="Arial" panose="020B0604020202020204" pitchFamily="34" charset="0"/>
+              </a:rPr>
+              <a:t>Yêu cầu người dùng nhập bao nhiêu chuỗi mà người dùng muốn. Nhưng các chuỗi người dùng nhập không được trùng với các chuỗi mà người dùng đã từng nhập qua.</a:t>
+            </a:r>
+          </a:p>
+          <a:p>
+            <a:pPr lvl="1"/>
+            <a:r>
+              <a:rPr lang="en-US">
+                <a:latin typeface="Arial" panose="020B0604020202020204" pitchFamily="34" charset="0"/>
+                <a:cs typeface="Arial" panose="020B0604020202020204" pitchFamily="34" charset="0"/>
+              </a:rPr>
+              <a:t>Nếu người dùng nhập lại nội dung đã từng nhập qua, hãy in thông báo ra màn hình cho người dùng biết.</a:t>
+            </a:r>
+          </a:p>
+          <a:p>
+            <a:pPr lvl="1"/>
+            <a:r>
+              <a:rPr lang="en-US">
+                <a:latin typeface="Arial" panose="020B0604020202020204" pitchFamily="34" charset="0"/>
+                <a:cs typeface="Arial" panose="020B0604020202020204" pitchFamily="34" charset="0"/>
+              </a:rPr>
+              <a:t>Người dùng có thể ngừng nhập chuỗi bằng việc nhập chuỗi: "xong".</a:t>
+            </a:r>
+          </a:p>
+          <a:p>
+            <a:pPr lvl="1"/>
+            <a:r>
+              <a:rPr lang="en-US">
+                <a:latin typeface="Arial" panose="020B0604020202020204" pitchFamily="34" charset="0"/>
+                <a:cs typeface="Arial" panose="020B0604020202020204" pitchFamily="34" charset="0"/>
+              </a:rPr>
+              <a:t>Sau khi người dùng ngừng nhập chuỗi, hãy in tất cả những chuỗi mà người dùng đã nhập ra màn hình.</a:t>
+            </a:r>
+          </a:p>
+        </p:txBody>
+      </p:sp>
+    </p:spTree>
+    <p:extLst>
+      <p:ext uri="{BB962C8B-B14F-4D97-AF65-F5344CB8AC3E}">
+        <p14:creationId xmlns:p14="http://schemas.microsoft.com/office/powerpoint/2010/main" val="1864597201"/>
+      </p:ext>
+    </p:extLst>
+  </p:cSld>
+  <p:clrMapOvr>
+    <a:masterClrMapping/>
+  </p:clrMapOvr>
+</p:sld>
+</file>
+
+<file path=ppt/slides/slide54.xml><?xml version="1.0" encoding="utf-8"?>
+<p:sld xmlns:a="http://schemas.openxmlformats.org/drawingml/2006/main" xmlns:r="http://schemas.openxmlformats.org/officeDocument/2006/relationships" xmlns:p="http://schemas.openxmlformats.org/presentationml/2006/main">
+  <p:cSld>
+    <p:spTree>
+      <p:nvGrpSpPr>
+        <p:cNvPr id="1" name=""/>
+        <p:cNvGrpSpPr/>
+        <p:nvPr/>
+      </p:nvGrpSpPr>
+      <p:grpSpPr>
+        <a:xfrm>
+          <a:off x="0" y="0"/>
+          <a:ext cx="0" cy="0"/>
+          <a:chOff x="0" y="0"/>
+          <a:chExt cx="0" cy="0"/>
+        </a:xfrm>
+      </p:grpSpPr>
+      <p:sp>
+        <p:nvSpPr>
+          <p:cNvPr id="2" name="Title 1">
+            <a:extLst>
+              <a:ext uri="{FF2B5EF4-FFF2-40B4-BE49-F238E27FC236}">
+                <a16:creationId xmlns:a16="http://schemas.microsoft.com/office/drawing/2014/main" id="{14D7F595-0D8F-4FE6-A3EC-4557A1A457EB}"/>
+              </a:ext>
+            </a:extLst>
+          </p:cNvPr>
+          <p:cNvSpPr>
+            <a:spLocks noGrp="1"/>
+          </p:cNvSpPr>
+          <p:nvPr>
+            <p:ph type="title"/>
+          </p:nvPr>
+        </p:nvSpPr>
+        <p:spPr/>
+        <p:txBody>
+          <a:bodyPr/>
+          <a:lstStyle/>
+          <a:p>
+            <a:r>
+              <a:rPr lang="en-US">
+                <a:latin typeface="Arial" panose="020B0604020202020204" pitchFamily="34" charset="0"/>
+                <a:cs typeface="Arial" panose="020B0604020202020204" pitchFamily="34" charset="0"/>
+              </a:rPr>
+              <a:t>Bài tập thực hành</a:t>
+            </a:r>
+          </a:p>
+        </p:txBody>
+      </p:sp>
+      <p:sp>
+        <p:nvSpPr>
+          <p:cNvPr id="3" name="Content Placeholder 2">
+            <a:extLst>
+              <a:ext uri="{FF2B5EF4-FFF2-40B4-BE49-F238E27FC236}">
+                <a16:creationId xmlns:a16="http://schemas.microsoft.com/office/drawing/2014/main" id="{6337998B-3737-4D43-973D-24B118D723A2}"/>
+              </a:ext>
+            </a:extLst>
+          </p:cNvPr>
+          <p:cNvSpPr>
+            <a:spLocks noGrp="1"/>
+          </p:cNvSpPr>
+          <p:nvPr>
+            <p:ph idx="1"/>
+          </p:nvPr>
+        </p:nvSpPr>
+        <p:spPr>
+          <a:xfrm>
+            <a:off x="1103312" y="2237173"/>
+            <a:ext cx="8946541" cy="4011227"/>
+          </a:xfrm>
+        </p:spPr>
+        <p:txBody>
+          <a:bodyPr/>
+          <a:lstStyle/>
+          <a:p>
+            <a:r>
+              <a:rPr lang="en-US">
+                <a:latin typeface="Arial" panose="020B0604020202020204" pitchFamily="34" charset="0"/>
+                <a:cs typeface="Arial" panose="020B0604020202020204" pitchFamily="34" charset="0"/>
+              </a:rPr>
+              <a:t>Bài 4: Viết chương trình:</a:t>
+            </a:r>
+          </a:p>
+          <a:p>
+            <a:pPr lvl="1"/>
+            <a:r>
+              <a:rPr lang="en-US">
+                <a:latin typeface="Arial" panose="020B0604020202020204" pitchFamily="34" charset="0"/>
+                <a:cs typeface="Arial" panose="020B0604020202020204" pitchFamily="34" charset="0"/>
+              </a:rPr>
+              <a:t>Cho phép người dùng lưu trữ điểm của sinh viên với khóa là mã sinh viên (chuỗi) và giá trị lưu là điểm của sinh viên (số thực không thấp hơn 0 và không vượt quá 10).</a:t>
+            </a:r>
+          </a:p>
+          <a:p>
+            <a:pPr lvl="1"/>
+            <a:r>
+              <a:rPr lang="en-US">
+                <a:latin typeface="Arial" panose="020B0604020202020204" pitchFamily="34" charset="0"/>
+                <a:cs typeface="Arial" panose="020B0604020202020204" pitchFamily="34" charset="0"/>
+              </a:rPr>
+              <a:t>Người dùng có thể kết thúc việc nhập dữ bằng việc nhập chuỗi "xong".</a:t>
+            </a:r>
+          </a:p>
+          <a:p>
+            <a:pPr lvl="1"/>
+            <a:r>
+              <a:rPr lang="en-US">
+                <a:latin typeface="Arial" panose="020B0604020202020204" pitchFamily="34" charset="0"/>
+                <a:cs typeface="Arial" panose="020B0604020202020204" pitchFamily="34" charset="0"/>
+              </a:rPr>
+              <a:t>Sau khi việc nhập dữ liệu kết thúc, hãy in ra toàn bộ điểm của sinh viên mà người dùng đã nhập theo định dạng sau:</a:t>
+            </a:r>
+          </a:p>
+          <a:p>
+            <a:pPr lvl="2"/>
+            <a:r>
+              <a:rPr lang="en-US">
+                <a:latin typeface="Arial" panose="020B0604020202020204" pitchFamily="34" charset="0"/>
+                <a:cs typeface="Arial" panose="020B0604020202020204" pitchFamily="34" charset="0"/>
+              </a:rPr>
+              <a:t>&lt;mã sinh viên&gt; -&gt; &lt;điểm&gt;</a:t>
+            </a:r>
+          </a:p>
+        </p:txBody>
+      </p:sp>
+    </p:spTree>
+    <p:extLst>
+      <p:ext uri="{BB962C8B-B14F-4D97-AF65-F5344CB8AC3E}">
+        <p14:creationId xmlns:p14="http://schemas.microsoft.com/office/powerpoint/2010/main" val="303125926"/>
+      </p:ext>
+    </p:extLst>
+  </p:cSld>
+  <p:clrMapOvr>
+    <a:masterClrMapping/>
+  </p:clrMapOvr>
+</p:sld>
+</file>
+
+<file path=ppt/slides/slide55.xml><?xml version="1.0" encoding="utf-8"?>
+<p:sld xmlns:a="http://schemas.openxmlformats.org/drawingml/2006/main" xmlns:r="http://schemas.openxmlformats.org/officeDocument/2006/relationships" xmlns:p="http://schemas.openxmlformats.org/presentationml/2006/main">
+  <p:cSld>
+    <p:spTree>
+      <p:nvGrpSpPr>
+        <p:cNvPr id="1" name=""/>
+        <p:cNvGrpSpPr/>
+        <p:nvPr/>
+      </p:nvGrpSpPr>
+      <p:grpSpPr>
+        <a:xfrm>
+          <a:off x="0" y="0"/>
+          <a:ext cx="0" cy="0"/>
+          <a:chOff x="0" y="0"/>
+          <a:chExt cx="0" cy="0"/>
+        </a:xfrm>
+      </p:grpSpPr>
+      <p:sp>
+        <p:nvSpPr>
+          <p:cNvPr id="2" name="Title 1">
+            <a:extLst>
+              <a:ext uri="{FF2B5EF4-FFF2-40B4-BE49-F238E27FC236}">
+                <a16:creationId xmlns:a16="http://schemas.microsoft.com/office/drawing/2014/main" id="{14D7F595-0D8F-4FE6-A3EC-4557A1A457EB}"/>
+              </a:ext>
+            </a:extLst>
+          </p:cNvPr>
+          <p:cNvSpPr>
+            <a:spLocks noGrp="1"/>
+          </p:cNvSpPr>
+          <p:nvPr>
+            <p:ph type="title"/>
+          </p:nvPr>
+        </p:nvSpPr>
+        <p:spPr/>
+        <p:txBody>
+          <a:bodyPr/>
+          <a:lstStyle/>
+          <a:p>
+            <a:r>
+              <a:rPr lang="en-US">
+                <a:latin typeface="Arial" panose="020B0604020202020204" pitchFamily="34" charset="0"/>
+                <a:cs typeface="Arial" panose="020B0604020202020204" pitchFamily="34" charset="0"/>
+              </a:rPr>
+              <a:t>Bài tập thực hành</a:t>
+            </a:r>
+          </a:p>
+        </p:txBody>
+      </p:sp>
+      <p:sp>
+        <p:nvSpPr>
+          <p:cNvPr id="3" name="Content Placeholder 2">
+            <a:extLst>
+              <a:ext uri="{FF2B5EF4-FFF2-40B4-BE49-F238E27FC236}">
+                <a16:creationId xmlns:a16="http://schemas.microsoft.com/office/drawing/2014/main" id="{6337998B-3737-4D43-973D-24B118D723A2}"/>
+              </a:ext>
+            </a:extLst>
+          </p:cNvPr>
+          <p:cNvSpPr>
+            <a:spLocks noGrp="1"/>
+          </p:cNvSpPr>
+          <p:nvPr>
+            <p:ph idx="1"/>
+          </p:nvPr>
+        </p:nvSpPr>
+        <p:spPr>
+          <a:xfrm>
+            <a:off x="1103312" y="2237173"/>
+            <a:ext cx="8946541" cy="4011227"/>
+          </a:xfrm>
+        </p:spPr>
+        <p:txBody>
+          <a:bodyPr/>
+          <a:lstStyle/>
+          <a:p>
+            <a:r>
+              <a:rPr lang="en-US">
+                <a:latin typeface="Arial" panose="020B0604020202020204" pitchFamily="34" charset="0"/>
+                <a:cs typeface="Arial" panose="020B0604020202020204" pitchFamily="34" charset="0"/>
+              </a:rPr>
+              <a:t>Bài 5: Viết chương trình:</a:t>
+            </a:r>
+          </a:p>
+          <a:p>
+            <a:pPr lvl="1"/>
+            <a:r>
+              <a:rPr lang="en-US">
+                <a:latin typeface="Arial" panose="020B0604020202020204" pitchFamily="34" charset="0"/>
+                <a:cs typeface="Arial" panose="020B0604020202020204" pitchFamily="34" charset="0"/>
+              </a:rPr>
+              <a:t>Cho phép người dùng nhập bao nhiêu số nguyên tùy thích. Nhưng không chấp nhận nhập trùng số nguyên đã nhập trước đó.</a:t>
+            </a:r>
+          </a:p>
+          <a:p>
+            <a:pPr lvl="1"/>
+            <a:r>
+              <a:rPr lang="en-US">
+                <a:latin typeface="Arial" panose="020B0604020202020204" pitchFamily="34" charset="0"/>
+                <a:cs typeface="Arial" panose="020B0604020202020204" pitchFamily="34" charset="0"/>
+              </a:rPr>
+              <a:t>Người dùng có thể kết thúc việc nhập dữ liệu bằng cách nhập vào chuỗi "xong".</a:t>
+            </a:r>
+          </a:p>
+          <a:p>
+            <a:pPr lvl="1"/>
+            <a:r>
+              <a:rPr lang="en-US">
+                <a:latin typeface="Arial" panose="020B0604020202020204" pitchFamily="34" charset="0"/>
+                <a:cs typeface="Arial" panose="020B0604020202020204" pitchFamily="34" charset="0"/>
+              </a:rPr>
+              <a:t>Sau khi người dùng kết thúc việc nhập dữ liệu, hệ thống yêu cầu người dùng nhập thêm 1 con số nguyên mục tiêu và hãy kiểm tra xem con số nguyên này đã được nhập trước đó bởi người dùng hay chưa ?</a:t>
+            </a:r>
+          </a:p>
+          <a:p>
+            <a:pPr lvl="1"/>
+            <a:r>
+              <a:rPr lang="en-US">
+                <a:latin typeface="Arial" panose="020B0604020202020204" pitchFamily="34" charset="0"/>
+                <a:cs typeface="Arial" panose="020B0604020202020204" pitchFamily="34" charset="0"/>
+              </a:rPr>
+              <a:t>Sau khi kiểm tra, hãy in kết quả kiểm tra ra màn hình để thông báo cho người dùng biết.</a:t>
+            </a:r>
+          </a:p>
+        </p:txBody>
+      </p:sp>
+    </p:spTree>
+    <p:extLst>
+      <p:ext uri="{BB962C8B-B14F-4D97-AF65-F5344CB8AC3E}">
+        <p14:creationId xmlns:p14="http://schemas.microsoft.com/office/powerpoint/2010/main" val="1548084104"/>
+      </p:ext>
+    </p:extLst>
+  </p:cSld>
+  <p:clrMapOvr>
+    <a:masterClrMapping/>
+  </p:clrMapOvr>
+</p:sld>
+</file>
+
+<file path=ppt/slides/slide56.xml><?xml version="1.0" encoding="utf-8"?>
+<p:sld xmlns:a="http://schemas.openxmlformats.org/drawingml/2006/main" xmlns:r="http://schemas.openxmlformats.org/officeDocument/2006/relationships" xmlns:p="http://schemas.openxmlformats.org/presentationml/2006/main">
+  <p:cSld>
+    <p:spTree>
+      <p:nvGrpSpPr>
+        <p:cNvPr id="1" name=""/>
+        <p:cNvGrpSpPr/>
+        <p:nvPr/>
+      </p:nvGrpSpPr>
+      <p:grpSpPr>
+        <a:xfrm>
+          <a:off x="0" y="0"/>
+          <a:ext cx="0" cy="0"/>
+          <a:chOff x="0" y="0"/>
+          <a:chExt cx="0" cy="0"/>
+        </a:xfrm>
+      </p:grpSpPr>
+      <p:sp>
+        <p:nvSpPr>
+          <p:cNvPr id="2" name="Title 1">
+            <a:extLst>
+              <a:ext uri="{FF2B5EF4-FFF2-40B4-BE49-F238E27FC236}">
+                <a16:creationId xmlns:a16="http://schemas.microsoft.com/office/drawing/2014/main" id="{14D7F595-0D8F-4FE6-A3EC-4557A1A457EB}"/>
+              </a:ext>
+            </a:extLst>
+          </p:cNvPr>
+          <p:cNvSpPr>
+            <a:spLocks noGrp="1"/>
+          </p:cNvSpPr>
+          <p:nvPr>
+            <p:ph type="title"/>
+          </p:nvPr>
+        </p:nvSpPr>
+        <p:spPr/>
+        <p:txBody>
+          <a:bodyPr/>
+          <a:lstStyle/>
+          <a:p>
+            <a:r>
+              <a:rPr lang="en-US">
+                <a:latin typeface="Arial" panose="020B0604020202020204" pitchFamily="34" charset="0"/>
+                <a:cs typeface="Arial" panose="020B0604020202020204" pitchFamily="34" charset="0"/>
+              </a:rPr>
+              <a:t>Bài tập thực hành</a:t>
+            </a:r>
+          </a:p>
+        </p:txBody>
+      </p:sp>
+      <p:sp>
+        <p:nvSpPr>
+          <p:cNvPr id="3" name="Content Placeholder 2">
+            <a:extLst>
+              <a:ext uri="{FF2B5EF4-FFF2-40B4-BE49-F238E27FC236}">
+                <a16:creationId xmlns:a16="http://schemas.microsoft.com/office/drawing/2014/main" id="{6337998B-3737-4D43-973D-24B118D723A2}"/>
+              </a:ext>
+            </a:extLst>
+          </p:cNvPr>
+          <p:cNvSpPr>
+            <a:spLocks noGrp="1"/>
+          </p:cNvSpPr>
+          <p:nvPr>
+            <p:ph idx="1"/>
+          </p:nvPr>
+        </p:nvSpPr>
+        <p:spPr>
+          <a:xfrm>
+            <a:off x="1103312" y="2237173"/>
+            <a:ext cx="8946541" cy="4011227"/>
+          </a:xfrm>
+        </p:spPr>
+        <p:txBody>
+          <a:bodyPr/>
+          <a:lstStyle/>
+          <a:p>
+            <a:r>
+              <a:rPr lang="en-US">
+                <a:latin typeface="Arial" panose="020B0604020202020204" pitchFamily="34" charset="0"/>
+                <a:cs typeface="Arial" panose="020B0604020202020204" pitchFamily="34" charset="0"/>
+              </a:rPr>
+              <a:t>Bài 6: Viết chương trình:</a:t>
+            </a:r>
+          </a:p>
+          <a:p>
+            <a:pPr lvl="1"/>
+            <a:r>
+              <a:rPr lang="en-US">
+                <a:latin typeface="Arial" panose="020B0604020202020204" pitchFamily="34" charset="0"/>
+                <a:cs typeface="Arial" panose="020B0604020202020204" pitchFamily="34" charset="0"/>
+              </a:rPr>
+              <a:t>Cho phép người dùng nhập bao nhiêu số nguyên tùy thích. Nhưng không chấp nhận nhập trùng số nguyên đã nhập trước đó.</a:t>
+            </a:r>
+          </a:p>
+          <a:p>
+            <a:pPr lvl="1"/>
+            <a:r>
+              <a:rPr lang="en-US">
+                <a:latin typeface="Arial" panose="020B0604020202020204" pitchFamily="34" charset="0"/>
+                <a:cs typeface="Arial" panose="020B0604020202020204" pitchFamily="34" charset="0"/>
+              </a:rPr>
+              <a:t>Người dùng có thể kết thúc việc nhập dữ liệu bằng cách nhập vào chuỗi "xong".</a:t>
+            </a:r>
+          </a:p>
+          <a:p>
+            <a:pPr lvl="1"/>
+            <a:r>
+              <a:rPr lang="en-US">
+                <a:latin typeface="Arial" panose="020B0604020202020204" pitchFamily="34" charset="0"/>
+                <a:cs typeface="Arial" panose="020B0604020202020204" pitchFamily="34" charset="0"/>
+              </a:rPr>
+              <a:t>Sau khi người dùng kết thúc việc nhập dữ liệu, hệ thống yêu cầu người dùng nhập thêm 1 con số nguyên mục tiêu và hãy kiểm tra xem con số nguyên này đã được nhập vào lần nhập thứ mấy của người dùng.</a:t>
+            </a:r>
+          </a:p>
+          <a:p>
+            <a:pPr lvl="1"/>
+            <a:r>
+              <a:rPr lang="en-US">
+                <a:latin typeface="Arial" panose="020B0604020202020204" pitchFamily="34" charset="0"/>
+                <a:cs typeface="Arial" panose="020B0604020202020204" pitchFamily="34" charset="0"/>
+              </a:rPr>
+              <a:t>Trường hợp chưa nhập, cũng xuất thông báo cho người dùng biết.</a:t>
+            </a:r>
+          </a:p>
+          <a:p>
+            <a:pPr lvl="1"/>
+            <a:r>
+              <a:rPr lang="en-US">
+                <a:latin typeface="Arial" panose="020B0604020202020204" pitchFamily="34" charset="0"/>
+                <a:cs typeface="Arial" panose="020B0604020202020204" pitchFamily="34" charset="0"/>
+              </a:rPr>
+              <a:t>Sau khi kiểm tra, hãy in kết quả kiểm tra ra màn hình để thông báo cho người dùng biết.</a:t>
+            </a:r>
+          </a:p>
+        </p:txBody>
+      </p:sp>
+    </p:spTree>
+    <p:extLst>
+      <p:ext uri="{BB962C8B-B14F-4D97-AF65-F5344CB8AC3E}">
+        <p14:creationId xmlns:p14="http://schemas.microsoft.com/office/powerpoint/2010/main" val="642868837"/>
+      </p:ext>
+    </p:extLst>
+  </p:cSld>
+  <p:clrMapOvr>
+    <a:masterClrMapping/>
+  </p:clrMapOvr>
+</p:sld>
+</file>
+
+<file path=ppt/slides/slide57.xml><?xml version="1.0" encoding="utf-8"?>
+<p:sld xmlns:a="http://schemas.openxmlformats.org/drawingml/2006/main" xmlns:r="http://schemas.openxmlformats.org/officeDocument/2006/relationships" xmlns:p="http://schemas.openxmlformats.org/presentationml/2006/main">
+  <p:cSld>
+    <p:spTree>
+      <p:nvGrpSpPr>
+        <p:cNvPr id="1" name=""/>
+        <p:cNvGrpSpPr/>
+        <p:nvPr/>
+      </p:nvGrpSpPr>
+      <p:grpSpPr>
+        <a:xfrm>
+          <a:off x="0" y="0"/>
+          <a:ext cx="0" cy="0"/>
+          <a:chOff x="0" y="0"/>
+          <a:chExt cx="0" cy="0"/>
+        </a:xfrm>
+      </p:grpSpPr>
+      <p:sp>
+        <p:nvSpPr>
+          <p:cNvPr id="2" name="Title 1">
+            <a:extLst>
+              <a:ext uri="{FF2B5EF4-FFF2-40B4-BE49-F238E27FC236}">
+                <a16:creationId xmlns:a16="http://schemas.microsoft.com/office/drawing/2014/main" id="{14D7F595-0D8F-4FE6-A3EC-4557A1A457EB}"/>
+              </a:ext>
+            </a:extLst>
+          </p:cNvPr>
+          <p:cNvSpPr>
+            <a:spLocks noGrp="1"/>
+          </p:cNvSpPr>
+          <p:nvPr>
+            <p:ph type="title"/>
+          </p:nvPr>
+        </p:nvSpPr>
+        <p:spPr/>
+        <p:txBody>
+          <a:bodyPr/>
+          <a:lstStyle/>
+          <a:p>
+            <a:r>
+              <a:rPr lang="en-US">
+                <a:latin typeface="Arial" panose="020B0604020202020204" pitchFamily="34" charset="0"/>
+                <a:cs typeface="Arial" panose="020B0604020202020204" pitchFamily="34" charset="0"/>
+              </a:rPr>
+              <a:t>Bài tập thực hành</a:t>
+            </a:r>
+          </a:p>
+        </p:txBody>
+      </p:sp>
+      <p:sp>
+        <p:nvSpPr>
+          <p:cNvPr id="3" name="Content Placeholder 2">
+            <a:extLst>
+              <a:ext uri="{FF2B5EF4-FFF2-40B4-BE49-F238E27FC236}">
+                <a16:creationId xmlns:a16="http://schemas.microsoft.com/office/drawing/2014/main" id="{6337998B-3737-4D43-973D-24B118D723A2}"/>
+              </a:ext>
+            </a:extLst>
+          </p:cNvPr>
+          <p:cNvSpPr>
+            <a:spLocks noGrp="1"/>
+          </p:cNvSpPr>
+          <p:nvPr>
+            <p:ph idx="1"/>
+          </p:nvPr>
+        </p:nvSpPr>
+        <p:spPr>
+          <a:xfrm>
+            <a:off x="1103312" y="2237173"/>
+            <a:ext cx="8946541" cy="4011227"/>
+          </a:xfrm>
+        </p:spPr>
+        <p:txBody>
+          <a:bodyPr/>
+          <a:lstStyle/>
+          <a:p>
+            <a:r>
+              <a:rPr lang="en-US">
+                <a:latin typeface="Arial" panose="020B0604020202020204" pitchFamily="34" charset="0"/>
+                <a:cs typeface="Arial" panose="020B0604020202020204" pitchFamily="34" charset="0"/>
+              </a:rPr>
+              <a:t>Bài 7: Viết chương trình:</a:t>
+            </a:r>
+          </a:p>
+          <a:p>
+            <a:pPr lvl="1"/>
+            <a:r>
+              <a:rPr lang="en-US">
+                <a:latin typeface="Arial" panose="020B0604020202020204" pitchFamily="34" charset="0"/>
+                <a:cs typeface="Arial" panose="020B0604020202020204" pitchFamily="34" charset="0"/>
+              </a:rPr>
+              <a:t>Cho phép người dùng lưu trữ điểm của sinh viên với khóa là mã sinh viên (chuỗi) và giá trị lưu là điểm của sinh viên (số thực không thấp hơn 0 và không vượt quá 10).</a:t>
+            </a:r>
+          </a:p>
+          <a:p>
+            <a:pPr lvl="1"/>
+            <a:r>
+              <a:rPr lang="en-US">
+                <a:latin typeface="Arial" panose="020B0604020202020204" pitchFamily="34" charset="0"/>
+                <a:cs typeface="Arial" panose="020B0604020202020204" pitchFamily="34" charset="0"/>
+              </a:rPr>
+              <a:t>Người dùng có thể kết thúc việc nhập dữ bằng việc nhập chuỗi "xong".</a:t>
+            </a:r>
+          </a:p>
+          <a:p>
+            <a:pPr lvl="1"/>
+            <a:r>
+              <a:rPr lang="en-US">
+                <a:latin typeface="Arial" panose="020B0604020202020204" pitchFamily="34" charset="0"/>
+                <a:cs typeface="Arial" panose="020B0604020202020204" pitchFamily="34" charset="0"/>
+              </a:rPr>
+              <a:t>Sau khi việc nhập dữ liệu kết thúc, hệ thống yêu cầu người dùng nhập mã sinh viên mà người dùng muốn kiểm tra điểm.</a:t>
+            </a:r>
+          </a:p>
+          <a:p>
+            <a:pPr lvl="1"/>
+            <a:r>
+              <a:rPr lang="en-US">
+                <a:latin typeface="Arial" panose="020B0604020202020204" pitchFamily="34" charset="0"/>
+                <a:cs typeface="Arial" panose="020B0604020202020204" pitchFamily="34" charset="0"/>
+              </a:rPr>
+              <a:t>Sau khi người dùng nhập mã sinh viên, hãy in điểm số của sinh viên đó ra màn hình để thông báo cho người dùng biết.</a:t>
+            </a:r>
+          </a:p>
+          <a:p>
+            <a:pPr lvl="1"/>
+            <a:r>
+              <a:rPr lang="en-US">
+                <a:latin typeface="Arial" panose="020B0604020202020204" pitchFamily="34" charset="0"/>
+                <a:cs typeface="Arial" panose="020B0604020202020204" pitchFamily="34" charset="0"/>
+              </a:rPr>
+              <a:t>Trường hợp sinh viên đó chưa được nhập điểm, hãy xuất thông báo ra để thông báo cho người dùng biết về việc này.</a:t>
+            </a:r>
+          </a:p>
+        </p:txBody>
+      </p:sp>
+    </p:spTree>
+    <p:extLst>
+      <p:ext uri="{BB962C8B-B14F-4D97-AF65-F5344CB8AC3E}">
+        <p14:creationId xmlns:p14="http://schemas.microsoft.com/office/powerpoint/2010/main" val="409974809"/>
+      </p:ext>
+    </p:extLst>
+  </p:cSld>
+  <p:clrMapOvr>
+    <a:masterClrMapping/>
+  </p:clrMapOvr>
+</p:sld>
+</file>
+
+<file path=ppt/slides/slide58.xml><?xml version="1.0" encoding="utf-8"?>
+<p:sld xmlns:a="http://schemas.openxmlformats.org/drawingml/2006/main" xmlns:r="http://schemas.openxmlformats.org/officeDocument/2006/relationships" xmlns:p="http://schemas.openxmlformats.org/presentationml/2006/main">
+  <p:cSld>
+    <p:spTree>
+      <p:nvGrpSpPr>
+        <p:cNvPr id="1" name=""/>
+        <p:cNvGrpSpPr/>
+        <p:nvPr/>
+      </p:nvGrpSpPr>
+      <p:grpSpPr>
+        <a:xfrm>
+          <a:off x="0" y="0"/>
+          <a:ext cx="0" cy="0"/>
+          <a:chOff x="0" y="0"/>
+          <a:chExt cx="0" cy="0"/>
+        </a:xfrm>
+      </p:grpSpPr>
+      <p:sp>
+        <p:nvSpPr>
+          <p:cNvPr id="2" name="Title 1">
+            <a:extLst>
+              <a:ext uri="{FF2B5EF4-FFF2-40B4-BE49-F238E27FC236}">
+                <a16:creationId xmlns:a16="http://schemas.microsoft.com/office/drawing/2014/main" id="{14D7F595-0D8F-4FE6-A3EC-4557A1A457EB}"/>
+              </a:ext>
+            </a:extLst>
+          </p:cNvPr>
+          <p:cNvSpPr>
+            <a:spLocks noGrp="1"/>
+          </p:cNvSpPr>
+          <p:nvPr>
+            <p:ph type="title"/>
+          </p:nvPr>
+        </p:nvSpPr>
+        <p:spPr/>
+        <p:txBody>
+          <a:bodyPr/>
+          <a:lstStyle/>
+          <a:p>
+            <a:r>
+              <a:rPr lang="en-US">
+                <a:latin typeface="Arial" panose="020B0604020202020204" pitchFamily="34" charset="0"/>
+                <a:cs typeface="Arial" panose="020B0604020202020204" pitchFamily="34" charset="0"/>
+              </a:rPr>
+              <a:t>Bài tập thực hành</a:t>
+            </a:r>
+          </a:p>
+        </p:txBody>
+      </p:sp>
+      <p:sp>
+        <p:nvSpPr>
+          <p:cNvPr id="3" name="Content Placeholder 2">
+            <a:extLst>
+              <a:ext uri="{FF2B5EF4-FFF2-40B4-BE49-F238E27FC236}">
+                <a16:creationId xmlns:a16="http://schemas.microsoft.com/office/drawing/2014/main" id="{6337998B-3737-4D43-973D-24B118D723A2}"/>
+              </a:ext>
+            </a:extLst>
+          </p:cNvPr>
+          <p:cNvSpPr>
+            <a:spLocks noGrp="1"/>
+          </p:cNvSpPr>
+          <p:nvPr>
+            <p:ph idx="1"/>
+          </p:nvPr>
+        </p:nvSpPr>
+        <p:spPr>
+          <a:xfrm>
+            <a:off x="1103312" y="2237173"/>
+            <a:ext cx="8946541" cy="4011227"/>
+          </a:xfrm>
+        </p:spPr>
+        <p:txBody>
+          <a:bodyPr/>
+          <a:lstStyle/>
+          <a:p>
+            <a:r>
+              <a:rPr lang="en-US">
+                <a:latin typeface="Arial" panose="020B0604020202020204" pitchFamily="34" charset="0"/>
+                <a:cs typeface="Arial" panose="020B0604020202020204" pitchFamily="34" charset="0"/>
+              </a:rPr>
+              <a:t>Bài 8: Viết chương trình:</a:t>
+            </a:r>
+          </a:p>
+          <a:p>
+            <a:pPr lvl="1"/>
+            <a:r>
+              <a:rPr lang="en-US">
+                <a:latin typeface="Arial" panose="020B0604020202020204" pitchFamily="34" charset="0"/>
+                <a:cs typeface="Arial" panose="020B0604020202020204" pitchFamily="34" charset="0"/>
+              </a:rPr>
+              <a:t>Yêu cầu người dùng nhập vào một chuỗi ngày theo định dạng: &lt;Ngày&gt;/&lt;Tháng&gt;/&lt;Năm&gt;</a:t>
+            </a:r>
+          </a:p>
+          <a:p>
+            <a:pPr lvl="1"/>
+            <a:r>
+              <a:rPr lang="en-US">
+                <a:latin typeface="Arial" panose="020B0604020202020204" pitchFamily="34" charset="0"/>
+                <a:cs typeface="Arial" panose="020B0604020202020204" pitchFamily="34" charset="0"/>
+              </a:rPr>
+              <a:t>Nếu người dùng nhập đúng định dạng, hãy in ra cho người dùng biết ngày, tháng và năm mà người dùng nhập là bao nhiêu.</a:t>
+            </a:r>
+          </a:p>
+          <a:p>
+            <a:pPr lvl="1"/>
+            <a:r>
+              <a:rPr lang="en-US">
+                <a:latin typeface="Arial" panose="020B0604020202020204" pitchFamily="34" charset="0"/>
+                <a:cs typeface="Arial" panose="020B0604020202020204" pitchFamily="34" charset="0"/>
+              </a:rPr>
+              <a:t>Nếu người dùng nhập không đúng định dạng, xuất ra dòng thông báo và yêu cầu người dùng nhập lại cho đến khi người dùng nhập đúng.</a:t>
+            </a:r>
+          </a:p>
+        </p:txBody>
+      </p:sp>
+    </p:spTree>
+    <p:extLst>
+      <p:ext uri="{BB962C8B-B14F-4D97-AF65-F5344CB8AC3E}">
+        <p14:creationId xmlns:p14="http://schemas.microsoft.com/office/powerpoint/2010/main" val="597969115"/>
+      </p:ext>
+    </p:extLst>
+  </p:cSld>
+  <p:clrMapOvr>
+    <a:masterClrMapping/>
+  </p:clrMapOvr>
+</p:sld>
+</file>
+
+<file path=ppt/slides/slide59.xml><?xml version="1.0" encoding="utf-8"?>
+<p:sld xmlns:a="http://schemas.openxmlformats.org/drawingml/2006/main" xmlns:r="http://schemas.openxmlformats.org/officeDocument/2006/relationships" xmlns:p="http://schemas.openxmlformats.org/presentationml/2006/main">
+  <p:cSld>
+    <p:spTree>
+      <p:nvGrpSpPr>
+        <p:cNvPr id="1" name=""/>
+        <p:cNvGrpSpPr/>
+        <p:nvPr/>
+      </p:nvGrpSpPr>
+      <p:grpSpPr>
+        <a:xfrm>
+          <a:off x="0" y="0"/>
+          <a:ext cx="0" cy="0"/>
+          <a:chOff x="0" y="0"/>
+          <a:chExt cx="0" cy="0"/>
+        </a:xfrm>
+      </p:grpSpPr>
+      <p:sp>
+        <p:nvSpPr>
+          <p:cNvPr id="2" name="Title 1">
+            <a:extLst>
+              <a:ext uri="{FF2B5EF4-FFF2-40B4-BE49-F238E27FC236}">
+                <a16:creationId xmlns:a16="http://schemas.microsoft.com/office/drawing/2014/main" id="{14D7F595-0D8F-4FE6-A3EC-4557A1A457EB}"/>
+              </a:ext>
+            </a:extLst>
+          </p:cNvPr>
+          <p:cNvSpPr>
+            <a:spLocks noGrp="1"/>
+          </p:cNvSpPr>
+          <p:nvPr>
+            <p:ph type="title"/>
+          </p:nvPr>
+        </p:nvSpPr>
+        <p:spPr/>
+        <p:txBody>
+          <a:bodyPr/>
+          <a:lstStyle/>
+          <a:p>
+            <a:r>
+              <a:rPr lang="en-US">
+                <a:latin typeface="Arial" panose="020B0604020202020204" pitchFamily="34" charset="0"/>
+                <a:cs typeface="Arial" panose="020B0604020202020204" pitchFamily="34" charset="0"/>
+              </a:rPr>
+              <a:t>Bài tập thực hành</a:t>
+            </a:r>
+          </a:p>
+        </p:txBody>
+      </p:sp>
+      <p:sp>
+        <p:nvSpPr>
+          <p:cNvPr id="3" name="Content Placeholder 2">
+            <a:extLst>
+              <a:ext uri="{FF2B5EF4-FFF2-40B4-BE49-F238E27FC236}">
+                <a16:creationId xmlns:a16="http://schemas.microsoft.com/office/drawing/2014/main" id="{6337998B-3737-4D43-973D-24B118D723A2}"/>
+              </a:ext>
+            </a:extLst>
+          </p:cNvPr>
+          <p:cNvSpPr>
+            <a:spLocks noGrp="1"/>
+          </p:cNvSpPr>
+          <p:nvPr>
+            <p:ph idx="1"/>
+          </p:nvPr>
+        </p:nvSpPr>
+        <p:spPr>
+          <a:xfrm>
+            <a:off x="1103312" y="2237173"/>
+            <a:ext cx="8946541" cy="4011227"/>
+          </a:xfrm>
+        </p:spPr>
+        <p:txBody>
+          <a:bodyPr/>
+          <a:lstStyle/>
+          <a:p>
+            <a:r>
+              <a:rPr lang="en-US">
+                <a:latin typeface="Arial" panose="020B0604020202020204" pitchFamily="34" charset="0"/>
+                <a:cs typeface="Arial" panose="020B0604020202020204" pitchFamily="34" charset="0"/>
+              </a:rPr>
+              <a:t>Bài 9: Viết chương trình:</a:t>
+            </a:r>
+          </a:p>
+          <a:p>
+            <a:pPr lvl="1"/>
+            <a:r>
+              <a:rPr lang="en-US">
+                <a:latin typeface="Arial" panose="020B0604020202020204" pitchFamily="34" charset="0"/>
+                <a:cs typeface="Arial" panose="020B0604020202020204" pitchFamily="34" charset="0"/>
+              </a:rPr>
+              <a:t>Yêu cầu người dùng nhập vào một chuỗi giờ theo định dạng: &lt;Giờ&gt;:&lt;Phút&gt;:&lt;Giây&gt;</a:t>
+            </a:r>
+          </a:p>
+          <a:p>
+            <a:pPr lvl="1"/>
+            <a:r>
+              <a:rPr lang="en-US">
+                <a:latin typeface="Arial" panose="020B0604020202020204" pitchFamily="34" charset="0"/>
+                <a:cs typeface="Arial" panose="020B0604020202020204" pitchFamily="34" charset="0"/>
+              </a:rPr>
+              <a:t>Nếu người dùng nhập đúng định dạng, hãy in ra cho người dùng biết giờ, phút và giây mà người dùng nhập là bao nhiêu.</a:t>
+            </a:r>
+          </a:p>
+          <a:p>
+            <a:pPr lvl="1"/>
+            <a:r>
+              <a:rPr lang="en-US">
+                <a:latin typeface="Arial" panose="020B0604020202020204" pitchFamily="34" charset="0"/>
+                <a:cs typeface="Arial" panose="020B0604020202020204" pitchFamily="34" charset="0"/>
+              </a:rPr>
+              <a:t>Nếu người dùng nhập không đúng định dạng, xuất ra dòng thông báo và yêu cầu người dùng nhập lại cho đến khi người dùng nhập đúng.</a:t>
+            </a:r>
+          </a:p>
+        </p:txBody>
+      </p:sp>
+    </p:spTree>
+    <p:extLst>
+      <p:ext uri="{BB962C8B-B14F-4D97-AF65-F5344CB8AC3E}">
+        <p14:creationId xmlns:p14="http://schemas.microsoft.com/office/powerpoint/2010/main" val="523734597"/>
+      </p:ext>
+    </p:extLst>
+  </p:cSld>
+  <p:clrMapOvr>
+    <a:masterClrMapping/>
+  </p:clrMapOvr>
+</p:sld>
+</file>
+
 <file path=ppt/slides/slide6.xml><?xml version="1.0" encoding="utf-8"?>
 <p:sld xmlns:a="http://schemas.openxmlformats.org/drawingml/2006/main" xmlns:r="http://schemas.openxmlformats.org/officeDocument/2006/relationships" xmlns:p="http://schemas.openxmlformats.org/presentationml/2006/main">
   <p:cSld>
@@ -12312,6 +13547,407 @@
     <p:extLst>
       <p:ext uri="{BB962C8B-B14F-4D97-AF65-F5344CB8AC3E}">
         <p14:creationId xmlns:p14="http://schemas.microsoft.com/office/powerpoint/2010/main" val="1960682356"/>
+      </p:ext>
+    </p:extLst>
+  </p:cSld>
+  <p:clrMapOvr>
+    <a:masterClrMapping/>
+  </p:clrMapOvr>
+</p:sld>
+</file>
+
+<file path=ppt/slides/slide60.xml><?xml version="1.0" encoding="utf-8"?>
+<p:sld xmlns:a="http://schemas.openxmlformats.org/drawingml/2006/main" xmlns:r="http://schemas.openxmlformats.org/officeDocument/2006/relationships" xmlns:p="http://schemas.openxmlformats.org/presentationml/2006/main">
+  <p:cSld>
+    <p:spTree>
+      <p:nvGrpSpPr>
+        <p:cNvPr id="1" name=""/>
+        <p:cNvGrpSpPr/>
+        <p:nvPr/>
+      </p:nvGrpSpPr>
+      <p:grpSpPr>
+        <a:xfrm>
+          <a:off x="0" y="0"/>
+          <a:ext cx="0" cy="0"/>
+          <a:chOff x="0" y="0"/>
+          <a:chExt cx="0" cy="0"/>
+        </a:xfrm>
+      </p:grpSpPr>
+      <p:sp>
+        <p:nvSpPr>
+          <p:cNvPr id="2" name="Title 1">
+            <a:extLst>
+              <a:ext uri="{FF2B5EF4-FFF2-40B4-BE49-F238E27FC236}">
+                <a16:creationId xmlns:a16="http://schemas.microsoft.com/office/drawing/2014/main" id="{14D7F595-0D8F-4FE6-A3EC-4557A1A457EB}"/>
+              </a:ext>
+            </a:extLst>
+          </p:cNvPr>
+          <p:cNvSpPr>
+            <a:spLocks noGrp="1"/>
+          </p:cNvSpPr>
+          <p:nvPr>
+            <p:ph type="title"/>
+          </p:nvPr>
+        </p:nvSpPr>
+        <p:spPr/>
+        <p:txBody>
+          <a:bodyPr/>
+          <a:lstStyle/>
+          <a:p>
+            <a:r>
+              <a:rPr lang="en-US">
+                <a:latin typeface="Arial" panose="020B0604020202020204" pitchFamily="34" charset="0"/>
+                <a:cs typeface="Arial" panose="020B0604020202020204" pitchFamily="34" charset="0"/>
+              </a:rPr>
+              <a:t>Bài tập thực hành</a:t>
+            </a:r>
+          </a:p>
+        </p:txBody>
+      </p:sp>
+      <p:sp>
+        <p:nvSpPr>
+          <p:cNvPr id="3" name="Content Placeholder 2">
+            <a:extLst>
+              <a:ext uri="{FF2B5EF4-FFF2-40B4-BE49-F238E27FC236}">
+                <a16:creationId xmlns:a16="http://schemas.microsoft.com/office/drawing/2014/main" id="{6337998B-3737-4D43-973D-24B118D723A2}"/>
+              </a:ext>
+            </a:extLst>
+          </p:cNvPr>
+          <p:cNvSpPr>
+            <a:spLocks noGrp="1"/>
+          </p:cNvSpPr>
+          <p:nvPr>
+            <p:ph idx="1"/>
+          </p:nvPr>
+        </p:nvSpPr>
+        <p:spPr>
+          <a:xfrm>
+            <a:off x="1103312" y="2237173"/>
+            <a:ext cx="8946541" cy="4011227"/>
+          </a:xfrm>
+        </p:spPr>
+        <p:txBody>
+          <a:bodyPr/>
+          <a:lstStyle/>
+          <a:p>
+            <a:r>
+              <a:rPr lang="en-US">
+                <a:latin typeface="Arial" panose="020B0604020202020204" pitchFamily="34" charset="0"/>
+                <a:cs typeface="Arial" panose="020B0604020202020204" pitchFamily="34" charset="0"/>
+              </a:rPr>
+              <a:t>Bài 10: Viết chương trình:</a:t>
+            </a:r>
+          </a:p>
+          <a:p>
+            <a:pPr lvl="1"/>
+            <a:r>
+              <a:rPr lang="en-US">
+                <a:latin typeface="Arial" panose="020B0604020202020204" pitchFamily="34" charset="0"/>
+                <a:cs typeface="Arial" panose="020B0604020202020204" pitchFamily="34" charset="0"/>
+              </a:rPr>
+              <a:t>Yêu cầu người dùng nhập vào một chuỗi ngày, giờ theo định dạng:  &lt;Ngày&gt;/&lt;Tháng&gt;/&lt;Năm&gt; &lt;Giờ&gt;:&lt;Phút&gt;:&lt;Giây&gt;</a:t>
+            </a:r>
+          </a:p>
+          <a:p>
+            <a:pPr lvl="1"/>
+            <a:r>
+              <a:rPr lang="en-US">
+                <a:latin typeface="Arial" panose="020B0604020202020204" pitchFamily="34" charset="0"/>
+                <a:cs typeface="Arial" panose="020B0604020202020204" pitchFamily="34" charset="0"/>
+              </a:rPr>
+              <a:t>Nếu người dùng nhập đúng định dạng, hãy in ra cho người dùng biết ngày, tháng, năm, giờ, phút và giây mà người dùng nhập là bao nhiêu.</a:t>
+            </a:r>
+          </a:p>
+          <a:p>
+            <a:pPr lvl="1"/>
+            <a:r>
+              <a:rPr lang="en-US">
+                <a:latin typeface="Arial" panose="020B0604020202020204" pitchFamily="34" charset="0"/>
+                <a:cs typeface="Arial" panose="020B0604020202020204" pitchFamily="34" charset="0"/>
+              </a:rPr>
+              <a:t>Nếu người dùng nhập không đúng định dạng, xuất ra dòng thông báo và yêu cầu người dùng nhập lại cho đến khi người dùng nhập đúng.</a:t>
+            </a:r>
+          </a:p>
+        </p:txBody>
+      </p:sp>
+    </p:spTree>
+    <p:extLst>
+      <p:ext uri="{BB962C8B-B14F-4D97-AF65-F5344CB8AC3E}">
+        <p14:creationId xmlns:p14="http://schemas.microsoft.com/office/powerpoint/2010/main" val="602283066"/>
+      </p:ext>
+    </p:extLst>
+  </p:cSld>
+  <p:clrMapOvr>
+    <a:masterClrMapping/>
+  </p:clrMapOvr>
+</p:sld>
+</file>
+
+<file path=ppt/slides/slide61.xml><?xml version="1.0" encoding="utf-8"?>
+<p:sld xmlns:a="http://schemas.openxmlformats.org/drawingml/2006/main" xmlns:r="http://schemas.openxmlformats.org/officeDocument/2006/relationships" xmlns:p="http://schemas.openxmlformats.org/presentationml/2006/main">
+  <p:cSld>
+    <p:spTree>
+      <p:nvGrpSpPr>
+        <p:cNvPr id="1" name=""/>
+        <p:cNvGrpSpPr/>
+        <p:nvPr/>
+      </p:nvGrpSpPr>
+      <p:grpSpPr>
+        <a:xfrm>
+          <a:off x="0" y="0"/>
+          <a:ext cx="0" cy="0"/>
+          <a:chOff x="0" y="0"/>
+          <a:chExt cx="0" cy="0"/>
+        </a:xfrm>
+      </p:grpSpPr>
+      <p:sp>
+        <p:nvSpPr>
+          <p:cNvPr id="2" name="Title 1">
+            <a:extLst>
+              <a:ext uri="{FF2B5EF4-FFF2-40B4-BE49-F238E27FC236}">
+                <a16:creationId xmlns:a16="http://schemas.microsoft.com/office/drawing/2014/main" id="{14D7F595-0D8F-4FE6-A3EC-4557A1A457EB}"/>
+              </a:ext>
+            </a:extLst>
+          </p:cNvPr>
+          <p:cNvSpPr>
+            <a:spLocks noGrp="1"/>
+          </p:cNvSpPr>
+          <p:nvPr>
+            <p:ph type="title"/>
+          </p:nvPr>
+        </p:nvSpPr>
+        <p:spPr/>
+        <p:txBody>
+          <a:bodyPr/>
+          <a:lstStyle/>
+          <a:p>
+            <a:r>
+              <a:rPr lang="en-US">
+                <a:latin typeface="Arial" panose="020B0604020202020204" pitchFamily="34" charset="0"/>
+                <a:cs typeface="Arial" panose="020B0604020202020204" pitchFamily="34" charset="0"/>
+              </a:rPr>
+              <a:t>Bài tập thực hành</a:t>
+            </a:r>
+          </a:p>
+        </p:txBody>
+      </p:sp>
+      <p:sp>
+        <p:nvSpPr>
+          <p:cNvPr id="3" name="Content Placeholder 2">
+            <a:extLst>
+              <a:ext uri="{FF2B5EF4-FFF2-40B4-BE49-F238E27FC236}">
+                <a16:creationId xmlns:a16="http://schemas.microsoft.com/office/drawing/2014/main" id="{6337998B-3737-4D43-973D-24B118D723A2}"/>
+              </a:ext>
+            </a:extLst>
+          </p:cNvPr>
+          <p:cNvSpPr>
+            <a:spLocks noGrp="1"/>
+          </p:cNvSpPr>
+          <p:nvPr>
+            <p:ph idx="1"/>
+          </p:nvPr>
+        </p:nvSpPr>
+        <p:spPr>
+          <a:xfrm>
+            <a:off x="1103312" y="2237173"/>
+            <a:ext cx="8946541" cy="4011227"/>
+          </a:xfrm>
+        </p:spPr>
+        <p:txBody>
+          <a:bodyPr/>
+          <a:lstStyle/>
+          <a:p>
+            <a:r>
+              <a:rPr lang="en-US">
+                <a:latin typeface="Arial" panose="020B0604020202020204" pitchFamily="34" charset="0"/>
+                <a:cs typeface="Arial" panose="020B0604020202020204" pitchFamily="34" charset="0"/>
+              </a:rPr>
+              <a:t>Bài 11: Viết chương trình:</a:t>
+            </a:r>
+          </a:p>
+          <a:p>
+            <a:pPr lvl="1"/>
+            <a:r>
+              <a:rPr lang="en-US">
+                <a:latin typeface="Arial" panose="020B0604020202020204" pitchFamily="34" charset="0"/>
+                <a:cs typeface="Arial" panose="020B0604020202020204" pitchFamily="34" charset="0"/>
+              </a:rPr>
+              <a:t>Yêu cầu người dùng nhập vào ngày, tháng và năm (nhập dưới dạng số nguyên).</a:t>
+            </a:r>
+          </a:p>
+          <a:p>
+            <a:pPr lvl="1"/>
+            <a:r>
+              <a:rPr lang="en-US">
+                <a:latin typeface="Arial" panose="020B0604020202020204" pitchFamily="34" charset="0"/>
+                <a:cs typeface="Arial" panose="020B0604020202020204" pitchFamily="34" charset="0"/>
+              </a:rPr>
+              <a:t>Nếu những gì người dùng nhập là hợp lệ, sau đó hãy in ngày, tháng và năm do người dùng nhập ra theo định dạng:</a:t>
+            </a:r>
+          </a:p>
+          <a:p>
+            <a:pPr lvl="2"/>
+            <a:r>
+              <a:rPr lang="en-US">
+                <a:latin typeface="Arial" panose="020B0604020202020204" pitchFamily="34" charset="0"/>
+                <a:cs typeface="Arial" panose="020B0604020202020204" pitchFamily="34" charset="0"/>
+              </a:rPr>
+              <a:t>&lt;Ngày&gt;/&lt;Tháng&gt;/&lt;Năm&gt;</a:t>
+            </a:r>
+          </a:p>
+          <a:p>
+            <a:pPr lvl="1"/>
+            <a:r>
+              <a:rPr lang="en-US">
+                <a:latin typeface="Arial" panose="020B0604020202020204" pitchFamily="34" charset="0"/>
+                <a:cs typeface="Arial" panose="020B0604020202020204" pitchFamily="34" charset="0"/>
+              </a:rPr>
+              <a:t>Nếu người dùng nhập không hợp lệ, hãy in thông báo ra màn hình để thông báo cho người dùng biết.</a:t>
+            </a:r>
+          </a:p>
+        </p:txBody>
+      </p:sp>
+    </p:spTree>
+    <p:extLst>
+      <p:ext uri="{BB962C8B-B14F-4D97-AF65-F5344CB8AC3E}">
+        <p14:creationId xmlns:p14="http://schemas.microsoft.com/office/powerpoint/2010/main" val="579295438"/>
+      </p:ext>
+    </p:extLst>
+  </p:cSld>
+  <p:clrMapOvr>
+    <a:masterClrMapping/>
+  </p:clrMapOvr>
+</p:sld>
+</file>
+
+<file path=ppt/slides/slide62.xml><?xml version="1.0" encoding="utf-8"?>
+<p:sld xmlns:a="http://schemas.openxmlformats.org/drawingml/2006/main" xmlns:r="http://schemas.openxmlformats.org/officeDocument/2006/relationships" xmlns:p="http://schemas.openxmlformats.org/presentationml/2006/main">
+  <p:cSld>
+    <p:spTree>
+      <p:nvGrpSpPr>
+        <p:cNvPr id="1" name=""/>
+        <p:cNvGrpSpPr/>
+        <p:nvPr/>
+      </p:nvGrpSpPr>
+      <p:grpSpPr>
+        <a:xfrm>
+          <a:off x="0" y="0"/>
+          <a:ext cx="0" cy="0"/>
+          <a:chOff x="0" y="0"/>
+          <a:chExt cx="0" cy="0"/>
+        </a:xfrm>
+      </p:grpSpPr>
+      <p:sp>
+        <p:nvSpPr>
+          <p:cNvPr id="2" name="Title 1">
+            <a:extLst>
+              <a:ext uri="{FF2B5EF4-FFF2-40B4-BE49-F238E27FC236}">
+                <a16:creationId xmlns:a16="http://schemas.microsoft.com/office/drawing/2014/main" id="{14D7F595-0D8F-4FE6-A3EC-4557A1A457EB}"/>
+              </a:ext>
+            </a:extLst>
+          </p:cNvPr>
+          <p:cNvSpPr>
+            <a:spLocks noGrp="1"/>
+          </p:cNvSpPr>
+          <p:nvPr>
+            <p:ph type="title"/>
+          </p:nvPr>
+        </p:nvSpPr>
+        <p:spPr/>
+        <p:txBody>
+          <a:bodyPr/>
+          <a:lstStyle/>
+          <a:p>
+            <a:r>
+              <a:rPr lang="en-US">
+                <a:latin typeface="Arial" panose="020B0604020202020204" pitchFamily="34" charset="0"/>
+                <a:cs typeface="Arial" panose="020B0604020202020204" pitchFamily="34" charset="0"/>
+              </a:rPr>
+              <a:t>Bài tập thực hành</a:t>
+            </a:r>
+          </a:p>
+        </p:txBody>
+      </p:sp>
+      <p:sp>
+        <p:nvSpPr>
+          <p:cNvPr id="3" name="Content Placeholder 2">
+            <a:extLst>
+              <a:ext uri="{FF2B5EF4-FFF2-40B4-BE49-F238E27FC236}">
+                <a16:creationId xmlns:a16="http://schemas.microsoft.com/office/drawing/2014/main" id="{6337998B-3737-4D43-973D-24B118D723A2}"/>
+              </a:ext>
+            </a:extLst>
+          </p:cNvPr>
+          <p:cNvSpPr>
+            <a:spLocks noGrp="1"/>
+          </p:cNvSpPr>
+          <p:nvPr>
+            <p:ph idx="1"/>
+          </p:nvPr>
+        </p:nvSpPr>
+        <p:spPr>
+          <a:xfrm>
+            <a:off x="1103312" y="2237173"/>
+            <a:ext cx="8946541" cy="4011227"/>
+          </a:xfrm>
+        </p:spPr>
+        <p:txBody>
+          <a:bodyPr/>
+          <a:lstStyle/>
+          <a:p>
+            <a:r>
+              <a:rPr lang="en-US">
+                <a:latin typeface="Arial" panose="020B0604020202020204" pitchFamily="34" charset="0"/>
+                <a:cs typeface="Arial" panose="020B0604020202020204" pitchFamily="34" charset="0"/>
+              </a:rPr>
+              <a:t>Bài 12: Viết chương trình:</a:t>
+            </a:r>
+          </a:p>
+          <a:p>
+            <a:pPr lvl="1"/>
+            <a:r>
+              <a:rPr lang="en-US">
+                <a:latin typeface="Arial" panose="020B0604020202020204" pitchFamily="34" charset="0"/>
+                <a:cs typeface="Arial" panose="020B0604020202020204" pitchFamily="34" charset="0"/>
+              </a:rPr>
+              <a:t>Yêu cầu người dùng nhập vào giờ, phút và giây (nhập dưới dạng số nguyên).</a:t>
+            </a:r>
+          </a:p>
+          <a:p>
+            <a:pPr lvl="1"/>
+            <a:r>
+              <a:rPr lang="en-US">
+                <a:latin typeface="Arial" panose="020B0604020202020204" pitchFamily="34" charset="0"/>
+                <a:cs typeface="Arial" panose="020B0604020202020204" pitchFamily="34" charset="0"/>
+              </a:rPr>
+              <a:t>Nếu những gì người dùng nhập là hợp lệ, sau đó hãy in giờ, phút và giây do người dùng nhập ra theo định dạng:</a:t>
+            </a:r>
+          </a:p>
+          <a:p>
+            <a:pPr lvl="2"/>
+            <a:r>
+              <a:rPr lang="en-US">
+                <a:latin typeface="Arial" panose="020B0604020202020204" pitchFamily="34" charset="0"/>
+                <a:cs typeface="Arial" panose="020B0604020202020204" pitchFamily="34" charset="0"/>
+              </a:rPr>
+              <a:t>&lt;Giờ&gt;:&lt;Phút&gt;:&lt;Giây&gt;</a:t>
+            </a:r>
+          </a:p>
+          <a:p>
+            <a:pPr lvl="1"/>
+            <a:r>
+              <a:rPr lang="en-US">
+                <a:latin typeface="Arial" panose="020B0604020202020204" pitchFamily="34" charset="0"/>
+                <a:cs typeface="Arial" panose="020B0604020202020204" pitchFamily="34" charset="0"/>
+              </a:rPr>
+              <a:t>Nếu người dùng nhập không hợp lệ, hãy in thông báo ra màn hình để thông báo cho người dùng biết.</a:t>
+            </a:r>
+          </a:p>
+        </p:txBody>
+      </p:sp>
+    </p:spTree>
+    <p:extLst>
+      <p:ext uri="{BB962C8B-B14F-4D97-AF65-F5344CB8AC3E}">
+        <p14:creationId xmlns:p14="http://schemas.microsoft.com/office/powerpoint/2010/main" val="2507047621"/>
       </p:ext>
     </p:extLst>
   </p:cSld>

</xml_diff>

<commit_message>
Fixed issues found in Day_4_2 slides.
</commit_message>
<xml_diff>
--- a/Slides/Day_4_2.pptx
+++ b/Slides/Day_4_2.pptx
@@ -17,56 +17,57 @@
     <p:sldId id="278" r:id="rId11"/>
     <p:sldId id="270" r:id="rId12"/>
     <p:sldId id="279" r:id="rId13"/>
-    <p:sldId id="280" r:id="rId14"/>
-    <p:sldId id="281" r:id="rId15"/>
-    <p:sldId id="282" r:id="rId16"/>
-    <p:sldId id="283" r:id="rId17"/>
-    <p:sldId id="284" r:id="rId18"/>
-    <p:sldId id="285" r:id="rId19"/>
-    <p:sldId id="286" r:id="rId20"/>
-    <p:sldId id="302" r:id="rId21"/>
-    <p:sldId id="287" r:id="rId22"/>
-    <p:sldId id="312" r:id="rId23"/>
-    <p:sldId id="288" r:id="rId24"/>
-    <p:sldId id="289" r:id="rId25"/>
-    <p:sldId id="290" r:id="rId26"/>
-    <p:sldId id="291" r:id="rId27"/>
-    <p:sldId id="292" r:id="rId28"/>
-    <p:sldId id="301" r:id="rId29"/>
-    <p:sldId id="294" r:id="rId30"/>
-    <p:sldId id="311" r:id="rId31"/>
-    <p:sldId id="295" r:id="rId32"/>
-    <p:sldId id="296" r:id="rId33"/>
-    <p:sldId id="297" r:id="rId34"/>
-    <p:sldId id="298" r:id="rId35"/>
-    <p:sldId id="299" r:id="rId36"/>
-    <p:sldId id="300" r:id="rId37"/>
-    <p:sldId id="303" r:id="rId38"/>
-    <p:sldId id="310" r:id="rId39"/>
-    <p:sldId id="304" r:id="rId40"/>
-    <p:sldId id="305" r:id="rId41"/>
-    <p:sldId id="306" r:id="rId42"/>
-    <p:sldId id="307" r:id="rId43"/>
-    <p:sldId id="308" r:id="rId44"/>
-    <p:sldId id="309" r:id="rId45"/>
-    <p:sldId id="313" r:id="rId46"/>
-    <p:sldId id="314" r:id="rId47"/>
-    <p:sldId id="315" r:id="rId48"/>
-    <p:sldId id="316" r:id="rId49"/>
-    <p:sldId id="317" r:id="rId50"/>
-    <p:sldId id="318" r:id="rId51"/>
-    <p:sldId id="319" r:id="rId52"/>
-    <p:sldId id="320" r:id="rId53"/>
-    <p:sldId id="321" r:id="rId54"/>
-    <p:sldId id="322" r:id="rId55"/>
-    <p:sldId id="323" r:id="rId56"/>
-    <p:sldId id="324" r:id="rId57"/>
-    <p:sldId id="325" r:id="rId58"/>
-    <p:sldId id="326" r:id="rId59"/>
-    <p:sldId id="327" r:id="rId60"/>
-    <p:sldId id="328" r:id="rId61"/>
-    <p:sldId id="329" r:id="rId62"/>
-    <p:sldId id="330" r:id="rId63"/>
+    <p:sldId id="331" r:id="rId14"/>
+    <p:sldId id="280" r:id="rId15"/>
+    <p:sldId id="281" r:id="rId16"/>
+    <p:sldId id="282" r:id="rId17"/>
+    <p:sldId id="283" r:id="rId18"/>
+    <p:sldId id="284" r:id="rId19"/>
+    <p:sldId id="285" r:id="rId20"/>
+    <p:sldId id="286" r:id="rId21"/>
+    <p:sldId id="302" r:id="rId22"/>
+    <p:sldId id="287" r:id="rId23"/>
+    <p:sldId id="312" r:id="rId24"/>
+    <p:sldId id="288" r:id="rId25"/>
+    <p:sldId id="289" r:id="rId26"/>
+    <p:sldId id="290" r:id="rId27"/>
+    <p:sldId id="291" r:id="rId28"/>
+    <p:sldId id="292" r:id="rId29"/>
+    <p:sldId id="301" r:id="rId30"/>
+    <p:sldId id="294" r:id="rId31"/>
+    <p:sldId id="311" r:id="rId32"/>
+    <p:sldId id="295" r:id="rId33"/>
+    <p:sldId id="296" r:id="rId34"/>
+    <p:sldId id="297" r:id="rId35"/>
+    <p:sldId id="298" r:id="rId36"/>
+    <p:sldId id="299" r:id="rId37"/>
+    <p:sldId id="300" r:id="rId38"/>
+    <p:sldId id="303" r:id="rId39"/>
+    <p:sldId id="310" r:id="rId40"/>
+    <p:sldId id="304" r:id="rId41"/>
+    <p:sldId id="305" r:id="rId42"/>
+    <p:sldId id="306" r:id="rId43"/>
+    <p:sldId id="307" r:id="rId44"/>
+    <p:sldId id="308" r:id="rId45"/>
+    <p:sldId id="309" r:id="rId46"/>
+    <p:sldId id="313" r:id="rId47"/>
+    <p:sldId id="314" r:id="rId48"/>
+    <p:sldId id="315" r:id="rId49"/>
+    <p:sldId id="316" r:id="rId50"/>
+    <p:sldId id="317" r:id="rId51"/>
+    <p:sldId id="318" r:id="rId52"/>
+    <p:sldId id="319" r:id="rId53"/>
+    <p:sldId id="320" r:id="rId54"/>
+    <p:sldId id="321" r:id="rId55"/>
+    <p:sldId id="322" r:id="rId56"/>
+    <p:sldId id="323" r:id="rId57"/>
+    <p:sldId id="324" r:id="rId58"/>
+    <p:sldId id="325" r:id="rId59"/>
+    <p:sldId id="326" r:id="rId60"/>
+    <p:sldId id="327" r:id="rId61"/>
+    <p:sldId id="328" r:id="rId62"/>
+    <p:sldId id="329" r:id="rId63"/>
+    <p:sldId id="330" r:id="rId64"/>
   </p:sldIdLst>
   <p:sldSz cx="12192000" cy="6858000"/>
   <p:notesSz cx="6858000" cy="9144000"/>
@@ -6729,7 +6730,7 @@
                 <a:latin typeface="Arial" panose="020B0604020202020204" pitchFamily="34" charset="0"/>
                 <a:cs typeface="Arial" panose="020B0604020202020204" pitchFamily="34" charset="0"/>
               </a:rPr>
-              <a:t>2.3.1. Khởi tạo Map</a:t>
+              <a:t>2.3. Làm việc với Map</a:t>
             </a:r>
           </a:p>
         </p:txBody>
@@ -6765,17 +6766,17 @@
                 <a:latin typeface="Arial" panose="020B0604020202020204" pitchFamily="34" charset="0"/>
                 <a:cs typeface="Arial" panose="020B0604020202020204" pitchFamily="34" charset="0"/>
               </a:rPr>
-              <a:t>Cú pháp: Map&lt;Kiểu key, Kiểu value&gt; &lt;Tên biến&gt; = new HashMap&lt;&gt;();</a:t>
+              <a:t>Ví dụ: Map bảng điểm sinh viên</a:t>
             </a:r>
           </a:p>
         </p:txBody>
       </p:sp>
       <p:pic>
         <p:nvPicPr>
-          <p:cNvPr id="5" name="Picture 4">
-            <a:extLst>
-              <a:ext uri="{FF2B5EF4-FFF2-40B4-BE49-F238E27FC236}">
-                <a16:creationId xmlns:a16="http://schemas.microsoft.com/office/drawing/2014/main" id="{5BAC7EDD-A6C0-4411-BD78-B8C078B6D8B1}"/>
+          <p:cNvPr id="7" name="Picture 6">
+            <a:extLst>
+              <a:ext uri="{FF2B5EF4-FFF2-40B4-BE49-F238E27FC236}">
+                <a16:creationId xmlns:a16="http://schemas.microsoft.com/office/drawing/2014/main" id="{F646DB7C-E636-4EA4-A597-F3DDC685CAED}"/>
               </a:ext>
             </a:extLst>
           </p:cNvPr>
@@ -6792,8 +6793,8 @@
         </p:blipFill>
         <p:spPr>
           <a:xfrm>
-            <a:off x="2513431" y="2993326"/>
-            <a:ext cx="7165138" cy="3185532"/>
+            <a:off x="3899960" y="2988615"/>
+            <a:ext cx="4392079" cy="3416667"/>
           </a:xfrm>
           <a:prstGeom prst="rect">
             <a:avLst/>
@@ -6803,7 +6804,7 @@
     </p:spTree>
     <p:extLst>
       <p:ext uri="{BB962C8B-B14F-4D97-AF65-F5344CB8AC3E}">
-        <p14:creationId xmlns:p14="http://schemas.microsoft.com/office/powerpoint/2010/main" val="2366092170"/>
+        <p14:creationId xmlns:p14="http://schemas.microsoft.com/office/powerpoint/2010/main" val="2585958917"/>
       </p:ext>
     </p:extLst>
   </p:cSld>
@@ -6856,7 +6857,7 @@
                 <a:latin typeface="Arial" panose="020B0604020202020204" pitchFamily="34" charset="0"/>
                 <a:cs typeface="Arial" panose="020B0604020202020204" pitchFamily="34" charset="0"/>
               </a:rPr>
-              <a:t>2.3.2. Đặt phần tử vào Map</a:t>
+              <a:t>2.3.1. Khởi tạo Map</a:t>
             </a:r>
           </a:p>
         </p:txBody>
@@ -6892,7 +6893,7 @@
                 <a:latin typeface="Arial" panose="020B0604020202020204" pitchFamily="34" charset="0"/>
                 <a:cs typeface="Arial" panose="020B0604020202020204" pitchFamily="34" charset="0"/>
               </a:rPr>
-              <a:t>Cú pháp: &lt;Tên biến&gt;.put(&lt;Key&gt;, &lt;Value&gt;);</a:t>
+              <a:t>Cú pháp: Map&lt;Kiểu key, Kiểu value&gt; &lt;Tên biến&gt; = new HashMap&lt;&gt;();</a:t>
             </a:r>
           </a:p>
         </p:txBody>
@@ -6902,7 +6903,7 @@
           <p:cNvPr id="5" name="Picture 4">
             <a:extLst>
               <a:ext uri="{FF2B5EF4-FFF2-40B4-BE49-F238E27FC236}">
-                <a16:creationId xmlns:a16="http://schemas.microsoft.com/office/drawing/2014/main" id="{38E783AB-7A8B-4747-9C1A-38E6784F395C}"/>
+                <a16:creationId xmlns:a16="http://schemas.microsoft.com/office/drawing/2014/main" id="{5BAC7EDD-A6C0-4411-BD78-B8C078B6D8B1}"/>
               </a:ext>
             </a:extLst>
           </p:cNvPr>
@@ -6919,8 +6920,8 @@
         </p:blipFill>
         <p:spPr>
           <a:xfrm>
-            <a:off x="3154425" y="2926676"/>
-            <a:ext cx="5883150" cy="3368332"/>
+            <a:off x="2513431" y="2993326"/>
+            <a:ext cx="7165138" cy="3185532"/>
           </a:xfrm>
           <a:prstGeom prst="rect">
             <a:avLst/>
@@ -6930,7 +6931,7 @@
     </p:spTree>
     <p:extLst>
       <p:ext uri="{BB962C8B-B14F-4D97-AF65-F5344CB8AC3E}">
-        <p14:creationId xmlns:p14="http://schemas.microsoft.com/office/powerpoint/2010/main" val="3000597972"/>
+        <p14:creationId xmlns:p14="http://schemas.microsoft.com/office/powerpoint/2010/main" val="2366092170"/>
       </p:ext>
     </p:extLst>
   </p:cSld>
@@ -6983,7 +6984,7 @@
                 <a:latin typeface="Arial" panose="020B0604020202020204" pitchFamily="34" charset="0"/>
                 <a:cs typeface="Arial" panose="020B0604020202020204" pitchFamily="34" charset="0"/>
               </a:rPr>
-              <a:t>2.3.3. Duyệt qua tất cả phần tử trong Map</a:t>
+              <a:t>2.3.2. Đặt phần tử vào Map</a:t>
             </a:r>
           </a:p>
         </p:txBody>
@@ -7019,16 +7020,7 @@
                 <a:latin typeface="Arial" panose="020B0604020202020204" pitchFamily="34" charset="0"/>
                 <a:cs typeface="Arial" panose="020B0604020202020204" pitchFamily="34" charset="0"/>
               </a:rPr>
-              <a:t>Cú pháp: &lt;Tên biến&gt;.entrySet();</a:t>
-            </a:r>
-          </a:p>
-          <a:p>
-            <a:r>
-              <a:rPr lang="en-US">
-                <a:latin typeface="Arial" panose="020B0604020202020204" pitchFamily="34" charset="0"/>
-                <a:cs typeface="Arial" panose="020B0604020202020204" pitchFamily="34" charset="0"/>
-              </a:rPr>
-              <a:t>Kết hợp với cấu trúc lặp for each</a:t>
+              <a:t>Cú pháp: &lt;Tên biến&gt;.put(&lt;Key&gt;, &lt;Value&gt;);</a:t>
             </a:r>
           </a:p>
         </p:txBody>
@@ -7038,7 +7030,7 @@
           <p:cNvPr id="5" name="Picture 4">
             <a:extLst>
               <a:ext uri="{FF2B5EF4-FFF2-40B4-BE49-F238E27FC236}">
-                <a16:creationId xmlns:a16="http://schemas.microsoft.com/office/drawing/2014/main" id="{019FA05D-FE99-444B-B624-9D6409FF82C5}"/>
+                <a16:creationId xmlns:a16="http://schemas.microsoft.com/office/drawing/2014/main" id="{38E783AB-7A8B-4747-9C1A-38E6784F395C}"/>
               </a:ext>
             </a:extLst>
           </p:cNvPr>
@@ -7055,8 +7047,8 @@
         </p:blipFill>
         <p:spPr>
           <a:xfrm>
-            <a:off x="3070120" y="3120027"/>
-            <a:ext cx="6051759" cy="3655142"/>
+            <a:off x="3154425" y="2926676"/>
+            <a:ext cx="5883150" cy="3368332"/>
           </a:xfrm>
           <a:prstGeom prst="rect">
             <a:avLst/>
@@ -7066,7 +7058,7 @@
     </p:spTree>
     <p:extLst>
       <p:ext uri="{BB962C8B-B14F-4D97-AF65-F5344CB8AC3E}">
-        <p14:creationId xmlns:p14="http://schemas.microsoft.com/office/powerpoint/2010/main" val="941339710"/>
+        <p14:creationId xmlns:p14="http://schemas.microsoft.com/office/powerpoint/2010/main" val="3000597972"/>
       </p:ext>
     </p:extLst>
   </p:cSld>
@@ -7119,7 +7111,7 @@
                 <a:latin typeface="Arial" panose="020B0604020202020204" pitchFamily="34" charset="0"/>
                 <a:cs typeface="Arial" panose="020B0604020202020204" pitchFamily="34" charset="0"/>
               </a:rPr>
-              <a:t>2.3.4. Kiểm tra một Map có rỗng hay không</a:t>
+              <a:t>2.3.3. Duyệt qua tất cả phần tử trong Map</a:t>
             </a:r>
           </a:p>
         </p:txBody>
@@ -7155,7 +7147,16 @@
                 <a:latin typeface="Arial" panose="020B0604020202020204" pitchFamily="34" charset="0"/>
                 <a:cs typeface="Arial" panose="020B0604020202020204" pitchFamily="34" charset="0"/>
               </a:rPr>
-              <a:t>Cú pháp: &lt;Tên biến&gt;.isEmpty();</a:t>
+              <a:t>Cú pháp: &lt;Tên biến&gt;.entrySet();</a:t>
+            </a:r>
+          </a:p>
+          <a:p>
+            <a:r>
+              <a:rPr lang="en-US">
+                <a:latin typeface="Arial" panose="020B0604020202020204" pitchFamily="34" charset="0"/>
+                <a:cs typeface="Arial" panose="020B0604020202020204" pitchFamily="34" charset="0"/>
+              </a:rPr>
+              <a:t>Kết hợp với cấu trúc lặp for each</a:t>
             </a:r>
           </a:p>
         </p:txBody>
@@ -7165,7 +7166,7 @@
           <p:cNvPr id="5" name="Picture 4">
             <a:extLst>
               <a:ext uri="{FF2B5EF4-FFF2-40B4-BE49-F238E27FC236}">
-                <a16:creationId xmlns:a16="http://schemas.microsoft.com/office/drawing/2014/main" id="{DDFD4F76-35A0-474A-8088-0F57648C731D}"/>
+                <a16:creationId xmlns:a16="http://schemas.microsoft.com/office/drawing/2014/main" id="{019FA05D-FE99-444B-B624-9D6409FF82C5}"/>
               </a:ext>
             </a:extLst>
           </p:cNvPr>
@@ -7182,8 +7183,8 @@
         </p:blipFill>
         <p:spPr>
           <a:xfrm>
-            <a:off x="3101080" y="3041143"/>
-            <a:ext cx="5989839" cy="3147333"/>
+            <a:off x="3070120" y="3120027"/>
+            <a:ext cx="6051759" cy="3655142"/>
           </a:xfrm>
           <a:prstGeom prst="rect">
             <a:avLst/>
@@ -7193,7 +7194,7 @@
     </p:spTree>
     <p:extLst>
       <p:ext uri="{BB962C8B-B14F-4D97-AF65-F5344CB8AC3E}">
-        <p14:creationId xmlns:p14="http://schemas.microsoft.com/office/powerpoint/2010/main" val="85389096"/>
+        <p14:creationId xmlns:p14="http://schemas.microsoft.com/office/powerpoint/2010/main" val="941339710"/>
       </p:ext>
     </p:extLst>
   </p:cSld>
@@ -7246,7 +7247,7 @@
                 <a:latin typeface="Arial" panose="020B0604020202020204" pitchFamily="34" charset="0"/>
                 <a:cs typeface="Arial" panose="020B0604020202020204" pitchFamily="34" charset="0"/>
               </a:rPr>
-              <a:t>2.3.5. Lấy tất cả khóa trong Map</a:t>
+              <a:t>2.3.4. Kiểm tra một Map có rỗng hay không</a:t>
             </a:r>
           </a:p>
         </p:txBody>
@@ -7282,7 +7283,7 @@
                 <a:latin typeface="Arial" panose="020B0604020202020204" pitchFamily="34" charset="0"/>
                 <a:cs typeface="Arial" panose="020B0604020202020204" pitchFamily="34" charset="0"/>
               </a:rPr>
-              <a:t>Cú pháp: &lt;Tên biến&gt;.keySet();</a:t>
+              <a:t>Cú pháp: &lt;Tên biến&gt;.isEmpty();</a:t>
             </a:r>
           </a:p>
         </p:txBody>
@@ -7292,7 +7293,7 @@
           <p:cNvPr id="5" name="Picture 4">
             <a:extLst>
               <a:ext uri="{FF2B5EF4-FFF2-40B4-BE49-F238E27FC236}">
-                <a16:creationId xmlns:a16="http://schemas.microsoft.com/office/drawing/2014/main" id="{9227BDBE-8038-43C2-A864-A675BB2181AA}"/>
+                <a16:creationId xmlns:a16="http://schemas.microsoft.com/office/drawing/2014/main" id="{DDFD4F76-35A0-474A-8088-0F57648C731D}"/>
               </a:ext>
             </a:extLst>
           </p:cNvPr>
@@ -7309,8 +7310,8 @@
         </p:blipFill>
         <p:spPr>
           <a:xfrm>
-            <a:off x="3116322" y="2991226"/>
-            <a:ext cx="5959356" cy="3414056"/>
+            <a:off x="3101080" y="3041143"/>
+            <a:ext cx="5989839" cy="3147333"/>
           </a:xfrm>
           <a:prstGeom prst="rect">
             <a:avLst/>
@@ -7320,7 +7321,7 @@
     </p:spTree>
     <p:extLst>
       <p:ext uri="{BB962C8B-B14F-4D97-AF65-F5344CB8AC3E}">
-        <p14:creationId xmlns:p14="http://schemas.microsoft.com/office/powerpoint/2010/main" val="4246226457"/>
+        <p14:creationId xmlns:p14="http://schemas.microsoft.com/office/powerpoint/2010/main" val="85389096"/>
       </p:ext>
     </p:extLst>
   </p:cSld>
@@ -7373,7 +7374,7 @@
                 <a:latin typeface="Arial" panose="020B0604020202020204" pitchFamily="34" charset="0"/>
                 <a:cs typeface="Arial" panose="020B0604020202020204" pitchFamily="34" charset="0"/>
               </a:rPr>
-              <a:t>2.3.6. Lấy tất cả giá trị trong Map</a:t>
+              <a:t>2.3.5. Lấy tất cả khóa trong Map</a:t>
             </a:r>
           </a:p>
         </p:txBody>
@@ -7409,7 +7410,7 @@
                 <a:latin typeface="Arial" panose="020B0604020202020204" pitchFamily="34" charset="0"/>
                 <a:cs typeface="Arial" panose="020B0604020202020204" pitchFamily="34" charset="0"/>
               </a:rPr>
-              <a:t>Cú pháp: &lt;Tên biến&gt;.values();</a:t>
+              <a:t>Cú pháp: &lt;Tên biến&gt;.keySet();</a:t>
             </a:r>
           </a:p>
         </p:txBody>
@@ -7419,7 +7420,7 @@
           <p:cNvPr id="5" name="Picture 4">
             <a:extLst>
               <a:ext uri="{FF2B5EF4-FFF2-40B4-BE49-F238E27FC236}">
-                <a16:creationId xmlns:a16="http://schemas.microsoft.com/office/drawing/2014/main" id="{BAE24AB7-B2C5-44C9-B812-952FB75B7D0A}"/>
+                <a16:creationId xmlns:a16="http://schemas.microsoft.com/office/drawing/2014/main" id="{9227BDBE-8038-43C2-A864-A675BB2181AA}"/>
               </a:ext>
             </a:extLst>
           </p:cNvPr>
@@ -7436,8 +7437,8 @@
         </p:blipFill>
         <p:spPr>
           <a:xfrm>
-            <a:off x="2624789" y="2808330"/>
-            <a:ext cx="6942422" cy="3596952"/>
+            <a:off x="3116322" y="2991226"/>
+            <a:ext cx="5959356" cy="3414056"/>
           </a:xfrm>
           <a:prstGeom prst="rect">
             <a:avLst/>
@@ -7447,7 +7448,7 @@
     </p:spTree>
     <p:extLst>
       <p:ext uri="{BB962C8B-B14F-4D97-AF65-F5344CB8AC3E}">
-        <p14:creationId xmlns:p14="http://schemas.microsoft.com/office/powerpoint/2010/main" val="805816856"/>
+        <p14:creationId xmlns:p14="http://schemas.microsoft.com/office/powerpoint/2010/main" val="4246226457"/>
       </p:ext>
     </p:extLst>
   </p:cSld>
@@ -7500,7 +7501,7 @@
                 <a:latin typeface="Arial" panose="020B0604020202020204" pitchFamily="34" charset="0"/>
                 <a:cs typeface="Arial" panose="020B0604020202020204" pitchFamily="34" charset="0"/>
               </a:rPr>
-              <a:t>3. Làm việc với ngày, giờ trong Java</a:t>
+              <a:t>2.3.6. Lấy tất cả giá trị trong Map</a:t>
             </a:r>
           </a:p>
         </p:txBody>
@@ -7536,65 +7537,45 @@
                 <a:latin typeface="Arial" panose="020B0604020202020204" pitchFamily="34" charset="0"/>
                 <a:cs typeface="Arial" panose="020B0604020202020204" pitchFamily="34" charset="0"/>
               </a:rPr>
-              <a:t>3.1. Làm việc với LocalDate</a:t>
-            </a:r>
-          </a:p>
-          <a:p>
-            <a:pPr lvl="1"/>
-            <a:r>
-              <a:rPr lang="en-US">
-                <a:latin typeface="Arial" panose="020B0604020202020204" pitchFamily="34" charset="0"/>
-                <a:cs typeface="Arial" panose="020B0604020202020204" pitchFamily="34" charset="0"/>
-              </a:rPr>
-              <a:t>3.1.1. Khởi tạo LocalDate</a:t>
-            </a:r>
-          </a:p>
-          <a:p>
-            <a:pPr lvl="1"/>
-            <a:r>
-              <a:rPr lang="en-US">
-                <a:latin typeface="Arial" panose="020B0604020202020204" pitchFamily="34" charset="0"/>
-                <a:cs typeface="Arial" panose="020B0604020202020204" pitchFamily="34" charset="0"/>
-              </a:rPr>
-              <a:t>3.1.2. Lấy ngày trong tháng từ LocalDate</a:t>
-            </a:r>
-          </a:p>
-          <a:p>
-            <a:pPr lvl="1"/>
-            <a:r>
-              <a:rPr lang="en-US">
-                <a:latin typeface="Arial" panose="020B0604020202020204" pitchFamily="34" charset="0"/>
-                <a:cs typeface="Arial" panose="020B0604020202020204" pitchFamily="34" charset="0"/>
-              </a:rPr>
-              <a:t>3.1.3. Lấy tháng từ LocalDate</a:t>
-            </a:r>
-          </a:p>
-          <a:p>
-            <a:pPr lvl="1"/>
-            <a:r>
-              <a:rPr lang="en-US">
-                <a:latin typeface="Arial" panose="020B0604020202020204" pitchFamily="34" charset="0"/>
-                <a:cs typeface="Arial" panose="020B0604020202020204" pitchFamily="34" charset="0"/>
-              </a:rPr>
-              <a:t>3.1.4. Lấy năm từ LocalDate</a:t>
-            </a:r>
-          </a:p>
-          <a:p>
-            <a:pPr lvl="1"/>
-            <a:r>
-              <a:rPr lang="en-US">
-                <a:latin typeface="Arial" panose="020B0604020202020204" pitchFamily="34" charset="0"/>
-                <a:cs typeface="Arial" panose="020B0604020202020204" pitchFamily="34" charset="0"/>
-              </a:rPr>
-              <a:t>3.1.5. Chuyển đổi sang LocalDateTime</a:t>
-            </a:r>
-          </a:p>
-        </p:txBody>
-      </p:sp>
+              <a:t>Cú pháp: &lt;Tên biến&gt;.values();</a:t>
+            </a:r>
+          </a:p>
+        </p:txBody>
+      </p:sp>
+      <p:pic>
+        <p:nvPicPr>
+          <p:cNvPr id="5" name="Picture 4">
+            <a:extLst>
+              <a:ext uri="{FF2B5EF4-FFF2-40B4-BE49-F238E27FC236}">
+                <a16:creationId xmlns:a16="http://schemas.microsoft.com/office/drawing/2014/main" id="{BAE24AB7-B2C5-44C9-B812-952FB75B7D0A}"/>
+              </a:ext>
+            </a:extLst>
+          </p:cNvPr>
+          <p:cNvPicPr>
+            <a:picLocks noChangeAspect="1"/>
+          </p:cNvPicPr>
+          <p:nvPr/>
+        </p:nvPicPr>
+        <p:blipFill>
+          <a:blip r:embed="rId2"/>
+          <a:stretch>
+            <a:fillRect/>
+          </a:stretch>
+        </p:blipFill>
+        <p:spPr>
+          <a:xfrm>
+            <a:off x="2624789" y="2808330"/>
+            <a:ext cx="6942422" cy="3596952"/>
+          </a:xfrm>
+          <a:prstGeom prst="rect">
+            <a:avLst/>
+          </a:prstGeom>
+        </p:spPr>
+      </p:pic>
     </p:spTree>
     <p:extLst>
       <p:ext uri="{BB962C8B-B14F-4D97-AF65-F5344CB8AC3E}">
-        <p14:creationId xmlns:p14="http://schemas.microsoft.com/office/powerpoint/2010/main" val="648641226"/>
+        <p14:creationId xmlns:p14="http://schemas.microsoft.com/office/powerpoint/2010/main" val="805816856"/>
       </p:ext>
     </p:extLst>
   </p:cSld>
@@ -7814,7 +7795,7 @@
                 <a:latin typeface="Arial" panose="020B0604020202020204" pitchFamily="34" charset="0"/>
                 <a:cs typeface="Arial" panose="020B0604020202020204" pitchFamily="34" charset="0"/>
               </a:rPr>
-              <a:t>3.1. Làm việc với LocalDate</a:t>
+              <a:t>3. Làm việc với ngày, giờ trong Java</a:t>
             </a:r>
           </a:p>
         </p:txBody>
@@ -7850,25 +7831,57 @@
                 <a:latin typeface="Arial" panose="020B0604020202020204" pitchFamily="34" charset="0"/>
                 <a:cs typeface="Arial" panose="020B0604020202020204" pitchFamily="34" charset="0"/>
               </a:rPr>
-              <a:t>LocalTime đại diện cho dữ liệu ngày.</a:t>
-            </a:r>
-          </a:p>
-          <a:p>
-            <a:r>
-              <a:rPr lang="en-US">
-                <a:latin typeface="Arial" panose="020B0604020202020204" pitchFamily="34" charset="0"/>
-                <a:cs typeface="Arial" panose="020B0604020202020204" pitchFamily="34" charset="0"/>
-              </a:rPr>
-              <a:t>Thường được sử dụng trong các bài toán hoặc yêu cầu có xử lý về ngày.</a:t>
-            </a:r>
-          </a:p>
-          <a:p>
-            <a:r>
-              <a:rPr lang="en-US">
-                <a:latin typeface="Arial" panose="020B0604020202020204" pitchFamily="34" charset="0"/>
-                <a:cs typeface="Arial" panose="020B0604020202020204" pitchFamily="34" charset="0"/>
-              </a:rPr>
-              <a:t>Được sử dụng trong lưu trữ dữ liệu vào cơ sở dữ liệu.</a:t>
+              <a:t>3.1. Làm việc với LocalDate</a:t>
+            </a:r>
+          </a:p>
+          <a:p>
+            <a:pPr lvl="1"/>
+            <a:r>
+              <a:rPr lang="en-US">
+                <a:latin typeface="Arial" panose="020B0604020202020204" pitchFamily="34" charset="0"/>
+                <a:cs typeface="Arial" panose="020B0604020202020204" pitchFamily="34" charset="0"/>
+              </a:rPr>
+              <a:t>3.1.1. Khởi tạo LocalDate</a:t>
+            </a:r>
+          </a:p>
+          <a:p>
+            <a:pPr lvl="1"/>
+            <a:r>
+              <a:rPr lang="en-US">
+                <a:latin typeface="Arial" panose="020B0604020202020204" pitchFamily="34" charset="0"/>
+                <a:cs typeface="Arial" panose="020B0604020202020204" pitchFamily="34" charset="0"/>
+              </a:rPr>
+              <a:t>3.1.2. Lấy ngày trong tháng từ LocalDate</a:t>
+            </a:r>
+          </a:p>
+          <a:p>
+            <a:pPr lvl="1"/>
+            <a:r>
+              <a:rPr lang="en-US">
+                <a:latin typeface="Arial" panose="020B0604020202020204" pitchFamily="34" charset="0"/>
+                <a:cs typeface="Arial" panose="020B0604020202020204" pitchFamily="34" charset="0"/>
+              </a:rPr>
+              <a:t>3.1.3. Lấy tháng từ LocalDate</a:t>
+            </a:r>
+          </a:p>
+          <a:p>
+            <a:pPr lvl="1"/>
+            <a:r>
+              <a:rPr lang="en-US">
+                <a:latin typeface="Arial" panose="020B0604020202020204" pitchFamily="34" charset="0"/>
+                <a:cs typeface="Arial" panose="020B0604020202020204" pitchFamily="34" charset="0"/>
+              </a:rPr>
+              <a:t>3.1.4. Lấy năm từ LocalDate</a:t>
+            </a:r>
+          </a:p>
+          <a:p>
+            <a:pPr lvl="1"/>
+            <a:r>
+              <a:rPr lang="en-US">
+                <a:latin typeface="Arial" panose="020B0604020202020204" pitchFamily="34" charset="0"/>
+                <a:cs typeface="Arial" panose="020B0604020202020204" pitchFamily="34" charset="0"/>
+              </a:rPr>
+              <a:t>3.1.5. Chuyển đổi sang LocalDateTime</a:t>
             </a:r>
           </a:p>
         </p:txBody>
@@ -7876,7 +7889,7 @@
     </p:spTree>
     <p:extLst>
       <p:ext uri="{BB962C8B-B14F-4D97-AF65-F5344CB8AC3E}">
-        <p14:creationId xmlns:p14="http://schemas.microsoft.com/office/powerpoint/2010/main" val="3106762735"/>
+        <p14:creationId xmlns:p14="http://schemas.microsoft.com/office/powerpoint/2010/main" val="648641226"/>
       </p:ext>
     </p:extLst>
   </p:cSld>
@@ -7929,17 +7942,17 @@
                 <a:latin typeface="Arial" panose="020B0604020202020204" pitchFamily="34" charset="0"/>
                 <a:cs typeface="Arial" panose="020B0604020202020204" pitchFamily="34" charset="0"/>
               </a:rPr>
-              <a:t>3.1.1. Khởi tạo LocalDate</a:t>
-            </a:r>
-          </a:p>
-        </p:txBody>
-      </p:sp>
-      <p:sp>
-        <p:nvSpPr>
-          <p:cNvPr id="5" name="Content Placeholder 4">
-            <a:extLst>
-              <a:ext uri="{FF2B5EF4-FFF2-40B4-BE49-F238E27FC236}">
-                <a16:creationId xmlns:a16="http://schemas.microsoft.com/office/drawing/2014/main" id="{9A898BF4-D80F-487C-97F1-A9CC9FC3D09F}"/>
+              <a:t>3.1. Làm việc với LocalDate</a:t>
+            </a:r>
+          </a:p>
+        </p:txBody>
+      </p:sp>
+      <p:sp>
+        <p:nvSpPr>
+          <p:cNvPr id="3" name="Content Placeholder 2">
+            <a:extLst>
+              <a:ext uri="{FF2B5EF4-FFF2-40B4-BE49-F238E27FC236}">
+                <a16:creationId xmlns:a16="http://schemas.microsoft.com/office/drawing/2014/main" id="{6337998B-3737-4D43-973D-24B118D723A2}"/>
               </a:ext>
             </a:extLst>
           </p:cNvPr>
@@ -7952,67 +7965,46 @@
         </p:nvSpPr>
         <p:spPr>
           <a:xfrm>
-            <a:off x="1103312" y="2052918"/>
-            <a:ext cx="9825100" cy="4195481"/>
-          </a:xfrm>
-        </p:spPr>
-        <p:txBody>
-          <a:bodyPr/>
-          <a:lstStyle/>
-          <a:p>
-            <a:r>
-              <a:rPr lang="en-US">
-                <a:latin typeface="Arial" panose="020B0604020202020204" pitchFamily="34" charset="0"/>
-                <a:cs typeface="Arial" panose="020B0604020202020204" pitchFamily="34" charset="0"/>
-              </a:rPr>
-              <a:t>Khởi tạo theo ngày chỉ định</a:t>
-            </a:r>
-          </a:p>
-          <a:p>
-            <a:r>
-              <a:rPr lang="en-US">
-                <a:latin typeface="Arial" panose="020B0604020202020204" pitchFamily="34" charset="0"/>
-                <a:cs typeface="Arial" panose="020B0604020202020204" pitchFamily="34" charset="0"/>
-              </a:rPr>
-              <a:t>Cú pháp: LocalDate &lt;Tên biến&gt; = LocalDate.of(&lt;Năm&gt;, &lt;Tháng&gt;, &lt;Ngày&gt;) ;</a:t>
-            </a:r>
-          </a:p>
-        </p:txBody>
-      </p:sp>
-      <p:pic>
-        <p:nvPicPr>
-          <p:cNvPr id="7" name="Picture 6">
-            <a:extLst>
-              <a:ext uri="{FF2B5EF4-FFF2-40B4-BE49-F238E27FC236}">
-                <a16:creationId xmlns:a16="http://schemas.microsoft.com/office/drawing/2014/main" id="{AC92A7FE-B4C6-44A3-993A-2043E23673F0}"/>
-              </a:ext>
-            </a:extLst>
-          </p:cNvPr>
-          <p:cNvPicPr>
-            <a:picLocks noChangeAspect="1"/>
-          </p:cNvPicPr>
-          <p:nvPr/>
-        </p:nvPicPr>
-        <p:blipFill>
-          <a:blip r:embed="rId2"/>
-          <a:stretch>
-            <a:fillRect/>
-          </a:stretch>
-        </p:blipFill>
-        <p:spPr>
-          <a:xfrm>
-            <a:off x="1652397" y="3495895"/>
-            <a:ext cx="8887205" cy="2647452"/>
-          </a:xfrm>
-          <a:prstGeom prst="rect">
-            <a:avLst/>
-          </a:prstGeom>
-        </p:spPr>
-      </p:pic>
+            <a:off x="1103312" y="2104008"/>
+            <a:ext cx="8946541" cy="4144392"/>
+          </a:xfrm>
+        </p:spPr>
+        <p:txBody>
+          <a:bodyPr/>
+          <a:lstStyle/>
+          <a:p>
+            <a:r>
+              <a:rPr lang="en-US">
+                <a:latin typeface="Arial" panose="020B0604020202020204" pitchFamily="34" charset="0"/>
+                <a:cs typeface="Arial" panose="020B0604020202020204" pitchFamily="34" charset="0"/>
+              </a:rPr>
+              <a:t>LocalTime đại diện cho dữ liệu ngày.</a:t>
+            </a:r>
+          </a:p>
+          <a:p>
+            <a:r>
+              <a:rPr lang="en-US">
+                <a:latin typeface="Arial" panose="020B0604020202020204" pitchFamily="34" charset="0"/>
+                <a:cs typeface="Arial" panose="020B0604020202020204" pitchFamily="34" charset="0"/>
+              </a:rPr>
+              <a:t>Thường được sử dụng trong các bài toán hoặc yêu cầu có xử lý về ngày.</a:t>
+            </a:r>
+          </a:p>
+          <a:p>
+            <a:r>
+              <a:rPr lang="en-US">
+                <a:latin typeface="Arial" panose="020B0604020202020204" pitchFamily="34" charset="0"/>
+                <a:cs typeface="Arial" panose="020B0604020202020204" pitchFamily="34" charset="0"/>
+              </a:rPr>
+              <a:t>Được sử dụng trong lưu trữ dữ liệu vào cơ sở dữ liệu.</a:t>
+            </a:r>
+          </a:p>
+        </p:txBody>
+      </p:sp>
     </p:spTree>
     <p:extLst>
       <p:ext uri="{BB962C8B-B14F-4D97-AF65-F5344CB8AC3E}">
-        <p14:creationId xmlns:p14="http://schemas.microsoft.com/office/powerpoint/2010/main" val="2682195733"/>
+        <p14:creationId xmlns:p14="http://schemas.microsoft.com/office/powerpoint/2010/main" val="3106762735"/>
       </p:ext>
     </p:extLst>
   </p:cSld>
@@ -8101,7 +8093,7 @@
                 <a:latin typeface="Arial" panose="020B0604020202020204" pitchFamily="34" charset="0"/>
                 <a:cs typeface="Arial" panose="020B0604020202020204" pitchFamily="34" charset="0"/>
               </a:rPr>
-              <a:t>Khởi tạo theo ngày hiện tại</a:t>
+              <a:t>Khởi tạo theo ngày chỉ định</a:t>
             </a:r>
           </a:p>
           <a:p>
@@ -8117,10 +8109,10 @@
       </p:sp>
       <p:pic>
         <p:nvPicPr>
-          <p:cNvPr id="4" name="Picture 3">
-            <a:extLst>
-              <a:ext uri="{FF2B5EF4-FFF2-40B4-BE49-F238E27FC236}">
-                <a16:creationId xmlns:a16="http://schemas.microsoft.com/office/drawing/2014/main" id="{AE82D384-DCF5-4C22-813B-D1CAE1988D44}"/>
+          <p:cNvPr id="7" name="Picture 6">
+            <a:extLst>
+              <a:ext uri="{FF2B5EF4-FFF2-40B4-BE49-F238E27FC236}">
+                <a16:creationId xmlns:a16="http://schemas.microsoft.com/office/drawing/2014/main" id="{AC92A7FE-B4C6-44A3-993A-2043E23673F0}"/>
               </a:ext>
             </a:extLst>
           </p:cNvPr>
@@ -8137,8 +8129,8 @@
         </p:blipFill>
         <p:spPr>
           <a:xfrm>
-            <a:off x="2860913" y="3317046"/>
-            <a:ext cx="6309898" cy="2861812"/>
+            <a:off x="1652397" y="3495895"/>
+            <a:ext cx="8887205" cy="2647452"/>
           </a:xfrm>
           <a:prstGeom prst="rect">
             <a:avLst/>
@@ -8148,7 +8140,7 @@
     </p:spTree>
     <p:extLst>
       <p:ext uri="{BB962C8B-B14F-4D97-AF65-F5344CB8AC3E}">
-        <p14:creationId xmlns:p14="http://schemas.microsoft.com/office/powerpoint/2010/main" val="76008459"/>
+        <p14:creationId xmlns:p14="http://schemas.microsoft.com/office/powerpoint/2010/main" val="2682195733"/>
       </p:ext>
     </p:extLst>
   </p:cSld>
@@ -8201,7 +8193,7 @@
                 <a:latin typeface="Arial" panose="020B0604020202020204" pitchFamily="34" charset="0"/>
                 <a:cs typeface="Arial" panose="020B0604020202020204" pitchFamily="34" charset="0"/>
               </a:rPr>
-              <a:t>3.1.2. Lấy ngày trong tháng từ LocalDate</a:t>
+              <a:t>3.1.1. Khởi tạo LocalDate</a:t>
             </a:r>
           </a:p>
         </p:txBody>
@@ -8237,7 +8229,16 @@
                 <a:latin typeface="Arial" panose="020B0604020202020204" pitchFamily="34" charset="0"/>
                 <a:cs typeface="Arial" panose="020B0604020202020204" pitchFamily="34" charset="0"/>
               </a:rPr>
-              <a:t>Cú pháp: &lt;Tên biến&gt;.getDayOfMonth();</a:t>
+              <a:t>Khởi tạo theo ngày hiện tại</a:t>
+            </a:r>
+          </a:p>
+          <a:p>
+            <a:r>
+              <a:rPr lang="en-US">
+                <a:latin typeface="Arial" panose="020B0604020202020204" pitchFamily="34" charset="0"/>
+                <a:cs typeface="Arial" panose="020B0604020202020204" pitchFamily="34" charset="0"/>
+              </a:rPr>
+              <a:t>Cú pháp: LocalDate &lt;Tên biến&gt; = LocalDate.now();</a:t>
             </a:r>
           </a:p>
         </p:txBody>
@@ -8247,7 +8248,7 @@
           <p:cNvPr id="4" name="Picture 3">
             <a:extLst>
               <a:ext uri="{FF2B5EF4-FFF2-40B4-BE49-F238E27FC236}">
-                <a16:creationId xmlns:a16="http://schemas.microsoft.com/office/drawing/2014/main" id="{A0E957AE-1E59-473F-A71B-24287D523983}"/>
+                <a16:creationId xmlns:a16="http://schemas.microsoft.com/office/drawing/2014/main" id="{AE82D384-DCF5-4C22-813B-D1CAE1988D44}"/>
               </a:ext>
             </a:extLst>
           </p:cNvPr>
@@ -8264,8 +8265,8 @@
         </p:blipFill>
         <p:spPr>
           <a:xfrm>
-            <a:off x="2547040" y="2984447"/>
-            <a:ext cx="7097919" cy="3345331"/>
+            <a:off x="2860913" y="3317046"/>
+            <a:ext cx="6309898" cy="2861812"/>
           </a:xfrm>
           <a:prstGeom prst="rect">
             <a:avLst/>
@@ -8275,7 +8276,7 @@
     </p:spTree>
     <p:extLst>
       <p:ext uri="{BB962C8B-B14F-4D97-AF65-F5344CB8AC3E}">
-        <p14:creationId xmlns:p14="http://schemas.microsoft.com/office/powerpoint/2010/main" val="2320629875"/>
+        <p14:creationId xmlns:p14="http://schemas.microsoft.com/office/powerpoint/2010/main" val="76008459"/>
       </p:ext>
     </p:extLst>
   </p:cSld>
@@ -8328,7 +8329,7 @@
                 <a:latin typeface="Arial" panose="020B0604020202020204" pitchFamily="34" charset="0"/>
                 <a:cs typeface="Arial" panose="020B0604020202020204" pitchFamily="34" charset="0"/>
               </a:rPr>
-              <a:t>3.1.3. Lấy tháng từ LocalDate</a:t>
+              <a:t>3.1.2. Lấy ngày trong tháng từ LocalDate</a:t>
             </a:r>
           </a:p>
         </p:txBody>
@@ -8364,7 +8365,7 @@
                 <a:latin typeface="Arial" panose="020B0604020202020204" pitchFamily="34" charset="0"/>
                 <a:cs typeface="Arial" panose="020B0604020202020204" pitchFamily="34" charset="0"/>
               </a:rPr>
-              <a:t>Cú pháp: &lt;Tên biến&gt;.getMonthValue();</a:t>
+              <a:t>Cú pháp: &lt;Tên biến&gt;.getDayOfMonth();</a:t>
             </a:r>
           </a:p>
         </p:txBody>
@@ -8374,7 +8375,7 @@
           <p:cNvPr id="4" name="Picture 3">
             <a:extLst>
               <a:ext uri="{FF2B5EF4-FFF2-40B4-BE49-F238E27FC236}">
-                <a16:creationId xmlns:a16="http://schemas.microsoft.com/office/drawing/2014/main" id="{D83123C9-E9E1-45E7-B907-9A7687426440}"/>
+                <a16:creationId xmlns:a16="http://schemas.microsoft.com/office/drawing/2014/main" id="{A0E957AE-1E59-473F-A71B-24287D523983}"/>
               </a:ext>
             </a:extLst>
           </p:cNvPr>
@@ -8391,8 +8392,8 @@
         </p:blipFill>
         <p:spPr>
           <a:xfrm>
-            <a:off x="2703551" y="2865227"/>
-            <a:ext cx="6624621" cy="3446795"/>
+            <a:off x="2547040" y="2984447"/>
+            <a:ext cx="7097919" cy="3345331"/>
           </a:xfrm>
           <a:prstGeom prst="rect">
             <a:avLst/>
@@ -8402,7 +8403,7 @@
     </p:spTree>
     <p:extLst>
       <p:ext uri="{BB962C8B-B14F-4D97-AF65-F5344CB8AC3E}">
-        <p14:creationId xmlns:p14="http://schemas.microsoft.com/office/powerpoint/2010/main" val="4288208529"/>
+        <p14:creationId xmlns:p14="http://schemas.microsoft.com/office/powerpoint/2010/main" val="2320629875"/>
       </p:ext>
     </p:extLst>
   </p:cSld>
@@ -8455,7 +8456,7 @@
                 <a:latin typeface="Arial" panose="020B0604020202020204" pitchFamily="34" charset="0"/>
                 <a:cs typeface="Arial" panose="020B0604020202020204" pitchFamily="34" charset="0"/>
               </a:rPr>
-              <a:t>3.1.4. Lấy năm từ LocalDate</a:t>
+              <a:t>3.1.3. Lấy tháng từ LocalDate</a:t>
             </a:r>
           </a:p>
         </p:txBody>
@@ -8491,7 +8492,7 @@
                 <a:latin typeface="Arial" panose="020B0604020202020204" pitchFamily="34" charset="0"/>
                 <a:cs typeface="Arial" panose="020B0604020202020204" pitchFamily="34" charset="0"/>
               </a:rPr>
-              <a:t>Cú pháp: &lt;Tên biến&gt;. getYear();</a:t>
+              <a:t>Cú pháp: &lt;Tên biến&gt;.getMonthValue();</a:t>
             </a:r>
           </a:p>
         </p:txBody>
@@ -8501,7 +8502,7 @@
           <p:cNvPr id="4" name="Picture 3">
             <a:extLst>
               <a:ext uri="{FF2B5EF4-FFF2-40B4-BE49-F238E27FC236}">
-                <a16:creationId xmlns:a16="http://schemas.microsoft.com/office/drawing/2014/main" id="{79DFC276-8655-4BFF-A957-BF2923D122E1}"/>
+                <a16:creationId xmlns:a16="http://schemas.microsoft.com/office/drawing/2014/main" id="{D83123C9-E9E1-45E7-B907-9A7687426440}"/>
               </a:ext>
             </a:extLst>
           </p:cNvPr>
@@ -8518,8 +8519,8 @@
         </p:blipFill>
         <p:spPr>
           <a:xfrm>
-            <a:off x="2925050" y="2948898"/>
-            <a:ext cx="6181624" cy="3384030"/>
+            <a:off x="2703551" y="2865227"/>
+            <a:ext cx="6624621" cy="3446795"/>
           </a:xfrm>
           <a:prstGeom prst="rect">
             <a:avLst/>
@@ -8529,7 +8530,7 @@
     </p:spTree>
     <p:extLst>
       <p:ext uri="{BB962C8B-B14F-4D97-AF65-F5344CB8AC3E}">
-        <p14:creationId xmlns:p14="http://schemas.microsoft.com/office/powerpoint/2010/main" val="2937702054"/>
+        <p14:creationId xmlns:p14="http://schemas.microsoft.com/office/powerpoint/2010/main" val="4288208529"/>
       </p:ext>
     </p:extLst>
   </p:cSld>
@@ -8582,7 +8583,7 @@
                 <a:latin typeface="Arial" panose="020B0604020202020204" pitchFamily="34" charset="0"/>
                 <a:cs typeface="Arial" panose="020B0604020202020204" pitchFamily="34" charset="0"/>
               </a:rPr>
-              <a:t>3.1.5. Lấy năm từ LocalDate</a:t>
+              <a:t>3.1.4. Lấy năm từ LocalDate</a:t>
             </a:r>
           </a:p>
         </p:txBody>
@@ -8618,7 +8619,7 @@
                 <a:latin typeface="Arial" panose="020B0604020202020204" pitchFamily="34" charset="0"/>
                 <a:cs typeface="Arial" panose="020B0604020202020204" pitchFamily="34" charset="0"/>
               </a:rPr>
-              <a:t>Cú pháp: &lt;Tên biến&gt;. atTime(&lt;Giờ&gt;, &lt;Phút&gt;, &lt;Giây&gt;);</a:t>
+              <a:t>Cú pháp: &lt;Tên biến&gt;. getYear();</a:t>
             </a:r>
           </a:p>
         </p:txBody>
@@ -8628,7 +8629,7 @@
           <p:cNvPr id="4" name="Picture 3">
             <a:extLst>
               <a:ext uri="{FF2B5EF4-FFF2-40B4-BE49-F238E27FC236}">
-                <a16:creationId xmlns:a16="http://schemas.microsoft.com/office/drawing/2014/main" id="{C0698DBA-3744-4FE8-8C53-F0DD39D93E1C}"/>
+                <a16:creationId xmlns:a16="http://schemas.microsoft.com/office/drawing/2014/main" id="{79DFC276-8655-4BFF-A957-BF2923D122E1}"/>
               </a:ext>
             </a:extLst>
           </p:cNvPr>
@@ -8645,8 +8646,8 @@
         </p:blipFill>
         <p:spPr>
           <a:xfrm>
-            <a:off x="1168722" y="2903423"/>
-            <a:ext cx="9694280" cy="3544646"/>
+            <a:off x="2925050" y="2948898"/>
+            <a:ext cx="6181624" cy="3384030"/>
           </a:xfrm>
           <a:prstGeom prst="rect">
             <a:avLst/>
@@ -8656,7 +8657,7 @@
     </p:spTree>
     <p:extLst>
       <p:ext uri="{BB962C8B-B14F-4D97-AF65-F5344CB8AC3E}">
-        <p14:creationId xmlns:p14="http://schemas.microsoft.com/office/powerpoint/2010/main" val="336956299"/>
+        <p14:creationId xmlns:p14="http://schemas.microsoft.com/office/powerpoint/2010/main" val="2937702054"/>
       </p:ext>
     </p:extLst>
   </p:cSld>
@@ -8709,17 +8710,17 @@
                 <a:latin typeface="Arial" panose="020B0604020202020204" pitchFamily="34" charset="0"/>
                 <a:cs typeface="Arial" panose="020B0604020202020204" pitchFamily="34" charset="0"/>
               </a:rPr>
-              <a:t>3. Làm việc với ngày, giờ trong Java</a:t>
-            </a:r>
-          </a:p>
-        </p:txBody>
-      </p:sp>
-      <p:sp>
-        <p:nvSpPr>
-          <p:cNvPr id="3" name="Content Placeholder 2">
-            <a:extLst>
-              <a:ext uri="{FF2B5EF4-FFF2-40B4-BE49-F238E27FC236}">
-                <a16:creationId xmlns:a16="http://schemas.microsoft.com/office/drawing/2014/main" id="{6337998B-3737-4D43-973D-24B118D723A2}"/>
+              <a:t>3.1.5. Chuyển đổi sang LocalDateTime</a:t>
+            </a:r>
+          </a:p>
+        </p:txBody>
+      </p:sp>
+      <p:sp>
+        <p:nvSpPr>
+          <p:cNvPr id="5" name="Content Placeholder 4">
+            <a:extLst>
+              <a:ext uri="{FF2B5EF4-FFF2-40B4-BE49-F238E27FC236}">
+                <a16:creationId xmlns:a16="http://schemas.microsoft.com/office/drawing/2014/main" id="{9A898BF4-D80F-487C-97F1-A9CC9FC3D09F}"/>
               </a:ext>
             </a:extLst>
           </p:cNvPr>
@@ -8732,78 +8733,58 @@
         </p:nvSpPr>
         <p:spPr>
           <a:xfrm>
-            <a:off x="1103312" y="2104008"/>
-            <a:ext cx="8946541" cy="4144392"/>
-          </a:xfrm>
-        </p:spPr>
-        <p:txBody>
-          <a:bodyPr/>
-          <a:lstStyle/>
-          <a:p>
-            <a:r>
-              <a:rPr lang="en-US">
-                <a:latin typeface="Arial" panose="020B0604020202020204" pitchFamily="34" charset="0"/>
-                <a:cs typeface="Arial" panose="020B0604020202020204" pitchFamily="34" charset="0"/>
-              </a:rPr>
-              <a:t>3.2. Làm việc với LocalTime</a:t>
-            </a:r>
-          </a:p>
-          <a:p>
-            <a:pPr lvl="1"/>
-            <a:r>
-              <a:rPr lang="en-US">
-                <a:latin typeface="Arial" panose="020B0604020202020204" pitchFamily="34" charset="0"/>
-                <a:cs typeface="Arial" panose="020B0604020202020204" pitchFamily="34" charset="0"/>
-              </a:rPr>
-              <a:t>3.2.1. Khởi tạo LocalTime</a:t>
-            </a:r>
-          </a:p>
-          <a:p>
-            <a:pPr lvl="1"/>
-            <a:r>
-              <a:rPr lang="en-US">
-                <a:latin typeface="Arial" panose="020B0604020202020204" pitchFamily="34" charset="0"/>
-                <a:cs typeface="Arial" panose="020B0604020202020204" pitchFamily="34" charset="0"/>
-              </a:rPr>
-              <a:t>3.2.2. Lấy giờ̀ từ LocalTime</a:t>
-            </a:r>
-          </a:p>
-          <a:p>
-            <a:pPr lvl="1"/>
-            <a:r>
-              <a:rPr lang="en-US">
-                <a:latin typeface="Arial" panose="020B0604020202020204" pitchFamily="34" charset="0"/>
-                <a:cs typeface="Arial" panose="020B0604020202020204" pitchFamily="34" charset="0"/>
-              </a:rPr>
-              <a:t>3.2.3. Lấy phút từ LocalTime</a:t>
-            </a:r>
-          </a:p>
-          <a:p>
-            <a:pPr lvl="1"/>
-            <a:r>
-              <a:rPr lang="en-US">
-                <a:latin typeface="Arial" panose="020B0604020202020204" pitchFamily="34" charset="0"/>
-                <a:cs typeface="Arial" panose="020B0604020202020204" pitchFamily="34" charset="0"/>
-              </a:rPr>
-              <a:t>3.2.4. Lấy giây từ LocalTime</a:t>
-            </a:r>
-          </a:p>
-          <a:p>
-            <a:pPr lvl="1"/>
-            <a:r>
-              <a:rPr lang="en-US">
-                <a:latin typeface="Arial" panose="020B0604020202020204" pitchFamily="34" charset="0"/>
-                <a:cs typeface="Arial" panose="020B0604020202020204" pitchFamily="34" charset="0"/>
-              </a:rPr>
-              <a:t>3.2.5. Chuyển đổi sang LocalDateTime</a:t>
-            </a:r>
-          </a:p>
-        </p:txBody>
-      </p:sp>
+            <a:off x="1103312" y="2052918"/>
+            <a:ext cx="9825100" cy="4195481"/>
+          </a:xfrm>
+        </p:spPr>
+        <p:txBody>
+          <a:bodyPr/>
+          <a:lstStyle/>
+          <a:p>
+            <a:r>
+              <a:rPr lang="en-US">
+                <a:latin typeface="Arial" panose="020B0604020202020204" pitchFamily="34" charset="0"/>
+                <a:cs typeface="Arial" panose="020B0604020202020204" pitchFamily="34" charset="0"/>
+              </a:rPr>
+              <a:t>Cú pháp: &lt;Tên biến&gt;. atTime(&lt;Giờ&gt;, &lt;Phút&gt;, &lt;Giây&gt;);</a:t>
+            </a:r>
+          </a:p>
+        </p:txBody>
+      </p:sp>
+      <p:pic>
+        <p:nvPicPr>
+          <p:cNvPr id="4" name="Picture 3">
+            <a:extLst>
+              <a:ext uri="{FF2B5EF4-FFF2-40B4-BE49-F238E27FC236}">
+                <a16:creationId xmlns:a16="http://schemas.microsoft.com/office/drawing/2014/main" id="{C0698DBA-3744-4FE8-8C53-F0DD39D93E1C}"/>
+              </a:ext>
+            </a:extLst>
+          </p:cNvPr>
+          <p:cNvPicPr>
+            <a:picLocks noChangeAspect="1"/>
+          </p:cNvPicPr>
+          <p:nvPr/>
+        </p:nvPicPr>
+        <p:blipFill>
+          <a:blip r:embed="rId2"/>
+          <a:stretch>
+            <a:fillRect/>
+          </a:stretch>
+        </p:blipFill>
+        <p:spPr>
+          <a:xfrm>
+            <a:off x="1168722" y="2903423"/>
+            <a:ext cx="9694280" cy="3544646"/>
+          </a:xfrm>
+          <a:prstGeom prst="rect">
+            <a:avLst/>
+          </a:prstGeom>
+        </p:spPr>
+      </p:pic>
     </p:spTree>
     <p:extLst>
       <p:ext uri="{BB962C8B-B14F-4D97-AF65-F5344CB8AC3E}">
-        <p14:creationId xmlns:p14="http://schemas.microsoft.com/office/powerpoint/2010/main" val="2729633518"/>
+        <p14:creationId xmlns:p14="http://schemas.microsoft.com/office/powerpoint/2010/main" val="336956299"/>
       </p:ext>
     </p:extLst>
   </p:cSld>
@@ -8856,7 +8837,7 @@
                 <a:latin typeface="Arial" panose="020B0604020202020204" pitchFamily="34" charset="0"/>
                 <a:cs typeface="Arial" panose="020B0604020202020204" pitchFamily="34" charset="0"/>
               </a:rPr>
-              <a:t>3.2. Làm việc với LocalTime</a:t>
+              <a:t>3. Làm việc với ngày, giờ trong Java</a:t>
             </a:r>
           </a:p>
         </p:txBody>
@@ -8892,25 +8873,57 @@
                 <a:latin typeface="Arial" panose="020B0604020202020204" pitchFamily="34" charset="0"/>
                 <a:cs typeface="Arial" panose="020B0604020202020204" pitchFamily="34" charset="0"/>
               </a:rPr>
-              <a:t>LocalTime đại diện cho dữ liệu giờ.</a:t>
-            </a:r>
-          </a:p>
-          <a:p>
-            <a:r>
-              <a:rPr lang="en-US">
-                <a:latin typeface="Arial" panose="020B0604020202020204" pitchFamily="34" charset="0"/>
-                <a:cs typeface="Arial" panose="020B0604020202020204" pitchFamily="34" charset="0"/>
-              </a:rPr>
-              <a:t>Thường được sử dụng trong các bài toán hoặc yêu cầu có xử lý về giờ.</a:t>
-            </a:r>
-          </a:p>
-          <a:p>
-            <a:r>
-              <a:rPr lang="en-US">
-                <a:latin typeface="Arial" panose="020B0604020202020204" pitchFamily="34" charset="0"/>
-                <a:cs typeface="Arial" panose="020B0604020202020204" pitchFamily="34" charset="0"/>
-              </a:rPr>
-              <a:t>Được sử dụng trong lưu trữ dữ liệu vào cơ sở dữ liệu.</a:t>
+              <a:t>3.2. Làm việc với LocalTime</a:t>
+            </a:r>
+          </a:p>
+          <a:p>
+            <a:pPr lvl="1"/>
+            <a:r>
+              <a:rPr lang="en-US">
+                <a:latin typeface="Arial" panose="020B0604020202020204" pitchFamily="34" charset="0"/>
+                <a:cs typeface="Arial" panose="020B0604020202020204" pitchFamily="34" charset="0"/>
+              </a:rPr>
+              <a:t>3.2.1. Khởi tạo LocalTime</a:t>
+            </a:r>
+          </a:p>
+          <a:p>
+            <a:pPr lvl="1"/>
+            <a:r>
+              <a:rPr lang="en-US">
+                <a:latin typeface="Arial" panose="020B0604020202020204" pitchFamily="34" charset="0"/>
+                <a:cs typeface="Arial" panose="020B0604020202020204" pitchFamily="34" charset="0"/>
+              </a:rPr>
+              <a:t>3.2.2. Lấy giờ̀ từ LocalTime</a:t>
+            </a:r>
+          </a:p>
+          <a:p>
+            <a:pPr lvl="1"/>
+            <a:r>
+              <a:rPr lang="en-US">
+                <a:latin typeface="Arial" panose="020B0604020202020204" pitchFamily="34" charset="0"/>
+                <a:cs typeface="Arial" panose="020B0604020202020204" pitchFamily="34" charset="0"/>
+              </a:rPr>
+              <a:t>3.2.3. Lấy phút từ LocalTime</a:t>
+            </a:r>
+          </a:p>
+          <a:p>
+            <a:pPr lvl="1"/>
+            <a:r>
+              <a:rPr lang="en-US">
+                <a:latin typeface="Arial" panose="020B0604020202020204" pitchFamily="34" charset="0"/>
+                <a:cs typeface="Arial" panose="020B0604020202020204" pitchFamily="34" charset="0"/>
+              </a:rPr>
+              <a:t>3.2.4. Lấy giây từ LocalTime</a:t>
+            </a:r>
+          </a:p>
+          <a:p>
+            <a:pPr lvl="1"/>
+            <a:r>
+              <a:rPr lang="en-US">
+                <a:latin typeface="Arial" panose="020B0604020202020204" pitchFamily="34" charset="0"/>
+                <a:cs typeface="Arial" panose="020B0604020202020204" pitchFamily="34" charset="0"/>
+              </a:rPr>
+              <a:t>3.2.5. Chuyển đổi sang LocalDateTime</a:t>
             </a:r>
           </a:p>
         </p:txBody>
@@ -8918,7 +8931,7 @@
     </p:spTree>
     <p:extLst>
       <p:ext uri="{BB962C8B-B14F-4D97-AF65-F5344CB8AC3E}">
-        <p14:creationId xmlns:p14="http://schemas.microsoft.com/office/powerpoint/2010/main" val="2273019698"/>
+        <p14:creationId xmlns:p14="http://schemas.microsoft.com/office/powerpoint/2010/main" val="2729633518"/>
       </p:ext>
     </p:extLst>
   </p:cSld>
@@ -8971,17 +8984,17 @@
                 <a:latin typeface="Arial" panose="020B0604020202020204" pitchFamily="34" charset="0"/>
                 <a:cs typeface="Arial" panose="020B0604020202020204" pitchFamily="34" charset="0"/>
               </a:rPr>
-              <a:t>3.2.1. Khởi tạo LocalTime</a:t>
-            </a:r>
-          </a:p>
-        </p:txBody>
-      </p:sp>
-      <p:sp>
-        <p:nvSpPr>
-          <p:cNvPr id="5" name="Content Placeholder 4">
-            <a:extLst>
-              <a:ext uri="{FF2B5EF4-FFF2-40B4-BE49-F238E27FC236}">
-                <a16:creationId xmlns:a16="http://schemas.microsoft.com/office/drawing/2014/main" id="{9A898BF4-D80F-487C-97F1-A9CC9FC3D09F}"/>
+              <a:t>3.2. Làm việc với LocalTime</a:t>
+            </a:r>
+          </a:p>
+        </p:txBody>
+      </p:sp>
+      <p:sp>
+        <p:nvSpPr>
+          <p:cNvPr id="3" name="Content Placeholder 2">
+            <a:extLst>
+              <a:ext uri="{FF2B5EF4-FFF2-40B4-BE49-F238E27FC236}">
+                <a16:creationId xmlns:a16="http://schemas.microsoft.com/office/drawing/2014/main" id="{6337998B-3737-4D43-973D-24B118D723A2}"/>
               </a:ext>
             </a:extLst>
           </p:cNvPr>
@@ -8994,67 +9007,46 @@
         </p:nvSpPr>
         <p:spPr>
           <a:xfrm>
-            <a:off x="1103312" y="2052918"/>
-            <a:ext cx="9825100" cy="4195481"/>
-          </a:xfrm>
-        </p:spPr>
-        <p:txBody>
-          <a:bodyPr/>
-          <a:lstStyle/>
-          <a:p>
-            <a:r>
-              <a:rPr lang="en-US">
-                <a:latin typeface="Arial" panose="020B0604020202020204" pitchFamily="34" charset="0"/>
-                <a:cs typeface="Arial" panose="020B0604020202020204" pitchFamily="34" charset="0"/>
-              </a:rPr>
-              <a:t>Khởi tạo theo giờ chỉ định</a:t>
-            </a:r>
-          </a:p>
-          <a:p>
-            <a:r>
-              <a:rPr lang="en-US">
-                <a:latin typeface="Arial" panose="020B0604020202020204" pitchFamily="34" charset="0"/>
-                <a:cs typeface="Arial" panose="020B0604020202020204" pitchFamily="34" charset="0"/>
-              </a:rPr>
-              <a:t>Cú pháp: LocalTime &lt;Tên biến&gt; = LocalTime.of(&lt;Giờ&gt;, &lt;Phút&gt;, &lt;Giây&gt;);</a:t>
-            </a:r>
-          </a:p>
-        </p:txBody>
-      </p:sp>
-      <p:pic>
-        <p:nvPicPr>
-          <p:cNvPr id="4" name="Picture 3">
-            <a:extLst>
-              <a:ext uri="{FF2B5EF4-FFF2-40B4-BE49-F238E27FC236}">
-                <a16:creationId xmlns:a16="http://schemas.microsoft.com/office/drawing/2014/main" id="{1CB3CC73-2948-4899-AD56-84AD8C4DADC9}"/>
-              </a:ext>
-            </a:extLst>
-          </p:cNvPr>
-          <p:cNvPicPr>
-            <a:picLocks noChangeAspect="1"/>
-          </p:cNvPicPr>
-          <p:nvPr/>
-        </p:nvPicPr>
-        <p:blipFill>
-          <a:blip r:embed="rId2"/>
-          <a:stretch>
-            <a:fillRect/>
-          </a:stretch>
-        </p:blipFill>
-        <p:spPr>
-          <a:xfrm>
-            <a:off x="1373282" y="3559073"/>
-            <a:ext cx="9445436" cy="2689326"/>
-          </a:xfrm>
-          <a:prstGeom prst="rect">
-            <a:avLst/>
-          </a:prstGeom>
-        </p:spPr>
-      </p:pic>
+            <a:off x="1103312" y="2104008"/>
+            <a:ext cx="8946541" cy="4144392"/>
+          </a:xfrm>
+        </p:spPr>
+        <p:txBody>
+          <a:bodyPr/>
+          <a:lstStyle/>
+          <a:p>
+            <a:r>
+              <a:rPr lang="en-US">
+                <a:latin typeface="Arial" panose="020B0604020202020204" pitchFamily="34" charset="0"/>
+                <a:cs typeface="Arial" panose="020B0604020202020204" pitchFamily="34" charset="0"/>
+              </a:rPr>
+              <a:t>LocalTime đại diện cho dữ liệu giờ.</a:t>
+            </a:r>
+          </a:p>
+          <a:p>
+            <a:r>
+              <a:rPr lang="en-US">
+                <a:latin typeface="Arial" panose="020B0604020202020204" pitchFamily="34" charset="0"/>
+                <a:cs typeface="Arial" panose="020B0604020202020204" pitchFamily="34" charset="0"/>
+              </a:rPr>
+              <a:t>Thường được sử dụng trong các bài toán hoặc yêu cầu có xử lý về giờ.</a:t>
+            </a:r>
+          </a:p>
+          <a:p>
+            <a:r>
+              <a:rPr lang="en-US">
+                <a:latin typeface="Arial" panose="020B0604020202020204" pitchFamily="34" charset="0"/>
+                <a:cs typeface="Arial" panose="020B0604020202020204" pitchFamily="34" charset="0"/>
+              </a:rPr>
+              <a:t>Được sử dụng trong lưu trữ dữ liệu vào cơ sở dữ liệu.</a:t>
+            </a:r>
+          </a:p>
+        </p:txBody>
+      </p:sp>
     </p:spTree>
     <p:extLst>
       <p:ext uri="{BB962C8B-B14F-4D97-AF65-F5344CB8AC3E}">
-        <p14:creationId xmlns:p14="http://schemas.microsoft.com/office/powerpoint/2010/main" val="4121139601"/>
+        <p14:creationId xmlns:p14="http://schemas.microsoft.com/office/powerpoint/2010/main" val="2273019698"/>
       </p:ext>
     </p:extLst>
   </p:cSld>
@@ -9273,16 +9265,16 @@
                 <a:latin typeface="Arial" panose="020B0604020202020204" pitchFamily="34" charset="0"/>
                 <a:cs typeface="Arial" panose="020B0604020202020204" pitchFamily="34" charset="0"/>
               </a:rPr>
-              <a:t>Khởi tạo theo giờ hiện tại</a:t>
-            </a:r>
-          </a:p>
-          <a:p>
-            <a:r>
-              <a:rPr lang="en-US">
-                <a:latin typeface="Arial" panose="020B0604020202020204" pitchFamily="34" charset="0"/>
-                <a:cs typeface="Arial" panose="020B0604020202020204" pitchFamily="34" charset="0"/>
-              </a:rPr>
-              <a:t>Cú pháp: LocalTime &lt;Tên biến&gt; = LocalTime.now();</a:t>
+              <a:t>Khởi tạo theo giờ chỉ định</a:t>
+            </a:r>
+          </a:p>
+          <a:p>
+            <a:r>
+              <a:rPr lang="en-US">
+                <a:latin typeface="Arial" panose="020B0604020202020204" pitchFamily="34" charset="0"/>
+                <a:cs typeface="Arial" panose="020B0604020202020204" pitchFamily="34" charset="0"/>
+              </a:rPr>
+              <a:t>Cú pháp: LocalTime &lt;Tên biến&gt; = LocalTime.of(&lt;Giờ&gt;, &lt;Phút&gt;, &lt;Giây&gt;);</a:t>
             </a:r>
           </a:p>
         </p:txBody>
@@ -9292,7 +9284,7 @@
           <p:cNvPr id="4" name="Picture 3">
             <a:extLst>
               <a:ext uri="{FF2B5EF4-FFF2-40B4-BE49-F238E27FC236}">
-                <a16:creationId xmlns:a16="http://schemas.microsoft.com/office/drawing/2014/main" id="{C190E2EE-ABC1-45A0-B6CD-703ADD5F0983}"/>
+                <a16:creationId xmlns:a16="http://schemas.microsoft.com/office/drawing/2014/main" id="{1CB3CC73-2948-4899-AD56-84AD8C4DADC9}"/>
               </a:ext>
             </a:extLst>
           </p:cNvPr>
@@ -9309,8 +9301,8 @@
         </p:blipFill>
         <p:spPr>
           <a:xfrm>
-            <a:off x="2926734" y="3359954"/>
-            <a:ext cx="6338532" cy="2888445"/>
+            <a:off x="1373282" y="3559073"/>
+            <a:ext cx="9445436" cy="2689326"/>
           </a:xfrm>
           <a:prstGeom prst="rect">
             <a:avLst/>
@@ -9320,7 +9312,7 @@
     </p:spTree>
     <p:extLst>
       <p:ext uri="{BB962C8B-B14F-4D97-AF65-F5344CB8AC3E}">
-        <p14:creationId xmlns:p14="http://schemas.microsoft.com/office/powerpoint/2010/main" val="2480060499"/>
+        <p14:creationId xmlns:p14="http://schemas.microsoft.com/office/powerpoint/2010/main" val="4121139601"/>
       </p:ext>
     </p:extLst>
   </p:cSld>
@@ -9373,7 +9365,7 @@
                 <a:latin typeface="Arial" panose="020B0604020202020204" pitchFamily="34" charset="0"/>
                 <a:cs typeface="Arial" panose="020B0604020202020204" pitchFamily="34" charset="0"/>
               </a:rPr>
-              <a:t>3.2.2. Lấy giờ từ LocalTime</a:t>
+              <a:t>3.2.1. Khởi tạo LocalTime</a:t>
             </a:r>
           </a:p>
         </p:txBody>
@@ -9409,7 +9401,16 @@
                 <a:latin typeface="Arial" panose="020B0604020202020204" pitchFamily="34" charset="0"/>
                 <a:cs typeface="Arial" panose="020B0604020202020204" pitchFamily="34" charset="0"/>
               </a:rPr>
-              <a:t>Cú pháp: &lt;Tên biến&gt;.getHour();</a:t>
+              <a:t>Khởi tạo theo giờ hiện tại</a:t>
+            </a:r>
+          </a:p>
+          <a:p>
+            <a:r>
+              <a:rPr lang="en-US">
+                <a:latin typeface="Arial" panose="020B0604020202020204" pitchFamily="34" charset="0"/>
+                <a:cs typeface="Arial" panose="020B0604020202020204" pitchFamily="34" charset="0"/>
+              </a:rPr>
+              <a:t>Cú pháp: LocalTime &lt;Tên biến&gt; = LocalTime.now();</a:t>
             </a:r>
           </a:p>
         </p:txBody>
@@ -9419,7 +9420,7 @@
           <p:cNvPr id="4" name="Picture 3">
             <a:extLst>
               <a:ext uri="{FF2B5EF4-FFF2-40B4-BE49-F238E27FC236}">
-                <a16:creationId xmlns:a16="http://schemas.microsoft.com/office/drawing/2014/main" id="{DC6CF121-7F35-40B9-BEAF-E5A42D797992}"/>
+                <a16:creationId xmlns:a16="http://schemas.microsoft.com/office/drawing/2014/main" id="{C190E2EE-ABC1-45A0-B6CD-703ADD5F0983}"/>
               </a:ext>
             </a:extLst>
           </p:cNvPr>
@@ -9436,8 +9437,8 @@
         </p:blipFill>
         <p:spPr>
           <a:xfrm>
-            <a:off x="3165756" y="3261584"/>
-            <a:ext cx="5700211" cy="3143698"/>
+            <a:off x="2926734" y="3359954"/>
+            <a:ext cx="6338532" cy="2888445"/>
           </a:xfrm>
           <a:prstGeom prst="rect">
             <a:avLst/>
@@ -9447,7 +9448,7 @@
     </p:spTree>
     <p:extLst>
       <p:ext uri="{BB962C8B-B14F-4D97-AF65-F5344CB8AC3E}">
-        <p14:creationId xmlns:p14="http://schemas.microsoft.com/office/powerpoint/2010/main" val="2565579294"/>
+        <p14:creationId xmlns:p14="http://schemas.microsoft.com/office/powerpoint/2010/main" val="2480060499"/>
       </p:ext>
     </p:extLst>
   </p:cSld>
@@ -9500,7 +9501,7 @@
                 <a:latin typeface="Arial" panose="020B0604020202020204" pitchFamily="34" charset="0"/>
                 <a:cs typeface="Arial" panose="020B0604020202020204" pitchFamily="34" charset="0"/>
               </a:rPr>
-              <a:t>3.2.3. Lấy phút từ LocalTime</a:t>
+              <a:t>3.2.2. Lấy giờ từ LocalTime</a:t>
             </a:r>
           </a:p>
         </p:txBody>
@@ -9536,7 +9537,7 @@
                 <a:latin typeface="Arial" panose="020B0604020202020204" pitchFamily="34" charset="0"/>
                 <a:cs typeface="Arial" panose="020B0604020202020204" pitchFamily="34" charset="0"/>
               </a:rPr>
-              <a:t>Cú pháp: &lt;Tên biến&gt;.getMinute();</a:t>
+              <a:t>Cú pháp: &lt;Tên biến&gt;.getHour();</a:t>
             </a:r>
           </a:p>
         </p:txBody>
@@ -9546,7 +9547,7 @@
           <p:cNvPr id="4" name="Picture 3">
             <a:extLst>
               <a:ext uri="{FF2B5EF4-FFF2-40B4-BE49-F238E27FC236}">
-                <a16:creationId xmlns:a16="http://schemas.microsoft.com/office/drawing/2014/main" id="{7ACC7658-C02F-4621-BF78-C5B4344AA168}"/>
+                <a16:creationId xmlns:a16="http://schemas.microsoft.com/office/drawing/2014/main" id="{DC6CF121-7F35-40B9-BEAF-E5A42D797992}"/>
               </a:ext>
             </a:extLst>
           </p:cNvPr>
@@ -9563,8 +9564,8 @@
         </p:blipFill>
         <p:spPr>
           <a:xfrm>
-            <a:off x="3185980" y="3073000"/>
-            <a:ext cx="5820040" cy="3175399"/>
+            <a:off x="3165756" y="3261584"/>
+            <a:ext cx="5700211" cy="3143698"/>
           </a:xfrm>
           <a:prstGeom prst="rect">
             <a:avLst/>
@@ -9574,7 +9575,7 @@
     </p:spTree>
     <p:extLst>
       <p:ext uri="{BB962C8B-B14F-4D97-AF65-F5344CB8AC3E}">
-        <p14:creationId xmlns:p14="http://schemas.microsoft.com/office/powerpoint/2010/main" val="475126314"/>
+        <p14:creationId xmlns:p14="http://schemas.microsoft.com/office/powerpoint/2010/main" val="2565579294"/>
       </p:ext>
     </p:extLst>
   </p:cSld>
@@ -9627,7 +9628,7 @@
                 <a:latin typeface="Arial" panose="020B0604020202020204" pitchFamily="34" charset="0"/>
                 <a:cs typeface="Arial" panose="020B0604020202020204" pitchFamily="34" charset="0"/>
               </a:rPr>
-              <a:t>3.2.4. Lấy giây từ LocalTime</a:t>
+              <a:t>3.2.3. Lấy phút từ LocalTime</a:t>
             </a:r>
           </a:p>
         </p:txBody>
@@ -9663,7 +9664,7 @@
                 <a:latin typeface="Arial" panose="020B0604020202020204" pitchFamily="34" charset="0"/>
                 <a:cs typeface="Arial" panose="020B0604020202020204" pitchFamily="34" charset="0"/>
               </a:rPr>
-              <a:t>Cú pháp: &lt;Tên biến&gt;.getSecond();</a:t>
+              <a:t>Cú pháp: &lt;Tên biến&gt;.getMinute();</a:t>
             </a:r>
           </a:p>
         </p:txBody>
@@ -9673,7 +9674,7 @@
           <p:cNvPr id="4" name="Picture 3">
             <a:extLst>
               <a:ext uri="{FF2B5EF4-FFF2-40B4-BE49-F238E27FC236}">
-                <a16:creationId xmlns:a16="http://schemas.microsoft.com/office/drawing/2014/main" id="{91EBAE86-1D8E-4DA2-9C3F-A62AD3D00A80}"/>
+                <a16:creationId xmlns:a16="http://schemas.microsoft.com/office/drawing/2014/main" id="{7ACC7658-C02F-4621-BF78-C5B4344AA168}"/>
               </a:ext>
             </a:extLst>
           </p:cNvPr>
@@ -9690,8 +9691,8 @@
         </p:blipFill>
         <p:spPr>
           <a:xfrm>
-            <a:off x="2937014" y="2958142"/>
-            <a:ext cx="6317971" cy="3489927"/>
+            <a:off x="3185980" y="3073000"/>
+            <a:ext cx="5820040" cy="3175399"/>
           </a:xfrm>
           <a:prstGeom prst="rect">
             <a:avLst/>
@@ -9701,7 +9702,7 @@
     </p:spTree>
     <p:extLst>
       <p:ext uri="{BB962C8B-B14F-4D97-AF65-F5344CB8AC3E}">
-        <p14:creationId xmlns:p14="http://schemas.microsoft.com/office/powerpoint/2010/main" val="927189687"/>
+        <p14:creationId xmlns:p14="http://schemas.microsoft.com/office/powerpoint/2010/main" val="475126314"/>
       </p:ext>
     </p:extLst>
   </p:cSld>
@@ -9754,7 +9755,7 @@
                 <a:latin typeface="Arial" panose="020B0604020202020204" pitchFamily="34" charset="0"/>
                 <a:cs typeface="Arial" panose="020B0604020202020204" pitchFamily="34" charset="0"/>
               </a:rPr>
-              <a:t>3.2.5. Chuyển đổi sang LocalDateTime</a:t>
+              <a:t>3.2.4. Lấy giây từ LocalTime</a:t>
             </a:r>
           </a:p>
         </p:txBody>
@@ -9790,7 +9791,7 @@
                 <a:latin typeface="Arial" panose="020B0604020202020204" pitchFamily="34" charset="0"/>
                 <a:cs typeface="Arial" panose="020B0604020202020204" pitchFamily="34" charset="0"/>
               </a:rPr>
-              <a:t>Cú pháp: &lt;Tên biến&gt;.atDate(&lt;Đối tượng LocalDate&gt;);</a:t>
+              <a:t>Cú pháp: &lt;Tên biến&gt;.getSecond();</a:t>
             </a:r>
           </a:p>
         </p:txBody>
@@ -9800,7 +9801,7 @@
           <p:cNvPr id="4" name="Picture 3">
             <a:extLst>
               <a:ext uri="{FF2B5EF4-FFF2-40B4-BE49-F238E27FC236}">
-                <a16:creationId xmlns:a16="http://schemas.microsoft.com/office/drawing/2014/main" id="{7F5F4BB8-1E51-426B-B73F-4C5FFD88CEEF}"/>
+                <a16:creationId xmlns:a16="http://schemas.microsoft.com/office/drawing/2014/main" id="{91EBAE86-1D8E-4DA2-9C3F-A62AD3D00A80}"/>
               </a:ext>
             </a:extLst>
           </p:cNvPr>
@@ -9817,8 +9818,8 @@
         </p:blipFill>
         <p:spPr>
           <a:xfrm>
-            <a:off x="2537030" y="2741620"/>
-            <a:ext cx="6957663" cy="3673158"/>
+            <a:off x="2937014" y="2958142"/>
+            <a:ext cx="6317971" cy="3489927"/>
           </a:xfrm>
           <a:prstGeom prst="rect">
             <a:avLst/>
@@ -9828,7 +9829,7 @@
     </p:spTree>
     <p:extLst>
       <p:ext uri="{BB962C8B-B14F-4D97-AF65-F5344CB8AC3E}">
-        <p14:creationId xmlns:p14="http://schemas.microsoft.com/office/powerpoint/2010/main" val="267650485"/>
+        <p14:creationId xmlns:p14="http://schemas.microsoft.com/office/powerpoint/2010/main" val="927189687"/>
       </p:ext>
     </p:extLst>
   </p:cSld>
@@ -9881,17 +9882,17 @@
                 <a:latin typeface="Arial" panose="020B0604020202020204" pitchFamily="34" charset="0"/>
                 <a:cs typeface="Arial" panose="020B0604020202020204" pitchFamily="34" charset="0"/>
               </a:rPr>
-              <a:t>3. Làm việc với ngày, giờ trong Java</a:t>
-            </a:r>
-          </a:p>
-        </p:txBody>
-      </p:sp>
-      <p:sp>
-        <p:nvSpPr>
-          <p:cNvPr id="3" name="Content Placeholder 2">
-            <a:extLst>
-              <a:ext uri="{FF2B5EF4-FFF2-40B4-BE49-F238E27FC236}">
-                <a16:creationId xmlns:a16="http://schemas.microsoft.com/office/drawing/2014/main" id="{6337998B-3737-4D43-973D-24B118D723A2}"/>
+              <a:t>3.2.5. Chuyển đổi sang LocalDateTime</a:t>
+            </a:r>
+          </a:p>
+        </p:txBody>
+      </p:sp>
+      <p:sp>
+        <p:nvSpPr>
+          <p:cNvPr id="5" name="Content Placeholder 4">
+            <a:extLst>
+              <a:ext uri="{FF2B5EF4-FFF2-40B4-BE49-F238E27FC236}">
+                <a16:creationId xmlns:a16="http://schemas.microsoft.com/office/drawing/2014/main" id="{9A898BF4-D80F-487C-97F1-A9CC9FC3D09F}"/>
               </a:ext>
             </a:extLst>
           </p:cNvPr>
@@ -9904,98 +9905,58 @@
         </p:nvSpPr>
         <p:spPr>
           <a:xfrm>
-            <a:off x="1103312" y="2104008"/>
-            <a:ext cx="8946541" cy="4144392"/>
-          </a:xfrm>
-        </p:spPr>
-        <p:txBody>
-          <a:bodyPr/>
-          <a:lstStyle/>
-          <a:p>
-            <a:r>
-              <a:rPr lang="en-US">
-                <a:latin typeface="Arial" panose="020B0604020202020204" pitchFamily="34" charset="0"/>
-                <a:cs typeface="Arial" panose="020B0604020202020204" pitchFamily="34" charset="0"/>
-              </a:rPr>
-              <a:t>3.3. Làm việc với LocalDateTime</a:t>
-            </a:r>
-          </a:p>
-          <a:p>
-            <a:pPr lvl="1"/>
-            <a:r>
-              <a:rPr lang="en-US">
-                <a:latin typeface="Arial" panose="020B0604020202020204" pitchFamily="34" charset="0"/>
-                <a:cs typeface="Arial" panose="020B0604020202020204" pitchFamily="34" charset="0"/>
-              </a:rPr>
-              <a:t>3.3.1. Khởi tạo LocalDateTime</a:t>
-            </a:r>
-          </a:p>
-          <a:p>
-            <a:pPr lvl="1"/>
-            <a:r>
-              <a:rPr lang="en-US">
-                <a:latin typeface="Arial" panose="020B0604020202020204" pitchFamily="34" charset="0"/>
-                <a:cs typeface="Arial" panose="020B0604020202020204" pitchFamily="34" charset="0"/>
-              </a:rPr>
-              <a:t>3.3.2. Lấy giờ̀ từ LocalDateTime</a:t>
-            </a:r>
-          </a:p>
-          <a:p>
-            <a:pPr lvl="1"/>
-            <a:r>
-              <a:rPr lang="en-US">
-                <a:latin typeface="Arial" panose="020B0604020202020204" pitchFamily="34" charset="0"/>
-                <a:cs typeface="Arial" panose="020B0604020202020204" pitchFamily="34" charset="0"/>
-              </a:rPr>
-              <a:t>3.3.3. Lấy phút từ LocalDateTime</a:t>
-            </a:r>
-          </a:p>
-          <a:p>
-            <a:pPr lvl="1"/>
-            <a:r>
-              <a:rPr lang="en-US">
-                <a:latin typeface="Arial" panose="020B0604020202020204" pitchFamily="34" charset="0"/>
-                <a:cs typeface="Arial" panose="020B0604020202020204" pitchFamily="34" charset="0"/>
-              </a:rPr>
-              <a:t>3.3.4. Lấy giây từ LocalDateTime</a:t>
-            </a:r>
-          </a:p>
-          <a:p>
-            <a:pPr lvl="1"/>
-            <a:r>
-              <a:rPr lang="en-US">
-                <a:latin typeface="Arial" panose="020B0604020202020204" pitchFamily="34" charset="0"/>
-                <a:cs typeface="Arial" panose="020B0604020202020204" pitchFamily="34" charset="0"/>
-              </a:rPr>
-              <a:t>3.3.5. Lấy ngày trong tháng từ LocalDateTime</a:t>
-            </a:r>
-          </a:p>
-          <a:p>
-            <a:pPr lvl="1"/>
-            <a:r>
-              <a:rPr lang="en-US">
-                <a:latin typeface="Arial" panose="020B0604020202020204" pitchFamily="34" charset="0"/>
-                <a:cs typeface="Arial" panose="020B0604020202020204" pitchFamily="34" charset="0"/>
-              </a:rPr>
-              <a:t>3.3.6. Lấy tháng từ LocalDateTime</a:t>
-            </a:r>
-          </a:p>
-          <a:p>
-            <a:pPr lvl="1"/>
-            <a:r>
-              <a:rPr lang="en-US">
-                <a:latin typeface="Arial" panose="020B0604020202020204" pitchFamily="34" charset="0"/>
-                <a:cs typeface="Arial" panose="020B0604020202020204" pitchFamily="34" charset="0"/>
-              </a:rPr>
-              <a:t>3.3.7. Lấy năm từ LocalDateTime</a:t>
-            </a:r>
-          </a:p>
-        </p:txBody>
-      </p:sp>
+            <a:off x="1103312" y="2052918"/>
+            <a:ext cx="9825100" cy="4195481"/>
+          </a:xfrm>
+        </p:spPr>
+        <p:txBody>
+          <a:bodyPr/>
+          <a:lstStyle/>
+          <a:p>
+            <a:r>
+              <a:rPr lang="en-US">
+                <a:latin typeface="Arial" panose="020B0604020202020204" pitchFamily="34" charset="0"/>
+                <a:cs typeface="Arial" panose="020B0604020202020204" pitchFamily="34" charset="0"/>
+              </a:rPr>
+              <a:t>Cú pháp: &lt;Tên biến&gt;.atDate(&lt;Đối tượng LocalDate&gt;);</a:t>
+            </a:r>
+          </a:p>
+        </p:txBody>
+      </p:sp>
+      <p:pic>
+        <p:nvPicPr>
+          <p:cNvPr id="4" name="Picture 3">
+            <a:extLst>
+              <a:ext uri="{FF2B5EF4-FFF2-40B4-BE49-F238E27FC236}">
+                <a16:creationId xmlns:a16="http://schemas.microsoft.com/office/drawing/2014/main" id="{7F5F4BB8-1E51-426B-B73F-4C5FFD88CEEF}"/>
+              </a:ext>
+            </a:extLst>
+          </p:cNvPr>
+          <p:cNvPicPr>
+            <a:picLocks noChangeAspect="1"/>
+          </p:cNvPicPr>
+          <p:nvPr/>
+        </p:nvPicPr>
+        <p:blipFill>
+          <a:blip r:embed="rId2"/>
+          <a:stretch>
+            <a:fillRect/>
+          </a:stretch>
+        </p:blipFill>
+        <p:spPr>
+          <a:xfrm>
+            <a:off x="2537030" y="2741620"/>
+            <a:ext cx="6957663" cy="3673158"/>
+          </a:xfrm>
+          <a:prstGeom prst="rect">
+            <a:avLst/>
+          </a:prstGeom>
+        </p:spPr>
+      </p:pic>
     </p:spTree>
     <p:extLst>
       <p:ext uri="{BB962C8B-B14F-4D97-AF65-F5344CB8AC3E}">
-        <p14:creationId xmlns:p14="http://schemas.microsoft.com/office/powerpoint/2010/main" val="2332905998"/>
+        <p14:creationId xmlns:p14="http://schemas.microsoft.com/office/powerpoint/2010/main" val="267650485"/>
       </p:ext>
     </p:extLst>
   </p:cSld>
@@ -10048,7 +10009,7 @@
                 <a:latin typeface="Arial" panose="020B0604020202020204" pitchFamily="34" charset="0"/>
                 <a:cs typeface="Arial" panose="020B0604020202020204" pitchFamily="34" charset="0"/>
               </a:rPr>
-              <a:t>3.3. Làm việc với LocalDateTime</a:t>
+              <a:t>3. Làm việc với ngày, giờ trong Java</a:t>
             </a:r>
           </a:p>
         </p:txBody>
@@ -10084,25 +10045,77 @@
                 <a:latin typeface="Arial" panose="020B0604020202020204" pitchFamily="34" charset="0"/>
                 <a:cs typeface="Arial" panose="020B0604020202020204" pitchFamily="34" charset="0"/>
               </a:rPr>
-              <a:t>LocalDateTime đại diện cho dữ liệu ngày và giờ.</a:t>
-            </a:r>
-          </a:p>
-          <a:p>
-            <a:r>
-              <a:rPr lang="en-US">
-                <a:latin typeface="Arial" panose="020B0604020202020204" pitchFamily="34" charset="0"/>
-                <a:cs typeface="Arial" panose="020B0604020202020204" pitchFamily="34" charset="0"/>
-              </a:rPr>
-              <a:t>Thường được sử dụng trong các bài toán hoặc yêu cầu có xử lý về ngày và giờ.</a:t>
-            </a:r>
-          </a:p>
-          <a:p>
-            <a:r>
-              <a:rPr lang="en-US">
-                <a:latin typeface="Arial" panose="020B0604020202020204" pitchFamily="34" charset="0"/>
-                <a:cs typeface="Arial" panose="020B0604020202020204" pitchFamily="34" charset="0"/>
-              </a:rPr>
-              <a:t>Được sử dụng trong lưu trữ dữ liệu vào cơ sở dữ liệu.</a:t>
+              <a:t>3.3. Làm việc với LocalDateTime</a:t>
+            </a:r>
+          </a:p>
+          <a:p>
+            <a:pPr lvl="1"/>
+            <a:r>
+              <a:rPr lang="en-US">
+                <a:latin typeface="Arial" panose="020B0604020202020204" pitchFamily="34" charset="0"/>
+                <a:cs typeface="Arial" panose="020B0604020202020204" pitchFamily="34" charset="0"/>
+              </a:rPr>
+              <a:t>3.3.1. Khởi tạo LocalDateTime</a:t>
+            </a:r>
+          </a:p>
+          <a:p>
+            <a:pPr lvl="1"/>
+            <a:r>
+              <a:rPr lang="en-US">
+                <a:latin typeface="Arial" panose="020B0604020202020204" pitchFamily="34" charset="0"/>
+                <a:cs typeface="Arial" panose="020B0604020202020204" pitchFamily="34" charset="0"/>
+              </a:rPr>
+              <a:t>3.3.2. Lấy giờ̀ từ LocalDateTime</a:t>
+            </a:r>
+          </a:p>
+          <a:p>
+            <a:pPr lvl="1"/>
+            <a:r>
+              <a:rPr lang="en-US">
+                <a:latin typeface="Arial" panose="020B0604020202020204" pitchFamily="34" charset="0"/>
+                <a:cs typeface="Arial" panose="020B0604020202020204" pitchFamily="34" charset="0"/>
+              </a:rPr>
+              <a:t>3.3.3. Lấy phút từ LocalDateTime</a:t>
+            </a:r>
+          </a:p>
+          <a:p>
+            <a:pPr lvl="1"/>
+            <a:r>
+              <a:rPr lang="en-US">
+                <a:latin typeface="Arial" panose="020B0604020202020204" pitchFamily="34" charset="0"/>
+                <a:cs typeface="Arial" panose="020B0604020202020204" pitchFamily="34" charset="0"/>
+              </a:rPr>
+              <a:t>3.3.4. Lấy giây từ LocalDateTime</a:t>
+            </a:r>
+          </a:p>
+          <a:p>
+            <a:pPr lvl="1"/>
+            <a:r>
+              <a:rPr lang="en-US">
+                <a:latin typeface="Arial" panose="020B0604020202020204" pitchFamily="34" charset="0"/>
+                <a:cs typeface="Arial" panose="020B0604020202020204" pitchFamily="34" charset="0"/>
+              </a:rPr>
+              <a:t>3.3.5. Lấy ngày trong tháng từ LocalDateTime</a:t>
+            </a:r>
+          </a:p>
+          <a:p>
+            <a:pPr lvl="1"/>
+            <a:r>
+              <a:rPr lang="en-US">
+                <a:latin typeface="Arial" panose="020B0604020202020204" pitchFamily="34" charset="0"/>
+                <a:cs typeface="Arial" panose="020B0604020202020204" pitchFamily="34" charset="0"/>
+              </a:rPr>
+              <a:t>3.3.6. Lấy tháng từ LocalDateTime</a:t>
+            </a:r>
+          </a:p>
+          <a:p>
+            <a:pPr lvl="1"/>
+            <a:r>
+              <a:rPr lang="en-US">
+                <a:latin typeface="Arial" panose="020B0604020202020204" pitchFamily="34" charset="0"/>
+                <a:cs typeface="Arial" panose="020B0604020202020204" pitchFamily="34" charset="0"/>
+              </a:rPr>
+              <a:t>3.3.7. Lấy năm từ LocalDateTime</a:t>
             </a:r>
           </a:p>
         </p:txBody>
@@ -10110,7 +10123,7 @@
     </p:spTree>
     <p:extLst>
       <p:ext uri="{BB962C8B-B14F-4D97-AF65-F5344CB8AC3E}">
-        <p14:creationId xmlns:p14="http://schemas.microsoft.com/office/powerpoint/2010/main" val="1113472364"/>
+        <p14:creationId xmlns:p14="http://schemas.microsoft.com/office/powerpoint/2010/main" val="2332905998"/>
       </p:ext>
     </p:extLst>
   </p:cSld>
@@ -10163,7 +10176,7 @@
                 <a:latin typeface="Arial" panose="020B0604020202020204" pitchFamily="34" charset="0"/>
                 <a:cs typeface="Arial" panose="020B0604020202020204" pitchFamily="34" charset="0"/>
               </a:rPr>
-              <a:t>3.3.1. Khởi tạo LocalDateTime</a:t>
+              <a:t>3.3. Làm việc với LocalDateTime</a:t>
             </a:r>
           </a:p>
         </p:txBody>
@@ -10199,54 +10212,33 @@
                 <a:latin typeface="Arial" panose="020B0604020202020204" pitchFamily="34" charset="0"/>
                 <a:cs typeface="Arial" panose="020B0604020202020204" pitchFamily="34" charset="0"/>
               </a:rPr>
-              <a:t>Khởi tạo theo ngày và giờ chỉ định</a:t>
-            </a:r>
-          </a:p>
-          <a:p>
-            <a:r>
-              <a:rPr lang="en-US">
-                <a:latin typeface="Arial" panose="020B0604020202020204" pitchFamily="34" charset="0"/>
-                <a:cs typeface="Arial" panose="020B0604020202020204" pitchFamily="34" charset="0"/>
-              </a:rPr>
-              <a:t>Cú pháp: LocalDateTime &lt;Tên biến&gt; = LocalDateTime.of(&lt;Năm&gt;, &lt;Tháng&gt;, &lt;Ngày&gt;, &lt;Giờ&gt;, &lt;Phút&gt;, &lt;Giây&gt;);</a:t>
-            </a:r>
-          </a:p>
-        </p:txBody>
-      </p:sp>
-      <p:pic>
-        <p:nvPicPr>
-          <p:cNvPr id="5" name="Picture 4">
-            <a:extLst>
-              <a:ext uri="{FF2B5EF4-FFF2-40B4-BE49-F238E27FC236}">
-                <a16:creationId xmlns:a16="http://schemas.microsoft.com/office/drawing/2014/main" id="{12957383-DA7F-4E5F-BB5E-57455A7A189A}"/>
-              </a:ext>
-            </a:extLst>
-          </p:cNvPr>
-          <p:cNvPicPr>
-            <a:picLocks noChangeAspect="1"/>
-          </p:cNvPicPr>
-          <p:nvPr/>
-        </p:nvPicPr>
-        <p:blipFill>
-          <a:blip r:embed="rId2"/>
-          <a:stretch>
-            <a:fillRect/>
-          </a:stretch>
-        </p:blipFill>
-        <p:spPr>
-          <a:xfrm>
-            <a:off x="2274239" y="3737756"/>
-            <a:ext cx="7643522" cy="2651990"/>
-          </a:xfrm>
-          <a:prstGeom prst="rect">
-            <a:avLst/>
-          </a:prstGeom>
-        </p:spPr>
-      </p:pic>
+              <a:t>LocalDateTime đại diện cho dữ liệu ngày và giờ.</a:t>
+            </a:r>
+          </a:p>
+          <a:p>
+            <a:r>
+              <a:rPr lang="en-US">
+                <a:latin typeface="Arial" panose="020B0604020202020204" pitchFamily="34" charset="0"/>
+                <a:cs typeface="Arial" panose="020B0604020202020204" pitchFamily="34" charset="0"/>
+              </a:rPr>
+              <a:t>Thường được sử dụng trong các bài toán hoặc yêu cầu có xử lý về ngày và giờ.</a:t>
+            </a:r>
+          </a:p>
+          <a:p>
+            <a:r>
+              <a:rPr lang="en-US">
+                <a:latin typeface="Arial" panose="020B0604020202020204" pitchFamily="34" charset="0"/>
+                <a:cs typeface="Arial" panose="020B0604020202020204" pitchFamily="34" charset="0"/>
+              </a:rPr>
+              <a:t>Được sử dụng trong lưu trữ dữ liệu vào cơ sở dữ liệu.</a:t>
+            </a:r>
+          </a:p>
+        </p:txBody>
+      </p:sp>
     </p:spTree>
     <p:extLst>
       <p:ext uri="{BB962C8B-B14F-4D97-AF65-F5344CB8AC3E}">
-        <p14:creationId xmlns:p14="http://schemas.microsoft.com/office/powerpoint/2010/main" val="3964141354"/>
+        <p14:creationId xmlns:p14="http://schemas.microsoft.com/office/powerpoint/2010/main" val="1113472364"/>
       </p:ext>
     </p:extLst>
   </p:cSld>
@@ -10335,16 +10327,16 @@
                 <a:latin typeface="Arial" panose="020B0604020202020204" pitchFamily="34" charset="0"/>
                 <a:cs typeface="Arial" panose="020B0604020202020204" pitchFamily="34" charset="0"/>
               </a:rPr>
-              <a:t>Khởi tạo theo ngày và giờ hiện tại</a:t>
-            </a:r>
-          </a:p>
-          <a:p>
-            <a:r>
-              <a:rPr lang="en-US">
-                <a:latin typeface="Arial" panose="020B0604020202020204" pitchFamily="34" charset="0"/>
-                <a:cs typeface="Arial" panose="020B0604020202020204" pitchFamily="34" charset="0"/>
-              </a:rPr>
-              <a:t>Cú pháp: LocalDateTime &lt;Tên biến&gt; = LocalDateTime.now();</a:t>
+              <a:t>Khởi tạo theo ngày và giờ chỉ định</a:t>
+            </a:r>
+          </a:p>
+          <a:p>
+            <a:r>
+              <a:rPr lang="en-US">
+                <a:latin typeface="Arial" panose="020B0604020202020204" pitchFamily="34" charset="0"/>
+                <a:cs typeface="Arial" panose="020B0604020202020204" pitchFamily="34" charset="0"/>
+              </a:rPr>
+              <a:t>Cú pháp: LocalDateTime &lt;Tên biến&gt; = LocalDateTime.of(&lt;Năm&gt;, &lt;Tháng&gt;, &lt;Ngày&gt;, &lt;Giờ&gt;, &lt;Phút&gt;, &lt;Giây&gt;);</a:t>
             </a:r>
           </a:p>
         </p:txBody>
@@ -10354,7 +10346,7 @@
           <p:cNvPr id="5" name="Picture 4">
             <a:extLst>
               <a:ext uri="{FF2B5EF4-FFF2-40B4-BE49-F238E27FC236}">
-                <a16:creationId xmlns:a16="http://schemas.microsoft.com/office/drawing/2014/main" id="{34ADE5F1-6A32-4E3E-AD31-56941415DB4B}"/>
+                <a16:creationId xmlns:a16="http://schemas.microsoft.com/office/drawing/2014/main" id="{12957383-DA7F-4E5F-BB5E-57455A7A189A}"/>
               </a:ext>
             </a:extLst>
           </p:cNvPr>
@@ -10371,8 +10363,8 @@
         </p:blipFill>
         <p:spPr>
           <a:xfrm>
-            <a:off x="2077760" y="3429000"/>
-            <a:ext cx="8036479" cy="2932794"/>
+            <a:off x="2274239" y="3737756"/>
+            <a:ext cx="7643522" cy="2651990"/>
           </a:xfrm>
           <a:prstGeom prst="rect">
             <a:avLst/>
@@ -10382,7 +10374,7 @@
     </p:spTree>
     <p:extLst>
       <p:ext uri="{BB962C8B-B14F-4D97-AF65-F5344CB8AC3E}">
-        <p14:creationId xmlns:p14="http://schemas.microsoft.com/office/powerpoint/2010/main" val="3582700544"/>
+        <p14:creationId xmlns:p14="http://schemas.microsoft.com/office/powerpoint/2010/main" val="3964141354"/>
       </p:ext>
     </p:extLst>
   </p:cSld>
@@ -10435,7 +10427,7 @@
                 <a:latin typeface="Arial" panose="020B0604020202020204" pitchFamily="34" charset="0"/>
                 <a:cs typeface="Arial" panose="020B0604020202020204" pitchFamily="34" charset="0"/>
               </a:rPr>
-              <a:t>3.3.2. Lấy giờ từ LocalDateTime</a:t>
+              <a:t>3.3.1. Khởi tạo LocalDateTime</a:t>
             </a:r>
           </a:p>
         </p:txBody>
@@ -10471,7 +10463,16 @@
                 <a:latin typeface="Arial" panose="020B0604020202020204" pitchFamily="34" charset="0"/>
                 <a:cs typeface="Arial" panose="020B0604020202020204" pitchFamily="34" charset="0"/>
               </a:rPr>
-              <a:t>Cú pháp: &lt;Tên biến&gt;.getHour();</a:t>
+              <a:t>Khởi tạo theo ngày và giờ hiện tại</a:t>
+            </a:r>
+          </a:p>
+          <a:p>
+            <a:r>
+              <a:rPr lang="en-US">
+                <a:latin typeface="Arial" panose="020B0604020202020204" pitchFamily="34" charset="0"/>
+                <a:cs typeface="Arial" panose="020B0604020202020204" pitchFamily="34" charset="0"/>
+              </a:rPr>
+              <a:t>Cú pháp: LocalDateTime &lt;Tên biến&gt; = LocalDateTime.now();</a:t>
             </a:r>
           </a:p>
         </p:txBody>
@@ -10481,7 +10482,7 @@
           <p:cNvPr id="5" name="Picture 4">
             <a:extLst>
               <a:ext uri="{FF2B5EF4-FFF2-40B4-BE49-F238E27FC236}">
-                <a16:creationId xmlns:a16="http://schemas.microsoft.com/office/drawing/2014/main" id="{00FA084E-FD4A-46EA-A758-5BF1EB8A11E8}"/>
+                <a16:creationId xmlns:a16="http://schemas.microsoft.com/office/drawing/2014/main" id="{34ADE5F1-6A32-4E3E-AD31-56941415DB4B}"/>
               </a:ext>
             </a:extLst>
           </p:cNvPr>
@@ -10498,8 +10499,8 @@
         </p:blipFill>
         <p:spPr>
           <a:xfrm>
-            <a:off x="2395974" y="2981710"/>
-            <a:ext cx="7400051" cy="3266690"/>
+            <a:off x="2077760" y="3429000"/>
+            <a:ext cx="8036479" cy="2932794"/>
           </a:xfrm>
           <a:prstGeom prst="rect">
             <a:avLst/>
@@ -10509,7 +10510,7 @@
     </p:spTree>
     <p:extLst>
       <p:ext uri="{BB962C8B-B14F-4D97-AF65-F5344CB8AC3E}">
-        <p14:creationId xmlns:p14="http://schemas.microsoft.com/office/powerpoint/2010/main" val="2451019258"/>
+        <p14:creationId xmlns:p14="http://schemas.microsoft.com/office/powerpoint/2010/main" val="3582700544"/>
       </p:ext>
     </p:extLst>
   </p:cSld>
@@ -10695,7 +10696,7 @@
                 <a:latin typeface="Arial" panose="020B0604020202020204" pitchFamily="34" charset="0"/>
                 <a:cs typeface="Arial" panose="020B0604020202020204" pitchFamily="34" charset="0"/>
               </a:rPr>
-              <a:t>3.3.3. Lấy phút từ LocalDateTime</a:t>
+              <a:t>3.3.2. Lấy giờ từ LocalDateTime</a:t>
             </a:r>
           </a:p>
         </p:txBody>
@@ -10731,7 +10732,7 @@
                 <a:latin typeface="Arial" panose="020B0604020202020204" pitchFamily="34" charset="0"/>
                 <a:cs typeface="Arial" panose="020B0604020202020204" pitchFamily="34" charset="0"/>
               </a:rPr>
-              <a:t>Cú pháp: &lt;Tên biến&gt;.getMinute();</a:t>
+              <a:t>Cú pháp: &lt;Tên biến&gt;.getHour();</a:t>
             </a:r>
           </a:p>
         </p:txBody>
@@ -10741,7 +10742,7 @@
           <p:cNvPr id="5" name="Picture 4">
             <a:extLst>
               <a:ext uri="{FF2B5EF4-FFF2-40B4-BE49-F238E27FC236}">
-                <a16:creationId xmlns:a16="http://schemas.microsoft.com/office/drawing/2014/main" id="{3B6C7262-DD26-4E09-8827-0F1DF1BEA837}"/>
+                <a16:creationId xmlns:a16="http://schemas.microsoft.com/office/drawing/2014/main" id="{00FA084E-FD4A-46EA-A758-5BF1EB8A11E8}"/>
               </a:ext>
             </a:extLst>
           </p:cNvPr>
@@ -10758,8 +10759,8 @@
         </p:blipFill>
         <p:spPr>
           <a:xfrm>
-            <a:off x="2336383" y="3101786"/>
-            <a:ext cx="7375909" cy="3303496"/>
+            <a:off x="2395974" y="2981710"/>
+            <a:ext cx="7400051" cy="3266690"/>
           </a:xfrm>
           <a:prstGeom prst="rect">
             <a:avLst/>
@@ -10769,7 +10770,7 @@
     </p:spTree>
     <p:extLst>
       <p:ext uri="{BB962C8B-B14F-4D97-AF65-F5344CB8AC3E}">
-        <p14:creationId xmlns:p14="http://schemas.microsoft.com/office/powerpoint/2010/main" val="4239348865"/>
+        <p14:creationId xmlns:p14="http://schemas.microsoft.com/office/powerpoint/2010/main" val="2451019258"/>
       </p:ext>
     </p:extLst>
   </p:cSld>
@@ -10822,7 +10823,7 @@
                 <a:latin typeface="Arial" panose="020B0604020202020204" pitchFamily="34" charset="0"/>
                 <a:cs typeface="Arial" panose="020B0604020202020204" pitchFamily="34" charset="0"/>
               </a:rPr>
-              <a:t>3.3.4. Lấy giây từ LocalDateTime</a:t>
+              <a:t>3.3.3. Lấy phút từ LocalDateTime</a:t>
             </a:r>
           </a:p>
         </p:txBody>
@@ -10858,7 +10859,7 @@
                 <a:latin typeface="Arial" panose="020B0604020202020204" pitchFamily="34" charset="0"/>
                 <a:cs typeface="Arial" panose="020B0604020202020204" pitchFamily="34" charset="0"/>
               </a:rPr>
-              <a:t>Cú pháp: &lt;Tên biến&gt;.getSecond();</a:t>
+              <a:t>Cú pháp: &lt;Tên biến&gt;.getMinute();</a:t>
             </a:r>
           </a:p>
         </p:txBody>
@@ -10868,7 +10869,7 @@
           <p:cNvPr id="5" name="Picture 4">
             <a:extLst>
               <a:ext uri="{FF2B5EF4-FFF2-40B4-BE49-F238E27FC236}">
-                <a16:creationId xmlns:a16="http://schemas.microsoft.com/office/drawing/2014/main" id="{8EE52A88-9E7E-4082-860A-7645BF21582E}"/>
+                <a16:creationId xmlns:a16="http://schemas.microsoft.com/office/drawing/2014/main" id="{3B6C7262-DD26-4E09-8827-0F1DF1BEA837}"/>
               </a:ext>
             </a:extLst>
           </p:cNvPr>
@@ -10885,8 +10886,8 @@
         </p:blipFill>
         <p:spPr>
           <a:xfrm>
-            <a:off x="2200500" y="2888722"/>
-            <a:ext cx="7790999" cy="3516560"/>
+            <a:off x="2336383" y="3101786"/>
+            <a:ext cx="7375909" cy="3303496"/>
           </a:xfrm>
           <a:prstGeom prst="rect">
             <a:avLst/>
@@ -10896,7 +10897,7 @@
     </p:spTree>
     <p:extLst>
       <p:ext uri="{BB962C8B-B14F-4D97-AF65-F5344CB8AC3E}">
-        <p14:creationId xmlns:p14="http://schemas.microsoft.com/office/powerpoint/2010/main" val="199725228"/>
+        <p14:creationId xmlns:p14="http://schemas.microsoft.com/office/powerpoint/2010/main" val="4239348865"/>
       </p:ext>
     </p:extLst>
   </p:cSld>
@@ -10949,7 +10950,7 @@
                 <a:latin typeface="Arial" panose="020B0604020202020204" pitchFamily="34" charset="0"/>
                 <a:cs typeface="Arial" panose="020B0604020202020204" pitchFamily="34" charset="0"/>
               </a:rPr>
-              <a:t>3.3.5. Lấy ngày trong tháng từ LocalDateTime</a:t>
+              <a:t>3.3.4. Lấy giây từ LocalDateTime</a:t>
             </a:r>
           </a:p>
         </p:txBody>
@@ -10985,7 +10986,7 @@
                 <a:latin typeface="Arial" panose="020B0604020202020204" pitchFamily="34" charset="0"/>
                 <a:cs typeface="Arial" panose="020B0604020202020204" pitchFamily="34" charset="0"/>
               </a:rPr>
-              <a:t>Cú pháp: &lt;Tên biến&gt;.getDayOfMonth();</a:t>
+              <a:t>Cú pháp: &lt;Tên biến&gt;.getSecond();</a:t>
             </a:r>
           </a:p>
         </p:txBody>
@@ -10995,7 +10996,7 @@
           <p:cNvPr id="5" name="Picture 4">
             <a:extLst>
               <a:ext uri="{FF2B5EF4-FFF2-40B4-BE49-F238E27FC236}">
-                <a16:creationId xmlns:a16="http://schemas.microsoft.com/office/drawing/2014/main" id="{58B63541-4B8B-47D6-9CBC-EF2E8509B34D}"/>
+                <a16:creationId xmlns:a16="http://schemas.microsoft.com/office/drawing/2014/main" id="{8EE52A88-9E7E-4082-860A-7645BF21582E}"/>
               </a:ext>
             </a:extLst>
           </p:cNvPr>
@@ -11012,8 +11013,8 @@
         </p:blipFill>
         <p:spPr>
           <a:xfrm>
-            <a:off x="2263471" y="3039196"/>
-            <a:ext cx="7665058" cy="3366086"/>
+            <a:off x="2200500" y="2888722"/>
+            <a:ext cx="7790999" cy="3516560"/>
           </a:xfrm>
           <a:prstGeom prst="rect">
             <a:avLst/>
@@ -11023,7 +11024,7 @@
     </p:spTree>
     <p:extLst>
       <p:ext uri="{BB962C8B-B14F-4D97-AF65-F5344CB8AC3E}">
-        <p14:creationId xmlns:p14="http://schemas.microsoft.com/office/powerpoint/2010/main" val="1040527662"/>
+        <p14:creationId xmlns:p14="http://schemas.microsoft.com/office/powerpoint/2010/main" val="199725228"/>
       </p:ext>
     </p:extLst>
   </p:cSld>
@@ -11076,7 +11077,7 @@
                 <a:latin typeface="Arial" panose="020B0604020202020204" pitchFamily="34" charset="0"/>
                 <a:cs typeface="Arial" panose="020B0604020202020204" pitchFamily="34" charset="0"/>
               </a:rPr>
-              <a:t>3.3.6. Lấy tháng từ LocalDateTime</a:t>
+              <a:t>3.3.5. Lấy ngày trong tháng từ LocalDateTime</a:t>
             </a:r>
           </a:p>
         </p:txBody>
@@ -11112,7 +11113,7 @@
                 <a:latin typeface="Arial" panose="020B0604020202020204" pitchFamily="34" charset="0"/>
                 <a:cs typeface="Arial" panose="020B0604020202020204" pitchFamily="34" charset="0"/>
               </a:rPr>
-              <a:t>Cú pháp: &lt;Tên biến&gt;.getMonthValue();</a:t>
+              <a:t>Cú pháp: &lt;Tên biến&gt;.getDayOfMonth();</a:t>
             </a:r>
           </a:p>
         </p:txBody>
@@ -11122,7 +11123,7 @@
           <p:cNvPr id="5" name="Picture 4">
             <a:extLst>
               <a:ext uri="{FF2B5EF4-FFF2-40B4-BE49-F238E27FC236}">
-                <a16:creationId xmlns:a16="http://schemas.microsoft.com/office/drawing/2014/main" id="{60A015E5-223E-4992-96CF-B2A1F8946872}"/>
+                <a16:creationId xmlns:a16="http://schemas.microsoft.com/office/drawing/2014/main" id="{58B63541-4B8B-47D6-9CBC-EF2E8509B34D}"/>
               </a:ext>
             </a:extLst>
           </p:cNvPr>
@@ -11139,8 +11140,8 @@
         </p:blipFill>
         <p:spPr>
           <a:xfrm>
-            <a:off x="1991282" y="2797054"/>
-            <a:ext cx="8209435" cy="3650982"/>
+            <a:off x="2263471" y="3039196"/>
+            <a:ext cx="7665058" cy="3366086"/>
           </a:xfrm>
           <a:prstGeom prst="rect">
             <a:avLst/>
@@ -11150,7 +11151,7 @@
     </p:spTree>
     <p:extLst>
       <p:ext uri="{BB962C8B-B14F-4D97-AF65-F5344CB8AC3E}">
-        <p14:creationId xmlns:p14="http://schemas.microsoft.com/office/powerpoint/2010/main" val="2299596420"/>
+        <p14:creationId xmlns:p14="http://schemas.microsoft.com/office/powerpoint/2010/main" val="1040527662"/>
       </p:ext>
     </p:extLst>
   </p:cSld>
@@ -11203,7 +11204,7 @@
                 <a:latin typeface="Arial" panose="020B0604020202020204" pitchFamily="34" charset="0"/>
                 <a:cs typeface="Arial" panose="020B0604020202020204" pitchFamily="34" charset="0"/>
               </a:rPr>
-              <a:t>3.3.7. Lấy năm từ LocalDateTime</a:t>
+              <a:t>3.3.6. Lấy tháng từ LocalDateTime</a:t>
             </a:r>
           </a:p>
         </p:txBody>
@@ -11239,7 +11240,7 @@
                 <a:latin typeface="Arial" panose="020B0604020202020204" pitchFamily="34" charset="0"/>
                 <a:cs typeface="Arial" panose="020B0604020202020204" pitchFamily="34" charset="0"/>
               </a:rPr>
-              <a:t>Cú pháp: &lt;Tên biến&gt;.getYear();</a:t>
+              <a:t>Cú pháp: &lt;Tên biến&gt;.getMonthValue();</a:t>
             </a:r>
           </a:p>
         </p:txBody>
@@ -11249,7 +11250,7 @@
           <p:cNvPr id="5" name="Picture 4">
             <a:extLst>
               <a:ext uri="{FF2B5EF4-FFF2-40B4-BE49-F238E27FC236}">
-                <a16:creationId xmlns:a16="http://schemas.microsoft.com/office/drawing/2014/main" id="{DB6A71D5-1447-4E6A-BDD1-23F02E5AB9E4}"/>
+                <a16:creationId xmlns:a16="http://schemas.microsoft.com/office/drawing/2014/main" id="{60A015E5-223E-4992-96CF-B2A1F8946872}"/>
               </a:ext>
             </a:extLst>
           </p:cNvPr>
@@ -11266,8 +11267,8 @@
         </p:blipFill>
         <p:spPr>
           <a:xfrm>
-            <a:off x="2282410" y="2999064"/>
-            <a:ext cx="7627180" cy="3406218"/>
+            <a:off x="1991282" y="2797054"/>
+            <a:ext cx="8209435" cy="3650982"/>
           </a:xfrm>
           <a:prstGeom prst="rect">
             <a:avLst/>
@@ -11277,7 +11278,7 @@
     </p:spTree>
     <p:extLst>
       <p:ext uri="{BB962C8B-B14F-4D97-AF65-F5344CB8AC3E}">
-        <p14:creationId xmlns:p14="http://schemas.microsoft.com/office/powerpoint/2010/main" val="1594829967"/>
+        <p14:creationId xmlns:p14="http://schemas.microsoft.com/office/powerpoint/2010/main" val="2299596420"/>
       </p:ext>
     </p:extLst>
   </p:cSld>
@@ -11330,7 +11331,7 @@
                 <a:latin typeface="Arial" panose="020B0604020202020204" pitchFamily="34" charset="0"/>
                 <a:cs typeface="Arial" panose="020B0604020202020204" pitchFamily="34" charset="0"/>
               </a:rPr>
-              <a:t>3.4. Làm việc với DateTimeFormatter</a:t>
+              <a:t>3.3.7. Lấy năm từ LocalDateTime</a:t>
             </a:r>
           </a:p>
         </p:txBody>
@@ -11366,33 +11367,45 @@
                 <a:latin typeface="Arial" panose="020B0604020202020204" pitchFamily="34" charset="0"/>
                 <a:cs typeface="Arial" panose="020B0604020202020204" pitchFamily="34" charset="0"/>
               </a:rPr>
-              <a:t>3.4.1. Khởi tạo DateTimeFormatter</a:t>
-            </a:r>
-          </a:p>
-          <a:p>
-            <a:r>
-              <a:rPr lang="en-US">
-                <a:latin typeface="Arial" panose="020B0604020202020204" pitchFamily="34" charset="0"/>
-                <a:cs typeface="Arial" panose="020B0604020202020204" pitchFamily="34" charset="0"/>
-              </a:rPr>
-              <a:t>3.4.2. Chuyển đổi từ chuỗi sang LocalDateTime</a:t>
-            </a:r>
-          </a:p>
-          <a:p>
-            <a:r>
-              <a:rPr lang="en-US">
-                <a:latin typeface="Arial" panose="020B0604020202020204" pitchFamily="34" charset="0"/>
-                <a:cs typeface="Arial" panose="020B0604020202020204" pitchFamily="34" charset="0"/>
-              </a:rPr>
-              <a:t>3.4.3. Chuyển đổi từ LocalDateTime sang chuỗi</a:t>
-            </a:r>
-          </a:p>
-        </p:txBody>
-      </p:sp>
+              <a:t>Cú pháp: &lt;Tên biến&gt;.getYear();</a:t>
+            </a:r>
+          </a:p>
+        </p:txBody>
+      </p:sp>
+      <p:pic>
+        <p:nvPicPr>
+          <p:cNvPr id="5" name="Picture 4">
+            <a:extLst>
+              <a:ext uri="{FF2B5EF4-FFF2-40B4-BE49-F238E27FC236}">
+                <a16:creationId xmlns:a16="http://schemas.microsoft.com/office/drawing/2014/main" id="{DB6A71D5-1447-4E6A-BDD1-23F02E5AB9E4}"/>
+              </a:ext>
+            </a:extLst>
+          </p:cNvPr>
+          <p:cNvPicPr>
+            <a:picLocks noChangeAspect="1"/>
+          </p:cNvPicPr>
+          <p:nvPr/>
+        </p:nvPicPr>
+        <p:blipFill>
+          <a:blip r:embed="rId2"/>
+          <a:stretch>
+            <a:fillRect/>
+          </a:stretch>
+        </p:blipFill>
+        <p:spPr>
+          <a:xfrm>
+            <a:off x="2282410" y="2999064"/>
+            <a:ext cx="7627180" cy="3406218"/>
+          </a:xfrm>
+          <a:prstGeom prst="rect">
+            <a:avLst/>
+          </a:prstGeom>
+        </p:spPr>
+      </p:pic>
     </p:spTree>
     <p:extLst>
       <p:ext uri="{BB962C8B-B14F-4D97-AF65-F5344CB8AC3E}">
-        <p14:creationId xmlns:p14="http://schemas.microsoft.com/office/powerpoint/2010/main" val="3925848473"/>
+        <p14:creationId xmlns:p14="http://schemas.microsoft.com/office/powerpoint/2010/main" val="1594829967"/>
       </p:ext>
     </p:extLst>
   </p:cSld>
@@ -11468,108 +11481,38 @@
         </p:nvSpPr>
         <p:spPr>
           <a:xfrm>
-            <a:off x="1103312" y="1482571"/>
-            <a:ext cx="8946541" cy="4765829"/>
-          </a:xfrm>
-        </p:spPr>
-        <p:txBody>
-          <a:bodyPr/>
-          <a:lstStyle/>
-          <a:p>
-            <a:r>
-              <a:rPr lang="en-US">
-                <a:latin typeface="Arial" panose="020B0604020202020204" pitchFamily="34" charset="0"/>
-                <a:cs typeface="Arial" panose="020B0604020202020204" pitchFamily="34" charset="0"/>
-              </a:rPr>
-              <a:t>DateTimeFormatter là bộ chuyển đổi dữ liệu giữa LocalDateTime với chuỗi. Hỗ trợ chuyển đổi qua lại giữa 2 kiểu dữ liệu này.</a:t>
-            </a:r>
-          </a:p>
-          <a:p>
-            <a:r>
-              <a:rPr lang="en-US">
-                <a:latin typeface="Arial" panose="020B0604020202020204" pitchFamily="34" charset="0"/>
-                <a:cs typeface="Arial" panose="020B0604020202020204" pitchFamily="34" charset="0"/>
-              </a:rPr>
-              <a:t>DateTimeFormatter hoạt động dựa trên chuỗi định dạng mẫu được cung cấp bởi người dùng.</a:t>
-            </a:r>
-          </a:p>
-          <a:p>
-            <a:r>
-              <a:rPr lang="en-US">
-                <a:latin typeface="Arial" panose="020B0604020202020204" pitchFamily="34" charset="0"/>
-                <a:cs typeface="Arial" panose="020B0604020202020204" pitchFamily="34" charset="0"/>
-              </a:rPr>
-              <a:t>Ví dụ chuỗi định dạng mẫu: dd/MM/yyyy HH:mm:ss</a:t>
-            </a:r>
-          </a:p>
-          <a:p>
-            <a:pPr lvl="1"/>
-            <a:r>
-              <a:rPr lang="en-US">
-                <a:latin typeface="Arial" panose="020B0604020202020204" pitchFamily="34" charset="0"/>
-                <a:cs typeface="Arial" panose="020B0604020202020204" pitchFamily="34" charset="0"/>
-              </a:rPr>
-              <a:t>Trong đó:</a:t>
-            </a:r>
-          </a:p>
-          <a:p>
-            <a:pPr lvl="1"/>
-            <a:r>
-              <a:rPr lang="en-US">
-                <a:latin typeface="Arial" panose="020B0604020202020204" pitchFamily="34" charset="0"/>
-                <a:cs typeface="Arial" panose="020B0604020202020204" pitchFamily="34" charset="0"/>
-              </a:rPr>
-              <a:t>H: Giờ trong 24 giờ</a:t>
-            </a:r>
-          </a:p>
-          <a:p>
-            <a:pPr lvl="1"/>
-            <a:r>
-              <a:rPr lang="en-US">
-                <a:latin typeface="Arial" panose="020B0604020202020204" pitchFamily="34" charset="0"/>
-                <a:cs typeface="Arial" panose="020B0604020202020204" pitchFamily="34" charset="0"/>
-              </a:rPr>
-              <a:t>m: Phút</a:t>
-            </a:r>
-          </a:p>
-          <a:p>
-            <a:pPr lvl="1"/>
-            <a:r>
-              <a:rPr lang="en-US">
-                <a:latin typeface="Arial" panose="020B0604020202020204" pitchFamily="34" charset="0"/>
-                <a:cs typeface="Arial" panose="020B0604020202020204" pitchFamily="34" charset="0"/>
-              </a:rPr>
-              <a:t>s: Giây</a:t>
-            </a:r>
-          </a:p>
-          <a:p>
-            <a:pPr lvl="1"/>
-            <a:r>
-              <a:rPr lang="en-US">
-                <a:latin typeface="Arial" panose="020B0604020202020204" pitchFamily="34" charset="0"/>
-                <a:cs typeface="Arial" panose="020B0604020202020204" pitchFamily="34" charset="0"/>
-              </a:rPr>
-              <a:t>d: Ngày trong tháng</a:t>
-            </a:r>
-          </a:p>
-          <a:p>
-            <a:pPr lvl="1"/>
-            <a:r>
-              <a:rPr lang="en-US">
-                <a:latin typeface="Arial" panose="020B0604020202020204" pitchFamily="34" charset="0"/>
-                <a:cs typeface="Arial" panose="020B0604020202020204" pitchFamily="34" charset="0"/>
-              </a:rPr>
-              <a:t>M: Tháng trong năm</a:t>
-            </a:r>
-          </a:p>
-          <a:p>
-            <a:pPr lvl="1"/>
-            <a:r>
-              <a:rPr lang="en-US">
-                <a:latin typeface="Arial" panose="020B0604020202020204" pitchFamily="34" charset="0"/>
-                <a:cs typeface="Arial" panose="020B0604020202020204" pitchFamily="34" charset="0"/>
-              </a:rPr>
-              <a:t>y: Năm</a:t>
+            <a:off x="1103312" y="2104008"/>
+            <a:ext cx="8946541" cy="4144392"/>
+          </a:xfrm>
+        </p:spPr>
+        <p:txBody>
+          <a:bodyPr/>
+          <a:lstStyle/>
+          <a:p>
+            <a:r>
+              <a:rPr lang="en-US">
+                <a:latin typeface="Arial" panose="020B0604020202020204" pitchFamily="34" charset="0"/>
+                <a:cs typeface="Arial" panose="020B0604020202020204" pitchFamily="34" charset="0"/>
+              </a:rPr>
+              <a:t>3.4.1. Khởi tạo DateTimeFormatter</a:t>
+            </a:r>
+          </a:p>
+          <a:p>
+            <a:r>
+              <a:rPr lang="en-US">
+                <a:latin typeface="Arial" panose="020B0604020202020204" pitchFamily="34" charset="0"/>
+                <a:cs typeface="Arial" panose="020B0604020202020204" pitchFamily="34" charset="0"/>
+              </a:rPr>
+              <a:t>3.4.2. Chuyển đổi từ chuỗi sang LocalDateTime</a:t>
+            </a:r>
+          </a:p>
+          <a:p>
+            <a:r>
+              <a:rPr lang="en-US">
+                <a:latin typeface="Arial" panose="020B0604020202020204" pitchFamily="34" charset="0"/>
+                <a:cs typeface="Arial" panose="020B0604020202020204" pitchFamily="34" charset="0"/>
+              </a:rPr>
+              <a:t>3.4.3. Chuyển đổi từ LocalDateTime sang chuỗi</a:t>
             </a:r>
           </a:p>
         </p:txBody>
@@ -11577,7 +11520,7 @@
     </p:spTree>
     <p:extLst>
       <p:ext uri="{BB962C8B-B14F-4D97-AF65-F5344CB8AC3E}">
-        <p14:creationId xmlns:p14="http://schemas.microsoft.com/office/powerpoint/2010/main" val="2033613769"/>
+        <p14:creationId xmlns:p14="http://schemas.microsoft.com/office/powerpoint/2010/main" val="3925848473"/>
       </p:ext>
     </p:extLst>
   </p:cSld>
@@ -11630,7 +11573,7 @@
                 <a:latin typeface="Arial" panose="020B0604020202020204" pitchFamily="34" charset="0"/>
                 <a:cs typeface="Arial" panose="020B0604020202020204" pitchFamily="34" charset="0"/>
               </a:rPr>
-              <a:t>3.4.1. Khởi tạo DateTimeFormatter</a:t>
+              <a:t>3.4. Làm việc với DateTimeFormatter</a:t>
             </a:r>
           </a:p>
         </p:txBody>
@@ -11653,58 +11596,116 @@
         </p:nvSpPr>
         <p:spPr>
           <a:xfrm>
-            <a:off x="1103312" y="2104008"/>
-            <a:ext cx="8946541" cy="4144392"/>
-          </a:xfrm>
-        </p:spPr>
-        <p:txBody>
-          <a:bodyPr/>
-          <a:lstStyle/>
-          <a:p>
-            <a:r>
-              <a:rPr lang="en-US">
-                <a:latin typeface="Arial" panose="020B0604020202020204" pitchFamily="34" charset="0"/>
-                <a:cs typeface="Arial" panose="020B0604020202020204" pitchFamily="34" charset="0"/>
-              </a:rPr>
-              <a:t>Cú pháp: DateTimeFormatter &lt;Tên biến&gt; = DateTimeFormatter.ofPattern(&lt;Chuỗi định dạng&gt;)</a:t>
-            </a:r>
-          </a:p>
-        </p:txBody>
-      </p:sp>
-      <p:pic>
-        <p:nvPicPr>
-          <p:cNvPr id="5" name="Picture 4">
-            <a:extLst>
-              <a:ext uri="{FF2B5EF4-FFF2-40B4-BE49-F238E27FC236}">
-                <a16:creationId xmlns:a16="http://schemas.microsoft.com/office/drawing/2014/main" id="{43EB1D69-8A12-4D8F-ADF0-2454FDD95B0E}"/>
-              </a:ext>
-            </a:extLst>
-          </p:cNvPr>
-          <p:cNvPicPr>
-            <a:picLocks noChangeAspect="1"/>
-          </p:cNvPicPr>
-          <p:nvPr/>
-        </p:nvPicPr>
-        <p:blipFill>
-          <a:blip r:embed="rId2"/>
-          <a:stretch>
-            <a:fillRect/>
-          </a:stretch>
-        </p:blipFill>
-        <p:spPr>
-          <a:xfrm>
-            <a:off x="1167872" y="3429000"/>
-            <a:ext cx="9856256" cy="2891901"/>
-          </a:xfrm>
-          <a:prstGeom prst="rect">
-            <a:avLst/>
-          </a:prstGeom>
-        </p:spPr>
-      </p:pic>
+            <a:off x="1103312" y="1482571"/>
+            <a:ext cx="8946541" cy="4765829"/>
+          </a:xfrm>
+        </p:spPr>
+        <p:txBody>
+          <a:bodyPr/>
+          <a:lstStyle/>
+          <a:p>
+            <a:r>
+              <a:rPr lang="en-US">
+                <a:latin typeface="Arial" panose="020B0604020202020204" pitchFamily="34" charset="0"/>
+                <a:cs typeface="Arial" panose="020B0604020202020204" pitchFamily="34" charset="0"/>
+              </a:rPr>
+              <a:t>DateTimeFormatter là bộ chuyển đổi dữ liệu giữa LocalDateTime với chuỗi. Hỗ trợ chuyển đổi qua lại giữa 2 kiểu dữ liệu này.</a:t>
+            </a:r>
+          </a:p>
+          <a:p>
+            <a:r>
+              <a:rPr lang="en-US">
+                <a:latin typeface="Arial" panose="020B0604020202020204" pitchFamily="34" charset="0"/>
+                <a:cs typeface="Arial" panose="020B0604020202020204" pitchFamily="34" charset="0"/>
+              </a:rPr>
+              <a:t>DateTimeFormatter hoạt động dựa trên chuỗi định dạng mẫu được cung cấp bởi người dùng.</a:t>
+            </a:r>
+          </a:p>
+          <a:p>
+            <a:r>
+              <a:rPr lang="en-US">
+                <a:latin typeface="Arial" panose="020B0604020202020204" pitchFamily="34" charset="0"/>
+                <a:cs typeface="Arial" panose="020B0604020202020204" pitchFamily="34" charset="0"/>
+              </a:rPr>
+              <a:t>Ví dụ chuỗi định dạng mẫu: dd/MM/yyyy HH:mm:ss</a:t>
+            </a:r>
+          </a:p>
+          <a:p>
+            <a:pPr lvl="1"/>
+            <a:r>
+              <a:rPr lang="en-US">
+                <a:latin typeface="Arial" panose="020B0604020202020204" pitchFamily="34" charset="0"/>
+                <a:cs typeface="Arial" panose="020B0604020202020204" pitchFamily="34" charset="0"/>
+              </a:rPr>
+              <a:t>Trong đó:</a:t>
+            </a:r>
+          </a:p>
+          <a:p>
+            <a:pPr lvl="1"/>
+            <a:r>
+              <a:rPr lang="en-US">
+                <a:latin typeface="Arial" panose="020B0604020202020204" pitchFamily="34" charset="0"/>
+                <a:cs typeface="Arial" panose="020B0604020202020204" pitchFamily="34" charset="0"/>
+              </a:rPr>
+              <a:t>H: Giờ trong 24 giờ</a:t>
+            </a:r>
+          </a:p>
+          <a:p>
+            <a:pPr lvl="1"/>
+            <a:r>
+              <a:rPr lang="en-US">
+                <a:latin typeface="Arial" panose="020B0604020202020204" pitchFamily="34" charset="0"/>
+                <a:cs typeface="Arial" panose="020B0604020202020204" pitchFamily="34" charset="0"/>
+              </a:rPr>
+              <a:t>m: Phút</a:t>
+            </a:r>
+          </a:p>
+          <a:p>
+            <a:pPr lvl="1"/>
+            <a:r>
+              <a:rPr lang="en-US">
+                <a:latin typeface="Arial" panose="020B0604020202020204" pitchFamily="34" charset="0"/>
+                <a:cs typeface="Arial" panose="020B0604020202020204" pitchFamily="34" charset="0"/>
+              </a:rPr>
+              <a:t>s: Giây</a:t>
+            </a:r>
+          </a:p>
+          <a:p>
+            <a:pPr lvl="1"/>
+            <a:r>
+              <a:rPr lang="en-US">
+                <a:latin typeface="Arial" panose="020B0604020202020204" pitchFamily="34" charset="0"/>
+                <a:cs typeface="Arial" panose="020B0604020202020204" pitchFamily="34" charset="0"/>
+              </a:rPr>
+              <a:t>d: Ngày trong tháng</a:t>
+            </a:r>
+          </a:p>
+          <a:p>
+            <a:pPr lvl="1"/>
+            <a:r>
+              <a:rPr lang="en-US">
+                <a:latin typeface="Arial" panose="020B0604020202020204" pitchFamily="34" charset="0"/>
+                <a:cs typeface="Arial" panose="020B0604020202020204" pitchFamily="34" charset="0"/>
+              </a:rPr>
+              <a:t>M: Tháng trong năm</a:t>
+            </a:r>
+          </a:p>
+          <a:p>
+            <a:pPr lvl="1"/>
+            <a:r>
+              <a:rPr lang="en-US">
+                <a:latin typeface="Arial" panose="020B0604020202020204" pitchFamily="34" charset="0"/>
+                <a:cs typeface="Arial" panose="020B0604020202020204" pitchFamily="34" charset="0"/>
+              </a:rPr>
+              <a:t>y: Năm</a:t>
+            </a:r>
+          </a:p>
+        </p:txBody>
+      </p:sp>
     </p:spTree>
     <p:extLst>
       <p:ext uri="{BB962C8B-B14F-4D97-AF65-F5344CB8AC3E}">
-        <p14:creationId xmlns:p14="http://schemas.microsoft.com/office/powerpoint/2010/main" val="370193167"/>
+        <p14:creationId xmlns:p14="http://schemas.microsoft.com/office/powerpoint/2010/main" val="2033613769"/>
       </p:ext>
     </p:extLst>
   </p:cSld>
@@ -11757,7 +11758,7 @@
                 <a:latin typeface="Arial" panose="020B0604020202020204" pitchFamily="34" charset="0"/>
                 <a:cs typeface="Arial" panose="020B0604020202020204" pitchFamily="34" charset="0"/>
               </a:rPr>
-              <a:t>3.4.2. Chuyển đổi chuỗi sang LocalDateTime</a:t>
+              <a:t>3.4.1. Khởi tạo DateTimeFormatter</a:t>
             </a:r>
           </a:p>
         </p:txBody>
@@ -11793,7 +11794,7 @@
                 <a:latin typeface="Arial" panose="020B0604020202020204" pitchFamily="34" charset="0"/>
                 <a:cs typeface="Arial" panose="020B0604020202020204" pitchFamily="34" charset="0"/>
               </a:rPr>
-              <a:t>Cú pháp: &lt;Tên biến&gt;.parse(&lt;Chuỗi ngày giờ theo định dạng&gt;);</a:t>
+              <a:t>Cú pháp: DateTimeFormatter &lt;Tên biến&gt; = DateTimeFormatter.ofPattern(&lt;Chuỗi định dạng&gt;)</a:t>
             </a:r>
           </a:p>
         </p:txBody>
@@ -11803,7 +11804,7 @@
           <p:cNvPr id="5" name="Picture 4">
             <a:extLst>
               <a:ext uri="{FF2B5EF4-FFF2-40B4-BE49-F238E27FC236}">
-                <a16:creationId xmlns:a16="http://schemas.microsoft.com/office/drawing/2014/main" id="{46CAA756-AE81-4FA2-BF99-0B4AB9AF9C9A}"/>
+                <a16:creationId xmlns:a16="http://schemas.microsoft.com/office/drawing/2014/main" id="{43EB1D69-8A12-4D8F-ADF0-2454FDD95B0E}"/>
               </a:ext>
             </a:extLst>
           </p:cNvPr>
@@ -11820,8 +11821,8 @@
         </p:blipFill>
         <p:spPr>
           <a:xfrm>
-            <a:off x="1969412" y="2959817"/>
-            <a:ext cx="8253175" cy="3353091"/>
+            <a:off x="1167872" y="3429000"/>
+            <a:ext cx="9856256" cy="2891901"/>
           </a:xfrm>
           <a:prstGeom prst="rect">
             <a:avLst/>
@@ -11831,7 +11832,7 @@
     </p:spTree>
     <p:extLst>
       <p:ext uri="{BB962C8B-B14F-4D97-AF65-F5344CB8AC3E}">
-        <p14:creationId xmlns:p14="http://schemas.microsoft.com/office/powerpoint/2010/main" val="3113895594"/>
+        <p14:creationId xmlns:p14="http://schemas.microsoft.com/office/powerpoint/2010/main" val="370193167"/>
       </p:ext>
     </p:extLst>
   </p:cSld>
@@ -11884,7 +11885,7 @@
                 <a:latin typeface="Arial" panose="020B0604020202020204" pitchFamily="34" charset="0"/>
                 <a:cs typeface="Arial" panose="020B0604020202020204" pitchFamily="34" charset="0"/>
               </a:rPr>
-              <a:t>3.4.3. Chuyển đổi LocalDateTime sang chuỗi</a:t>
+              <a:t>3.4.2. Chuyển đổi chuỗi sang LocalDateTime</a:t>
             </a:r>
           </a:p>
         </p:txBody>
@@ -11920,7 +11921,7 @@
                 <a:latin typeface="Arial" panose="020B0604020202020204" pitchFamily="34" charset="0"/>
                 <a:cs typeface="Arial" panose="020B0604020202020204" pitchFamily="34" charset="0"/>
               </a:rPr>
-              <a:t>Cú pháp: &lt;Tên biến&gt;.format(&lt;Đối tượng LocalDateTime&gt;);</a:t>
+              <a:t>Cú pháp: &lt;Tên biến&gt;.parse(&lt;Chuỗi ngày giờ theo định dạng&gt;);</a:t>
             </a:r>
           </a:p>
         </p:txBody>
@@ -11930,7 +11931,7 @@
           <p:cNvPr id="5" name="Picture 4">
             <a:extLst>
               <a:ext uri="{FF2B5EF4-FFF2-40B4-BE49-F238E27FC236}">
-                <a16:creationId xmlns:a16="http://schemas.microsoft.com/office/drawing/2014/main" id="{4B9E0D46-2482-4BD8-93EE-2E3F0F601D40}"/>
+                <a16:creationId xmlns:a16="http://schemas.microsoft.com/office/drawing/2014/main" id="{46CAA756-AE81-4FA2-BF99-0B4AB9AF9C9A}"/>
               </a:ext>
             </a:extLst>
           </p:cNvPr>
@@ -11947,8 +11948,8 @@
         </p:blipFill>
         <p:spPr>
           <a:xfrm>
-            <a:off x="1950361" y="2605003"/>
-            <a:ext cx="8291278" cy="3894157"/>
+            <a:off x="1969412" y="2959817"/>
+            <a:ext cx="8253175" cy="3353091"/>
           </a:xfrm>
           <a:prstGeom prst="rect">
             <a:avLst/>
@@ -11958,7 +11959,7 @@
     </p:spTree>
     <p:extLst>
       <p:ext uri="{BB962C8B-B14F-4D97-AF65-F5344CB8AC3E}">
-        <p14:creationId xmlns:p14="http://schemas.microsoft.com/office/powerpoint/2010/main" val="1321708332"/>
+        <p14:creationId xmlns:p14="http://schemas.microsoft.com/office/powerpoint/2010/main" val="3113895594"/>
       </p:ext>
     </p:extLst>
   </p:cSld>
@@ -12149,21 +12150,55 @@
           </a:p>
         </p:txBody>
       </p:sp>
+      <p:sp>
+        <p:nvSpPr>
+          <p:cNvPr id="3" name="Content Placeholder 2">
+            <a:extLst>
+              <a:ext uri="{FF2B5EF4-FFF2-40B4-BE49-F238E27FC236}">
+                <a16:creationId xmlns:a16="http://schemas.microsoft.com/office/drawing/2014/main" id="{6337998B-3737-4D43-973D-24B118D723A2}"/>
+              </a:ext>
+            </a:extLst>
+          </p:cNvPr>
+          <p:cNvSpPr>
+            <a:spLocks noGrp="1"/>
+          </p:cNvSpPr>
+          <p:nvPr>
+            <p:ph idx="1"/>
+          </p:nvPr>
+        </p:nvSpPr>
+        <p:spPr>
+          <a:xfrm>
+            <a:off x="1103312" y="2104008"/>
+            <a:ext cx="8946541" cy="4144392"/>
+          </a:xfrm>
+        </p:spPr>
+        <p:txBody>
+          <a:bodyPr/>
+          <a:lstStyle/>
+          <a:p>
+            <a:r>
+              <a:rPr lang="en-US">
+                <a:latin typeface="Arial" panose="020B0604020202020204" pitchFamily="34" charset="0"/>
+                <a:cs typeface="Arial" panose="020B0604020202020204" pitchFamily="34" charset="0"/>
+              </a:rPr>
+              <a:t>Cú pháp: &lt;Tên biến&gt;.format(&lt;Đối tượng LocalDateTime&gt;);</a:t>
+            </a:r>
+          </a:p>
+        </p:txBody>
+      </p:sp>
       <p:pic>
         <p:nvPicPr>
-          <p:cNvPr id="6" name="Content Placeholder 5">
-            <a:extLst>
-              <a:ext uri="{FF2B5EF4-FFF2-40B4-BE49-F238E27FC236}">
-                <a16:creationId xmlns:a16="http://schemas.microsoft.com/office/drawing/2014/main" id="{41CEF995-3A03-49E9-95D8-F359E493BDED}"/>
+          <p:cNvPr id="5" name="Picture 4">
+            <a:extLst>
+              <a:ext uri="{FF2B5EF4-FFF2-40B4-BE49-F238E27FC236}">
+                <a16:creationId xmlns:a16="http://schemas.microsoft.com/office/drawing/2014/main" id="{4B9E0D46-2482-4BD8-93EE-2E3F0F601D40}"/>
               </a:ext>
             </a:extLst>
           </p:cNvPr>
           <p:cNvPicPr>
-            <a:picLocks noGrp="1" noChangeAspect="1"/>
+            <a:picLocks noChangeAspect="1"/>
           </p:cNvPicPr>
-          <p:nvPr>
-            <p:ph idx="1"/>
-          </p:nvPr>
+          <p:nvPr/>
         </p:nvPicPr>
         <p:blipFill>
           <a:blip r:embed="rId2"/>
@@ -12173,15 +12208,18 @@
         </p:blipFill>
         <p:spPr>
           <a:xfrm>
-            <a:off x="3867695" y="3269397"/>
-            <a:ext cx="4456609" cy="2387470"/>
-          </a:xfrm>
+            <a:off x="1950361" y="2605003"/>
+            <a:ext cx="8291278" cy="3894157"/>
+          </a:xfrm>
+          <a:prstGeom prst="rect">
+            <a:avLst/>
+          </a:prstGeom>
         </p:spPr>
       </p:pic>
     </p:spTree>
     <p:extLst>
       <p:ext uri="{BB962C8B-B14F-4D97-AF65-F5344CB8AC3E}">
-        <p14:creationId xmlns:p14="http://schemas.microsoft.com/office/powerpoint/2010/main" val="28175638"/>
+        <p14:creationId xmlns:p14="http://schemas.microsoft.com/office/powerpoint/2010/main" val="1321708332"/>
       </p:ext>
     </p:extLst>
   </p:cSld>
@@ -12234,91 +12272,44 @@
                 <a:latin typeface="Arial" panose="020B0604020202020204" pitchFamily="34" charset="0"/>
                 <a:cs typeface="Arial" panose="020B0604020202020204" pitchFamily="34" charset="0"/>
               </a:rPr>
-              <a:t>Bài tập thực hành</a:t>
-            </a:r>
-          </a:p>
-        </p:txBody>
-      </p:sp>
-      <p:sp>
-        <p:nvSpPr>
-          <p:cNvPr id="3" name="Content Placeholder 2">
-            <a:extLst>
-              <a:ext uri="{FF2B5EF4-FFF2-40B4-BE49-F238E27FC236}">
-                <a16:creationId xmlns:a16="http://schemas.microsoft.com/office/drawing/2014/main" id="{6337998B-3737-4D43-973D-24B118D723A2}"/>
-              </a:ext>
-            </a:extLst>
-          </p:cNvPr>
-          <p:cNvSpPr>
-            <a:spLocks noGrp="1"/>
-          </p:cNvSpPr>
+              <a:t>3.4.3. Chuyển đổi LocalDateTime sang chuỗi</a:t>
+            </a:r>
+          </a:p>
+        </p:txBody>
+      </p:sp>
+      <p:pic>
+        <p:nvPicPr>
+          <p:cNvPr id="6" name="Content Placeholder 5">
+            <a:extLst>
+              <a:ext uri="{FF2B5EF4-FFF2-40B4-BE49-F238E27FC236}">
+                <a16:creationId xmlns:a16="http://schemas.microsoft.com/office/drawing/2014/main" id="{41CEF995-3A03-49E9-95D8-F359E493BDED}"/>
+              </a:ext>
+            </a:extLst>
+          </p:cNvPr>
+          <p:cNvPicPr>
+            <a:picLocks noGrp="1" noChangeAspect="1"/>
+          </p:cNvPicPr>
           <p:nvPr>
             <p:ph idx="1"/>
           </p:nvPr>
-        </p:nvSpPr>
-        <p:spPr>
-          <a:xfrm>
-            <a:off x="1103312" y="2237173"/>
-            <a:ext cx="8946541" cy="4011227"/>
-          </a:xfrm>
-        </p:spPr>
-        <p:txBody>
-          <a:bodyPr/>
-          <a:lstStyle/>
-          <a:p>
-            <a:r>
-              <a:rPr lang="en-US">
-                <a:latin typeface="Arial" panose="020B0604020202020204" pitchFamily="34" charset="0"/>
-                <a:cs typeface="Arial" panose="020B0604020202020204" pitchFamily="34" charset="0"/>
-              </a:rPr>
-              <a:t>Bài 1: Viết chương trình:</a:t>
-            </a:r>
-          </a:p>
-          <a:p>
-            <a:pPr lvl="1"/>
-            <a:r>
-              <a:rPr lang="en-US">
-                <a:latin typeface="Arial" panose="020B0604020202020204" pitchFamily="34" charset="0"/>
-                <a:cs typeface="Arial" panose="020B0604020202020204" pitchFamily="34" charset="0"/>
-              </a:rPr>
-              <a:t>Yêu cầu người dùng nhập kích thước mảng.</a:t>
-            </a:r>
-          </a:p>
-          <a:p>
-            <a:pPr lvl="1"/>
-            <a:r>
-              <a:rPr lang="en-US">
-                <a:latin typeface="Arial" panose="020B0604020202020204" pitchFamily="34" charset="0"/>
-                <a:cs typeface="Arial" panose="020B0604020202020204" pitchFamily="34" charset="0"/>
-              </a:rPr>
-              <a:t>Yêu cầu người dùng nhập phần tử là số nguyên cho mảng dựa trên kích thước đã nhập.</a:t>
-            </a:r>
-          </a:p>
-          <a:p>
-            <a:pPr lvl="1"/>
-            <a:r>
-              <a:rPr lang="en-US">
-                <a:latin typeface="Arial" panose="020B0604020202020204" pitchFamily="34" charset="0"/>
-                <a:cs typeface="Arial" panose="020B0604020202020204" pitchFamily="34" charset="0"/>
-              </a:rPr>
-              <a:t>Sau khi ngườ dùng nhập đủ số lượng phần tử, tính trung bình cộng những số nguyên mà người dùng đã nhập.</a:t>
-            </a:r>
-          </a:p>
-          <a:p>
-            <a:pPr lvl="1"/>
-            <a:r>
-              <a:rPr lang="en-US">
-                <a:latin typeface="Arial" panose="020B0604020202020204" pitchFamily="34" charset="0"/>
-                <a:cs typeface="Arial" panose="020B0604020202020204" pitchFamily="34" charset="0"/>
-              </a:rPr>
-              <a:t>In kết quả tính toán ra màn hình.</a:t>
-            </a:r>
-          </a:p>
-        </p:txBody>
-      </p:sp>
+        </p:nvPicPr>
+        <p:blipFill>
+          <a:blip r:embed="rId2"/>
+          <a:stretch>
+            <a:fillRect/>
+          </a:stretch>
+        </p:blipFill>
+        <p:spPr>
+          <a:xfrm>
+            <a:off x="3867695" y="3269397"/>
+            <a:ext cx="4456609" cy="2387470"/>
+          </a:xfrm>
+        </p:spPr>
+      </p:pic>
     </p:spTree>
     <p:extLst>
       <p:ext uri="{BB962C8B-B14F-4D97-AF65-F5344CB8AC3E}">
-        <p14:creationId xmlns:p14="http://schemas.microsoft.com/office/powerpoint/2010/main" val="2003179678"/>
+        <p14:creationId xmlns:p14="http://schemas.microsoft.com/office/powerpoint/2010/main" val="28175638"/>
       </p:ext>
     </p:extLst>
   </p:cSld>
@@ -12407,7 +12398,7 @@
                 <a:latin typeface="Arial" panose="020B0604020202020204" pitchFamily="34" charset="0"/>
                 <a:cs typeface="Arial" panose="020B0604020202020204" pitchFamily="34" charset="0"/>
               </a:rPr>
-              <a:t>Bài 2: Viết chương trình:</a:t>
+              <a:t>Bài 1: Viết chương trình:</a:t>
             </a:r>
           </a:p>
           <a:p>
@@ -12417,7 +12408,7 @@
                 <a:latin typeface="Arial" panose="020B0604020202020204" pitchFamily="34" charset="0"/>
                 <a:cs typeface="Arial" panose="020B0604020202020204" pitchFamily="34" charset="0"/>
               </a:rPr>
-              <a:t>Yêu cầu người dùng nhập bao nhiêu số thực mà người dùng muốn. Kết thúc khi người dùng nhập gì đó không phải số nguyên.</a:t>
+              <a:t>Yêu cầu người dùng nhập kích thước mảng.</a:t>
             </a:r>
           </a:p>
           <a:p>
@@ -12427,7 +12418,7 @@
                 <a:latin typeface="Arial" panose="020B0604020202020204" pitchFamily="34" charset="0"/>
                 <a:cs typeface="Arial" panose="020B0604020202020204" pitchFamily="34" charset="0"/>
               </a:rPr>
-              <a:t>Sau khi người dùng kết thúc việc nhập số thực, hãy tính trung bình cộng trên những số thực mà người dùng đã nhập.</a:t>
+              <a:t>Yêu cầu người dùng nhập phần tử là số nguyên cho mảng dựa trên kích thước đã nhập.</a:t>
             </a:r>
           </a:p>
           <a:p>
@@ -12437,7 +12428,17 @@
                 <a:latin typeface="Arial" panose="020B0604020202020204" pitchFamily="34" charset="0"/>
                 <a:cs typeface="Arial" panose="020B0604020202020204" pitchFamily="34" charset="0"/>
               </a:rPr>
-              <a:t>In kết quả ra màn hình sau khi tính toán.</a:t>
+              <a:t>Sau khi ngườ dùng nhập đủ số lượng phần tử, tính trung bình cộng những số nguyên mà người dùng đã nhập.</a:t>
+            </a:r>
+          </a:p>
+          <a:p>
+            <a:pPr lvl="1"/>
+            <a:r>
+              <a:rPr lang="en-US">
+                <a:latin typeface="Arial" panose="020B0604020202020204" pitchFamily="34" charset="0"/>
+                <a:cs typeface="Arial" panose="020B0604020202020204" pitchFamily="34" charset="0"/>
+              </a:rPr>
+              <a:t>In kết quả tính toán ra màn hình.</a:t>
             </a:r>
           </a:p>
         </p:txBody>
@@ -12445,7 +12446,7 @@
     </p:spTree>
     <p:extLst>
       <p:ext uri="{BB962C8B-B14F-4D97-AF65-F5344CB8AC3E}">
-        <p14:creationId xmlns:p14="http://schemas.microsoft.com/office/powerpoint/2010/main" val="783567811"/>
+        <p14:creationId xmlns:p14="http://schemas.microsoft.com/office/powerpoint/2010/main" val="2003179678"/>
       </p:ext>
     </p:extLst>
   </p:cSld>
@@ -12534,7 +12535,7 @@
                 <a:latin typeface="Arial" panose="020B0604020202020204" pitchFamily="34" charset="0"/>
                 <a:cs typeface="Arial" panose="020B0604020202020204" pitchFamily="34" charset="0"/>
               </a:rPr>
-              <a:t>Bài 3: Viết chương trình:</a:t>
+              <a:t>Bài 2: Viết chương trình:</a:t>
             </a:r>
           </a:p>
           <a:p>
@@ -12544,7 +12545,7 @@
                 <a:latin typeface="Arial" panose="020B0604020202020204" pitchFamily="34" charset="0"/>
                 <a:cs typeface="Arial" panose="020B0604020202020204" pitchFamily="34" charset="0"/>
               </a:rPr>
-              <a:t>Yêu cầu người dùng nhập bao nhiêu chuỗi mà người dùng muốn. Nhưng các chuỗi người dùng nhập không được trùng với các chuỗi mà người dùng đã từng nhập qua.</a:t>
+              <a:t>Yêu cầu người dùng nhập bao nhiêu số thực mà người dùng muốn. Kết thúc khi người dùng nhập gì đó không phải số nguyên.</a:t>
             </a:r>
           </a:p>
           <a:p>
@@ -12554,7 +12555,7 @@
                 <a:latin typeface="Arial" panose="020B0604020202020204" pitchFamily="34" charset="0"/>
                 <a:cs typeface="Arial" panose="020B0604020202020204" pitchFamily="34" charset="0"/>
               </a:rPr>
-              <a:t>Nếu người dùng nhập lại nội dung đã từng nhập qua, hãy in thông báo ra màn hình cho người dùng biết.</a:t>
+              <a:t>Sau khi người dùng kết thúc việc nhập số thực, hãy tính trung bình cộng trên những số thực mà người dùng đã nhập.</a:t>
             </a:r>
           </a:p>
           <a:p>
@@ -12564,17 +12565,7 @@
                 <a:latin typeface="Arial" panose="020B0604020202020204" pitchFamily="34" charset="0"/>
                 <a:cs typeface="Arial" panose="020B0604020202020204" pitchFamily="34" charset="0"/>
               </a:rPr>
-              <a:t>Người dùng có thể ngừng nhập chuỗi bằng việc nhập chuỗi: "xong".</a:t>
-            </a:r>
-          </a:p>
-          <a:p>
-            <a:pPr lvl="1"/>
-            <a:r>
-              <a:rPr lang="en-US">
-                <a:latin typeface="Arial" panose="020B0604020202020204" pitchFamily="34" charset="0"/>
-                <a:cs typeface="Arial" panose="020B0604020202020204" pitchFamily="34" charset="0"/>
-              </a:rPr>
-              <a:t>Sau khi người dùng ngừng nhập chuỗi, hãy in tất cả những chuỗi mà người dùng đã nhập ra màn hình.</a:t>
+              <a:t>In kết quả ra màn hình sau khi tính toán.</a:t>
             </a:r>
           </a:p>
         </p:txBody>
@@ -12582,7 +12573,7 @@
     </p:spTree>
     <p:extLst>
       <p:ext uri="{BB962C8B-B14F-4D97-AF65-F5344CB8AC3E}">
-        <p14:creationId xmlns:p14="http://schemas.microsoft.com/office/powerpoint/2010/main" val="1864597201"/>
+        <p14:creationId xmlns:p14="http://schemas.microsoft.com/office/powerpoint/2010/main" val="783567811"/>
       </p:ext>
     </p:extLst>
   </p:cSld>
@@ -12671,7 +12662,7 @@
                 <a:latin typeface="Arial" panose="020B0604020202020204" pitchFamily="34" charset="0"/>
                 <a:cs typeface="Arial" panose="020B0604020202020204" pitchFamily="34" charset="0"/>
               </a:rPr>
-              <a:t>Bài 4: Viết chương trình:</a:t>
+              <a:t>Bài 3: Viết chương trình:</a:t>
             </a:r>
           </a:p>
           <a:p>
@@ -12681,7 +12672,7 @@
                 <a:latin typeface="Arial" panose="020B0604020202020204" pitchFamily="34" charset="0"/>
                 <a:cs typeface="Arial" panose="020B0604020202020204" pitchFamily="34" charset="0"/>
               </a:rPr>
-              <a:t>Cho phép người dùng lưu trữ điểm của sinh viên với khóa là mã sinh viên (chuỗi) và giá trị lưu là điểm của sinh viên (số thực không thấp hơn 0 và không vượt quá 10).</a:t>
+              <a:t>Yêu cầu người dùng nhập bao nhiêu chuỗi mà người dùng muốn. Nhưng các chuỗi người dùng nhập không được trùng với các chuỗi mà người dùng đã từng nhập qua.</a:t>
             </a:r>
           </a:p>
           <a:p>
@@ -12691,7 +12682,7 @@
                 <a:latin typeface="Arial" panose="020B0604020202020204" pitchFamily="34" charset="0"/>
                 <a:cs typeface="Arial" panose="020B0604020202020204" pitchFamily="34" charset="0"/>
               </a:rPr>
-              <a:t>Người dùng có thể kết thúc việc nhập dữ bằng việc nhập chuỗi "xong".</a:t>
+              <a:t>Nếu người dùng nhập lại nội dung đã từng nhập qua, hãy in thông báo ra màn hình cho người dùng biết.</a:t>
             </a:r>
           </a:p>
           <a:p>
@@ -12701,17 +12692,17 @@
                 <a:latin typeface="Arial" panose="020B0604020202020204" pitchFamily="34" charset="0"/>
                 <a:cs typeface="Arial" panose="020B0604020202020204" pitchFamily="34" charset="0"/>
               </a:rPr>
-              <a:t>Sau khi việc nhập dữ liệu kết thúc, hãy in ra toàn bộ điểm của sinh viên mà người dùng đã nhập theo định dạng sau:</a:t>
-            </a:r>
-          </a:p>
-          <a:p>
-            <a:pPr lvl="2"/>
-            <a:r>
-              <a:rPr lang="en-US">
-                <a:latin typeface="Arial" panose="020B0604020202020204" pitchFamily="34" charset="0"/>
-                <a:cs typeface="Arial" panose="020B0604020202020204" pitchFamily="34" charset="0"/>
-              </a:rPr>
-              <a:t>&lt;mã sinh viên&gt; -&gt; &lt;điểm&gt;</a:t>
+              <a:t>Người dùng có thể ngừng nhập chuỗi bằng việc nhập chuỗi: "xong".</a:t>
+            </a:r>
+          </a:p>
+          <a:p>
+            <a:pPr lvl="1"/>
+            <a:r>
+              <a:rPr lang="en-US">
+                <a:latin typeface="Arial" panose="020B0604020202020204" pitchFamily="34" charset="0"/>
+                <a:cs typeface="Arial" panose="020B0604020202020204" pitchFamily="34" charset="0"/>
+              </a:rPr>
+              <a:t>Sau khi người dùng ngừng nhập chuỗi, hãy in tất cả những chuỗi mà người dùng đã nhập ra màn hình.</a:t>
             </a:r>
           </a:p>
         </p:txBody>
@@ -12719,7 +12710,7 @@
     </p:spTree>
     <p:extLst>
       <p:ext uri="{BB962C8B-B14F-4D97-AF65-F5344CB8AC3E}">
-        <p14:creationId xmlns:p14="http://schemas.microsoft.com/office/powerpoint/2010/main" val="303125926"/>
+        <p14:creationId xmlns:p14="http://schemas.microsoft.com/office/powerpoint/2010/main" val="1864597201"/>
       </p:ext>
     </p:extLst>
   </p:cSld>
@@ -12808,7 +12799,7 @@
                 <a:latin typeface="Arial" panose="020B0604020202020204" pitchFamily="34" charset="0"/>
                 <a:cs typeface="Arial" panose="020B0604020202020204" pitchFamily="34" charset="0"/>
               </a:rPr>
-              <a:t>Bài 5: Viết chương trình:</a:t>
+              <a:t>Bài 4: Viết chương trình:</a:t>
             </a:r>
           </a:p>
           <a:p>
@@ -12818,7 +12809,7 @@
                 <a:latin typeface="Arial" panose="020B0604020202020204" pitchFamily="34" charset="0"/>
                 <a:cs typeface="Arial" panose="020B0604020202020204" pitchFamily="34" charset="0"/>
               </a:rPr>
-              <a:t>Cho phép người dùng nhập bao nhiêu số nguyên tùy thích. Nhưng không chấp nhận nhập trùng số nguyên đã nhập trước đó.</a:t>
+              <a:t>Cho phép người dùng lưu trữ điểm của sinh viên với khóa là mã sinh viên (chuỗi) và giá trị lưu là điểm của sinh viên (số thực không thấp hơn 0 và không vượt quá 10).</a:t>
             </a:r>
           </a:p>
           <a:p>
@@ -12828,7 +12819,7 @@
                 <a:latin typeface="Arial" panose="020B0604020202020204" pitchFamily="34" charset="0"/>
                 <a:cs typeface="Arial" panose="020B0604020202020204" pitchFamily="34" charset="0"/>
               </a:rPr>
-              <a:t>Người dùng có thể kết thúc việc nhập dữ liệu bằng cách nhập vào chuỗi "xong".</a:t>
+              <a:t>Người dùng có thể kết thúc việc nhập dữ bằng việc nhập chuỗi "xong".</a:t>
             </a:r>
           </a:p>
           <a:p>
@@ -12838,17 +12829,17 @@
                 <a:latin typeface="Arial" panose="020B0604020202020204" pitchFamily="34" charset="0"/>
                 <a:cs typeface="Arial" panose="020B0604020202020204" pitchFamily="34" charset="0"/>
               </a:rPr>
-              <a:t>Sau khi người dùng kết thúc việc nhập dữ liệu, hệ thống yêu cầu người dùng nhập thêm 1 con số nguyên mục tiêu và hãy kiểm tra xem con số nguyên này đã được nhập trước đó bởi người dùng hay chưa ?</a:t>
-            </a:r>
-          </a:p>
-          <a:p>
-            <a:pPr lvl="1"/>
-            <a:r>
-              <a:rPr lang="en-US">
-                <a:latin typeface="Arial" panose="020B0604020202020204" pitchFamily="34" charset="0"/>
-                <a:cs typeface="Arial" panose="020B0604020202020204" pitchFamily="34" charset="0"/>
-              </a:rPr>
-              <a:t>Sau khi kiểm tra, hãy in kết quả kiểm tra ra màn hình để thông báo cho người dùng biết.</a:t>
+              <a:t>Sau khi việc nhập dữ liệu kết thúc, hãy in ra toàn bộ điểm của sinh viên mà người dùng đã nhập theo định dạng sau:</a:t>
+            </a:r>
+          </a:p>
+          <a:p>
+            <a:pPr lvl="2"/>
+            <a:r>
+              <a:rPr lang="en-US">
+                <a:latin typeface="Arial" panose="020B0604020202020204" pitchFamily="34" charset="0"/>
+                <a:cs typeface="Arial" panose="020B0604020202020204" pitchFamily="34" charset="0"/>
+              </a:rPr>
+              <a:t>&lt;mã sinh viên&gt; -&gt; &lt;điểm&gt;</a:t>
             </a:r>
           </a:p>
         </p:txBody>
@@ -12856,7 +12847,7 @@
     </p:spTree>
     <p:extLst>
       <p:ext uri="{BB962C8B-B14F-4D97-AF65-F5344CB8AC3E}">
-        <p14:creationId xmlns:p14="http://schemas.microsoft.com/office/powerpoint/2010/main" val="1548084104"/>
+        <p14:creationId xmlns:p14="http://schemas.microsoft.com/office/powerpoint/2010/main" val="303125926"/>
       </p:ext>
     </p:extLst>
   </p:cSld>
@@ -12945,7 +12936,7 @@
                 <a:latin typeface="Arial" panose="020B0604020202020204" pitchFamily="34" charset="0"/>
                 <a:cs typeface="Arial" panose="020B0604020202020204" pitchFamily="34" charset="0"/>
               </a:rPr>
-              <a:t>Bài 6: Viết chương trình:</a:t>
+              <a:t>Bài 5: Viết chương trình:</a:t>
             </a:r>
           </a:p>
           <a:p>
@@ -12975,17 +12966,7 @@
                 <a:latin typeface="Arial" panose="020B0604020202020204" pitchFamily="34" charset="0"/>
                 <a:cs typeface="Arial" panose="020B0604020202020204" pitchFamily="34" charset="0"/>
               </a:rPr>
-              <a:t>Sau khi người dùng kết thúc việc nhập dữ liệu, hệ thống yêu cầu người dùng nhập thêm 1 con số nguyên mục tiêu và hãy kiểm tra xem con số nguyên này đã được nhập vào lần nhập thứ mấy của người dùng.</a:t>
-            </a:r>
-          </a:p>
-          <a:p>
-            <a:pPr lvl="1"/>
-            <a:r>
-              <a:rPr lang="en-US">
-                <a:latin typeface="Arial" panose="020B0604020202020204" pitchFamily="34" charset="0"/>
-                <a:cs typeface="Arial" panose="020B0604020202020204" pitchFamily="34" charset="0"/>
-              </a:rPr>
-              <a:t>Trường hợp chưa nhập, cũng xuất thông báo cho người dùng biết.</a:t>
+              <a:t>Sau khi người dùng kết thúc việc nhập dữ liệu, hệ thống yêu cầu người dùng nhập thêm 1 con số nguyên mục tiêu và hãy kiểm tra xem con số nguyên này đã được nhập trước đó bởi người dùng hay chưa ?</a:t>
             </a:r>
           </a:p>
           <a:p>
@@ -13003,7 +12984,7 @@
     </p:spTree>
     <p:extLst>
       <p:ext uri="{BB962C8B-B14F-4D97-AF65-F5344CB8AC3E}">
-        <p14:creationId xmlns:p14="http://schemas.microsoft.com/office/powerpoint/2010/main" val="642868837"/>
+        <p14:creationId xmlns:p14="http://schemas.microsoft.com/office/powerpoint/2010/main" val="1548084104"/>
       </p:ext>
     </p:extLst>
   </p:cSld>
@@ -13092,7 +13073,7 @@
                 <a:latin typeface="Arial" panose="020B0604020202020204" pitchFamily="34" charset="0"/>
                 <a:cs typeface="Arial" panose="020B0604020202020204" pitchFamily="34" charset="0"/>
               </a:rPr>
-              <a:t>Bài 7: Viết chương trình:</a:t>
+              <a:t>Bài 6: Viết chương trình:</a:t>
             </a:r>
           </a:p>
           <a:p>
@@ -13102,7 +13083,7 @@
                 <a:latin typeface="Arial" panose="020B0604020202020204" pitchFamily="34" charset="0"/>
                 <a:cs typeface="Arial" panose="020B0604020202020204" pitchFamily="34" charset="0"/>
               </a:rPr>
-              <a:t>Cho phép người dùng lưu trữ điểm của sinh viên với khóa là mã sinh viên (chuỗi) và giá trị lưu là điểm của sinh viên (số thực không thấp hơn 0 và không vượt quá 10).</a:t>
+              <a:t>Cho phép người dùng nhập bao nhiêu số nguyên tùy thích. Nhưng không chấp nhận nhập trùng số nguyên đã nhập trước đó.</a:t>
             </a:r>
           </a:p>
           <a:p>
@@ -13112,7 +13093,7 @@
                 <a:latin typeface="Arial" panose="020B0604020202020204" pitchFamily="34" charset="0"/>
                 <a:cs typeface="Arial" panose="020B0604020202020204" pitchFamily="34" charset="0"/>
               </a:rPr>
-              <a:t>Người dùng có thể kết thúc việc nhập dữ bằng việc nhập chuỗi "xong".</a:t>
+              <a:t>Người dùng có thể kết thúc việc nhập dữ liệu bằng cách nhập vào chuỗi "xong".</a:t>
             </a:r>
           </a:p>
           <a:p>
@@ -13122,7 +13103,7 @@
                 <a:latin typeface="Arial" panose="020B0604020202020204" pitchFamily="34" charset="0"/>
                 <a:cs typeface="Arial" panose="020B0604020202020204" pitchFamily="34" charset="0"/>
               </a:rPr>
-              <a:t>Sau khi việc nhập dữ liệu kết thúc, hệ thống yêu cầu người dùng nhập mã sinh viên mà người dùng muốn kiểm tra điểm.</a:t>
+              <a:t>Sau khi người dùng kết thúc việc nhập dữ liệu, hệ thống yêu cầu người dùng nhập thêm 1 con số nguyên mục tiêu và hãy kiểm tra xem con số nguyên này đã được nhập vào lần nhập thứ mấy của người dùng.</a:t>
             </a:r>
           </a:p>
           <a:p>
@@ -13132,7 +13113,7 @@
                 <a:latin typeface="Arial" panose="020B0604020202020204" pitchFamily="34" charset="0"/>
                 <a:cs typeface="Arial" panose="020B0604020202020204" pitchFamily="34" charset="0"/>
               </a:rPr>
-              <a:t>Sau khi người dùng nhập mã sinh viên, hãy in điểm số của sinh viên đó ra màn hình để thông báo cho người dùng biết.</a:t>
+              <a:t>Trường hợp chưa nhập, cũng xuất thông báo cho người dùng biết.</a:t>
             </a:r>
           </a:p>
           <a:p>
@@ -13142,7 +13123,7 @@
                 <a:latin typeface="Arial" panose="020B0604020202020204" pitchFamily="34" charset="0"/>
                 <a:cs typeface="Arial" panose="020B0604020202020204" pitchFamily="34" charset="0"/>
               </a:rPr>
-              <a:t>Trường hợp sinh viên đó chưa được nhập điểm, hãy xuất thông báo ra để thông báo cho người dùng biết về việc này.</a:t>
+              <a:t>Sau khi kiểm tra, hãy in kết quả kiểm tra ra màn hình để thông báo cho người dùng biết.</a:t>
             </a:r>
           </a:p>
         </p:txBody>
@@ -13150,7 +13131,7 @@
     </p:spTree>
     <p:extLst>
       <p:ext uri="{BB962C8B-B14F-4D97-AF65-F5344CB8AC3E}">
-        <p14:creationId xmlns:p14="http://schemas.microsoft.com/office/powerpoint/2010/main" val="409974809"/>
+        <p14:creationId xmlns:p14="http://schemas.microsoft.com/office/powerpoint/2010/main" val="642868837"/>
       </p:ext>
     </p:extLst>
   </p:cSld>
@@ -13239,7 +13220,7 @@
                 <a:latin typeface="Arial" panose="020B0604020202020204" pitchFamily="34" charset="0"/>
                 <a:cs typeface="Arial" panose="020B0604020202020204" pitchFamily="34" charset="0"/>
               </a:rPr>
-              <a:t>Bài 8: Viết chương trình:</a:t>
+              <a:t>Bài 7: Viết chương trình:</a:t>
             </a:r>
           </a:p>
           <a:p>
@@ -13249,7 +13230,7 @@
                 <a:latin typeface="Arial" panose="020B0604020202020204" pitchFamily="34" charset="0"/>
                 <a:cs typeface="Arial" panose="020B0604020202020204" pitchFamily="34" charset="0"/>
               </a:rPr>
-              <a:t>Yêu cầu người dùng nhập vào một chuỗi ngày theo định dạng: &lt;Ngày&gt;/&lt;Tháng&gt;/&lt;Năm&gt;</a:t>
+              <a:t>Cho phép người dùng lưu trữ điểm của sinh viên với khóa là mã sinh viên (chuỗi) và giá trị lưu là điểm của sinh viên (số thực không thấp hơn 0 và không vượt quá 10).</a:t>
             </a:r>
           </a:p>
           <a:p>
@@ -13259,7 +13240,7 @@
                 <a:latin typeface="Arial" panose="020B0604020202020204" pitchFamily="34" charset="0"/>
                 <a:cs typeface="Arial" panose="020B0604020202020204" pitchFamily="34" charset="0"/>
               </a:rPr>
-              <a:t>Nếu người dùng nhập đúng định dạng, hãy in ra cho người dùng biết ngày, tháng và năm mà người dùng nhập là bao nhiêu.</a:t>
+              <a:t>Người dùng có thể kết thúc việc nhập dữ bằng việc nhập chuỗi "xong".</a:t>
             </a:r>
           </a:p>
           <a:p>
@@ -13269,7 +13250,27 @@
                 <a:latin typeface="Arial" panose="020B0604020202020204" pitchFamily="34" charset="0"/>
                 <a:cs typeface="Arial" panose="020B0604020202020204" pitchFamily="34" charset="0"/>
               </a:rPr>
-              <a:t>Nếu người dùng nhập không đúng định dạng, xuất ra dòng thông báo và yêu cầu người dùng nhập lại cho đến khi người dùng nhập đúng.</a:t>
+              <a:t>Sau khi việc nhập dữ liệu kết thúc, hệ thống yêu cầu người dùng nhập mã sinh viên mà người dùng muốn kiểm tra điểm.</a:t>
+            </a:r>
+          </a:p>
+          <a:p>
+            <a:pPr lvl="1"/>
+            <a:r>
+              <a:rPr lang="en-US">
+                <a:latin typeface="Arial" panose="020B0604020202020204" pitchFamily="34" charset="0"/>
+                <a:cs typeface="Arial" panose="020B0604020202020204" pitchFamily="34" charset="0"/>
+              </a:rPr>
+              <a:t>Sau khi người dùng nhập mã sinh viên, hãy in điểm số của sinh viên đó ra màn hình để thông báo cho người dùng biết.</a:t>
+            </a:r>
+          </a:p>
+          <a:p>
+            <a:pPr lvl="1"/>
+            <a:r>
+              <a:rPr lang="en-US">
+                <a:latin typeface="Arial" panose="020B0604020202020204" pitchFamily="34" charset="0"/>
+                <a:cs typeface="Arial" panose="020B0604020202020204" pitchFamily="34" charset="0"/>
+              </a:rPr>
+              <a:t>Trường hợp sinh viên đó chưa được nhập điểm, hãy xuất thông báo ra để thông báo cho người dùng biết về việc này.</a:t>
             </a:r>
           </a:p>
         </p:txBody>
@@ -13277,7 +13278,7 @@
     </p:spTree>
     <p:extLst>
       <p:ext uri="{BB962C8B-B14F-4D97-AF65-F5344CB8AC3E}">
-        <p14:creationId xmlns:p14="http://schemas.microsoft.com/office/powerpoint/2010/main" val="597969115"/>
+        <p14:creationId xmlns:p14="http://schemas.microsoft.com/office/powerpoint/2010/main" val="409974809"/>
       </p:ext>
     </p:extLst>
   </p:cSld>
@@ -13366,7 +13367,7 @@
                 <a:latin typeface="Arial" panose="020B0604020202020204" pitchFamily="34" charset="0"/>
                 <a:cs typeface="Arial" panose="020B0604020202020204" pitchFamily="34" charset="0"/>
               </a:rPr>
-              <a:t>Bài 9: Viết chương trình:</a:t>
+              <a:t>Bài 8: Viết chương trình:</a:t>
             </a:r>
           </a:p>
           <a:p>
@@ -13376,7 +13377,7 @@
                 <a:latin typeface="Arial" panose="020B0604020202020204" pitchFamily="34" charset="0"/>
                 <a:cs typeface="Arial" panose="020B0604020202020204" pitchFamily="34" charset="0"/>
               </a:rPr>
-              <a:t>Yêu cầu người dùng nhập vào một chuỗi giờ theo định dạng: &lt;Giờ&gt;:&lt;Phút&gt;:&lt;Giây&gt;</a:t>
+              <a:t>Yêu cầu người dùng nhập vào một chuỗi ngày theo định dạng: &lt;Ngày&gt;/&lt;Tháng&gt;/&lt;Năm&gt;</a:t>
             </a:r>
           </a:p>
           <a:p>
@@ -13386,7 +13387,7 @@
                 <a:latin typeface="Arial" panose="020B0604020202020204" pitchFamily="34" charset="0"/>
                 <a:cs typeface="Arial" panose="020B0604020202020204" pitchFamily="34" charset="0"/>
               </a:rPr>
-              <a:t>Nếu người dùng nhập đúng định dạng, hãy in ra cho người dùng biết giờ, phút và giây mà người dùng nhập là bao nhiêu.</a:t>
+              <a:t>Nếu người dùng nhập đúng định dạng, hãy in ra cho người dùng biết ngày, tháng và năm mà người dùng nhập là bao nhiêu.</a:t>
             </a:r>
           </a:p>
           <a:p>
@@ -13404,7 +13405,7 @@
     </p:spTree>
     <p:extLst>
       <p:ext uri="{BB962C8B-B14F-4D97-AF65-F5344CB8AC3E}">
-        <p14:creationId xmlns:p14="http://schemas.microsoft.com/office/powerpoint/2010/main" val="523734597"/>
+        <p14:creationId xmlns:p14="http://schemas.microsoft.com/office/powerpoint/2010/main" val="597969115"/>
       </p:ext>
     </p:extLst>
   </p:cSld>
@@ -13635,7 +13636,7 @@
                 <a:latin typeface="Arial" panose="020B0604020202020204" pitchFamily="34" charset="0"/>
                 <a:cs typeface="Arial" panose="020B0604020202020204" pitchFamily="34" charset="0"/>
               </a:rPr>
-              <a:t>Bài 10: Viết chương trình:</a:t>
+              <a:t>Bài 9: Viết chương trình:</a:t>
             </a:r>
           </a:p>
           <a:p>
@@ -13645,7 +13646,7 @@
                 <a:latin typeface="Arial" panose="020B0604020202020204" pitchFamily="34" charset="0"/>
                 <a:cs typeface="Arial" panose="020B0604020202020204" pitchFamily="34" charset="0"/>
               </a:rPr>
-              <a:t>Yêu cầu người dùng nhập vào một chuỗi ngày, giờ theo định dạng:  &lt;Ngày&gt;/&lt;Tháng&gt;/&lt;Năm&gt; &lt;Giờ&gt;:&lt;Phút&gt;:&lt;Giây&gt;</a:t>
+              <a:t>Yêu cầu người dùng nhập vào một chuỗi giờ theo định dạng: &lt;Giờ&gt;:&lt;Phút&gt;:&lt;Giây&gt;</a:t>
             </a:r>
           </a:p>
           <a:p>
@@ -13655,7 +13656,7 @@
                 <a:latin typeface="Arial" panose="020B0604020202020204" pitchFamily="34" charset="0"/>
                 <a:cs typeface="Arial" panose="020B0604020202020204" pitchFamily="34" charset="0"/>
               </a:rPr>
-              <a:t>Nếu người dùng nhập đúng định dạng, hãy in ra cho người dùng biết ngày, tháng, năm, giờ, phút và giây mà người dùng nhập là bao nhiêu.</a:t>
+              <a:t>Nếu người dùng nhập đúng định dạng, hãy in ra cho người dùng biết giờ, phút và giây mà người dùng nhập là bao nhiêu.</a:t>
             </a:r>
           </a:p>
           <a:p>
@@ -13673,7 +13674,7 @@
     </p:spTree>
     <p:extLst>
       <p:ext uri="{BB962C8B-B14F-4D97-AF65-F5344CB8AC3E}">
-        <p14:creationId xmlns:p14="http://schemas.microsoft.com/office/powerpoint/2010/main" val="602283066"/>
+        <p14:creationId xmlns:p14="http://schemas.microsoft.com/office/powerpoint/2010/main" val="523734597"/>
       </p:ext>
     </p:extLst>
   </p:cSld>
@@ -13762,6 +13763,133 @@
                 <a:latin typeface="Arial" panose="020B0604020202020204" pitchFamily="34" charset="0"/>
                 <a:cs typeface="Arial" panose="020B0604020202020204" pitchFamily="34" charset="0"/>
               </a:rPr>
+              <a:t>Bài 10: Viết chương trình:</a:t>
+            </a:r>
+          </a:p>
+          <a:p>
+            <a:pPr lvl="1"/>
+            <a:r>
+              <a:rPr lang="en-US">
+                <a:latin typeface="Arial" panose="020B0604020202020204" pitchFamily="34" charset="0"/>
+                <a:cs typeface="Arial" panose="020B0604020202020204" pitchFamily="34" charset="0"/>
+              </a:rPr>
+              <a:t>Yêu cầu người dùng nhập vào một chuỗi ngày, giờ theo định dạng:  &lt;Ngày&gt;/&lt;Tháng&gt;/&lt;Năm&gt; &lt;Giờ&gt;:&lt;Phút&gt;:&lt;Giây&gt;</a:t>
+            </a:r>
+          </a:p>
+          <a:p>
+            <a:pPr lvl="1"/>
+            <a:r>
+              <a:rPr lang="en-US">
+                <a:latin typeface="Arial" panose="020B0604020202020204" pitchFamily="34" charset="0"/>
+                <a:cs typeface="Arial" panose="020B0604020202020204" pitchFamily="34" charset="0"/>
+              </a:rPr>
+              <a:t>Nếu người dùng nhập đúng định dạng, hãy in ra cho người dùng biết ngày, tháng, năm, giờ, phút và giây mà người dùng nhập là bao nhiêu.</a:t>
+            </a:r>
+          </a:p>
+          <a:p>
+            <a:pPr lvl="1"/>
+            <a:r>
+              <a:rPr lang="en-US">
+                <a:latin typeface="Arial" panose="020B0604020202020204" pitchFamily="34" charset="0"/>
+                <a:cs typeface="Arial" panose="020B0604020202020204" pitchFamily="34" charset="0"/>
+              </a:rPr>
+              <a:t>Nếu người dùng nhập không đúng định dạng, xuất ra dòng thông báo và yêu cầu người dùng nhập lại cho đến khi người dùng nhập đúng.</a:t>
+            </a:r>
+          </a:p>
+        </p:txBody>
+      </p:sp>
+    </p:spTree>
+    <p:extLst>
+      <p:ext uri="{BB962C8B-B14F-4D97-AF65-F5344CB8AC3E}">
+        <p14:creationId xmlns:p14="http://schemas.microsoft.com/office/powerpoint/2010/main" val="602283066"/>
+      </p:ext>
+    </p:extLst>
+  </p:cSld>
+  <p:clrMapOvr>
+    <a:masterClrMapping/>
+  </p:clrMapOvr>
+</p:sld>
+</file>
+
+<file path=ppt/slides/slide62.xml><?xml version="1.0" encoding="utf-8"?>
+<p:sld xmlns:a="http://schemas.openxmlformats.org/drawingml/2006/main" xmlns:r="http://schemas.openxmlformats.org/officeDocument/2006/relationships" xmlns:p="http://schemas.openxmlformats.org/presentationml/2006/main">
+  <p:cSld>
+    <p:spTree>
+      <p:nvGrpSpPr>
+        <p:cNvPr id="1" name=""/>
+        <p:cNvGrpSpPr/>
+        <p:nvPr/>
+      </p:nvGrpSpPr>
+      <p:grpSpPr>
+        <a:xfrm>
+          <a:off x="0" y="0"/>
+          <a:ext cx="0" cy="0"/>
+          <a:chOff x="0" y="0"/>
+          <a:chExt cx="0" cy="0"/>
+        </a:xfrm>
+      </p:grpSpPr>
+      <p:sp>
+        <p:nvSpPr>
+          <p:cNvPr id="2" name="Title 1">
+            <a:extLst>
+              <a:ext uri="{FF2B5EF4-FFF2-40B4-BE49-F238E27FC236}">
+                <a16:creationId xmlns:a16="http://schemas.microsoft.com/office/drawing/2014/main" id="{14D7F595-0D8F-4FE6-A3EC-4557A1A457EB}"/>
+              </a:ext>
+            </a:extLst>
+          </p:cNvPr>
+          <p:cNvSpPr>
+            <a:spLocks noGrp="1"/>
+          </p:cNvSpPr>
+          <p:nvPr>
+            <p:ph type="title"/>
+          </p:nvPr>
+        </p:nvSpPr>
+        <p:spPr/>
+        <p:txBody>
+          <a:bodyPr/>
+          <a:lstStyle/>
+          <a:p>
+            <a:r>
+              <a:rPr lang="en-US">
+                <a:latin typeface="Arial" panose="020B0604020202020204" pitchFamily="34" charset="0"/>
+                <a:cs typeface="Arial" panose="020B0604020202020204" pitchFamily="34" charset="0"/>
+              </a:rPr>
+              <a:t>Bài tập thực hành</a:t>
+            </a:r>
+          </a:p>
+        </p:txBody>
+      </p:sp>
+      <p:sp>
+        <p:nvSpPr>
+          <p:cNvPr id="3" name="Content Placeholder 2">
+            <a:extLst>
+              <a:ext uri="{FF2B5EF4-FFF2-40B4-BE49-F238E27FC236}">
+                <a16:creationId xmlns:a16="http://schemas.microsoft.com/office/drawing/2014/main" id="{6337998B-3737-4D43-973D-24B118D723A2}"/>
+              </a:ext>
+            </a:extLst>
+          </p:cNvPr>
+          <p:cNvSpPr>
+            <a:spLocks noGrp="1"/>
+          </p:cNvSpPr>
+          <p:nvPr>
+            <p:ph idx="1"/>
+          </p:nvPr>
+        </p:nvSpPr>
+        <p:spPr>
+          <a:xfrm>
+            <a:off x="1103312" y="2237173"/>
+            <a:ext cx="8946541" cy="4011227"/>
+          </a:xfrm>
+        </p:spPr>
+        <p:txBody>
+          <a:bodyPr/>
+          <a:lstStyle/>
+          <a:p>
+            <a:r>
+              <a:rPr lang="en-US">
+                <a:latin typeface="Arial" panose="020B0604020202020204" pitchFamily="34" charset="0"/>
+                <a:cs typeface="Arial" panose="020B0604020202020204" pitchFamily="34" charset="0"/>
+              </a:rPr>
               <a:t>Bài 11: Viết chương trình:</a:t>
             </a:r>
           </a:p>
@@ -13820,7 +13948,7 @@
 </p:sld>
 </file>
 
-<file path=ppt/slides/slide62.xml><?xml version="1.0" encoding="utf-8"?>
+<file path=ppt/slides/slide63.xml><?xml version="1.0" encoding="utf-8"?>
 <p:sld xmlns:a="http://schemas.openxmlformats.org/drawingml/2006/main" xmlns:r="http://schemas.openxmlformats.org/officeDocument/2006/relationships" xmlns:p="http://schemas.openxmlformats.org/presentationml/2006/main">
   <p:cSld>
     <p:spTree>

</xml_diff>